<commit_message>
Updated Capstone Presentation and Codes
</commit_message>
<xml_diff>
--- a/Capstone Presentation.pptx
+++ b/Capstone Presentation.pptx
@@ -7,27 +7,25 @@
   <p:sldIdLst>
     <p:sldId id="256" r:id="rId2"/>
     <p:sldId id="257" r:id="rId3"/>
-    <p:sldId id="259" r:id="rId4"/>
-    <p:sldId id="258" r:id="rId5"/>
-    <p:sldId id="260" r:id="rId6"/>
-    <p:sldId id="262" r:id="rId7"/>
-    <p:sldId id="261" r:id="rId8"/>
-    <p:sldId id="264" r:id="rId9"/>
-    <p:sldId id="267" r:id="rId10"/>
-    <p:sldId id="266" r:id="rId11"/>
-    <p:sldId id="274" r:id="rId12"/>
-    <p:sldId id="268" r:id="rId13"/>
-    <p:sldId id="269" r:id="rId14"/>
-    <p:sldId id="282" r:id="rId15"/>
-    <p:sldId id="270" r:id="rId16"/>
-    <p:sldId id="271" r:id="rId17"/>
-    <p:sldId id="272" r:id="rId18"/>
-    <p:sldId id="273" r:id="rId19"/>
-    <p:sldId id="275" r:id="rId20"/>
-    <p:sldId id="279" r:id="rId21"/>
-    <p:sldId id="276" r:id="rId22"/>
-    <p:sldId id="277" r:id="rId23"/>
-    <p:sldId id="278" r:id="rId24"/>
+    <p:sldId id="283" r:id="rId4"/>
+    <p:sldId id="259" r:id="rId5"/>
+    <p:sldId id="258" r:id="rId6"/>
+    <p:sldId id="260" r:id="rId7"/>
+    <p:sldId id="262" r:id="rId8"/>
+    <p:sldId id="261" r:id="rId9"/>
+    <p:sldId id="264" r:id="rId10"/>
+    <p:sldId id="267" r:id="rId11"/>
+    <p:sldId id="266" r:id="rId12"/>
+    <p:sldId id="274" r:id="rId13"/>
+    <p:sldId id="268" r:id="rId14"/>
+    <p:sldId id="269" r:id="rId15"/>
+    <p:sldId id="282" r:id="rId16"/>
+    <p:sldId id="273" r:id="rId17"/>
+    <p:sldId id="279" r:id="rId18"/>
+    <p:sldId id="275" r:id="rId19"/>
+    <p:sldId id="276" r:id="rId20"/>
+    <p:sldId id="277" r:id="rId21"/>
+    <p:sldId id="278" r:id="rId22"/>
   </p:sldIdLst>
   <p:sldSz cx="12192000" cy="6858000"/>
   <p:notesSz cx="6858000" cy="9144000"/>
@@ -5900,6 +5898,137 @@
         </p:nvSpPr>
         <p:spPr>
           <a:xfrm>
+            <a:off x="1548620" y="441320"/>
+            <a:ext cx="9601196" cy="931074"/>
+          </a:xfrm>
+        </p:spPr>
+        <p:txBody>
+          <a:bodyPr>
+            <a:normAutofit/>
+          </a:bodyPr>
+          <a:lstStyle/>
+          <a:p>
+            <a:r>
+              <a:rPr lang="en-US" sz="3600" dirty="0"/>
+              <a:t>Average Charge By State for Medicare Outpatient </a:t>
+            </a:r>
+          </a:p>
+        </p:txBody>
+      </p:sp>
+      <p:sp>
+        <p:nvSpPr>
+          <p:cNvPr id="3" name="Rectangle 2">
+            <a:extLst>
+              <a:ext uri="{FF2B5EF4-FFF2-40B4-BE49-F238E27FC236}">
+                <a16:creationId xmlns:a16="http://schemas.microsoft.com/office/drawing/2014/main" id="{C4BE70F4-B7C8-4B58-B8C3-28356F1C1AD6}"/>
+              </a:ext>
+            </a:extLst>
+          </p:cNvPr>
+          <p:cNvSpPr/>
+          <p:nvPr/>
+        </p:nvSpPr>
+        <p:spPr>
+          <a:xfrm>
+            <a:off x="832644" y="1779388"/>
+            <a:ext cx="2041853" cy="1477328"/>
+          </a:xfrm>
+          <a:prstGeom prst="rect">
+            <a:avLst/>
+          </a:prstGeom>
+        </p:spPr>
+        <p:txBody>
+          <a:bodyPr wrap="square">
+            <a:spAutoFit/>
+          </a:bodyPr>
+          <a:lstStyle/>
+          <a:p>
+            <a:r>
+              <a:rPr lang="en-US" dirty="0"/>
+              <a:t>States Like Nevada, California and Florida charged highest in Average in 2016.</a:t>
+            </a:r>
+          </a:p>
+        </p:txBody>
+      </p:sp>
+      <p:pic>
+        <p:nvPicPr>
+          <p:cNvPr id="5" name="Content Placeholder 4">
+            <a:extLst>
+              <a:ext uri="{FF2B5EF4-FFF2-40B4-BE49-F238E27FC236}">
+                <a16:creationId xmlns:a16="http://schemas.microsoft.com/office/drawing/2014/main" id="{BEFE9C81-53CD-4881-96C2-591CD88A3E51}"/>
+              </a:ext>
+            </a:extLst>
+          </p:cNvPr>
+          <p:cNvPicPr>
+            <a:picLocks noGrp="1" noChangeAspect="1"/>
+          </p:cNvPicPr>
+          <p:nvPr>
+            <p:ph idx="1"/>
+          </p:nvPr>
+        </p:nvPicPr>
+        <p:blipFill>
+          <a:blip r:embed="rId2"/>
+          <a:stretch>
+            <a:fillRect/>
+          </a:stretch>
+        </p:blipFill>
+        <p:spPr>
+          <a:xfrm>
+            <a:off x="2874497" y="1372394"/>
+            <a:ext cx="8102991" cy="4701391"/>
+          </a:xfrm>
+          <a:prstGeom prst="rect">
+            <a:avLst/>
+          </a:prstGeom>
+        </p:spPr>
+      </p:pic>
+    </p:spTree>
+    <p:extLst>
+      <p:ext uri="{BB962C8B-B14F-4D97-AF65-F5344CB8AC3E}">
+        <p14:creationId xmlns:p14="http://schemas.microsoft.com/office/powerpoint/2010/main" val="927452506"/>
+      </p:ext>
+    </p:extLst>
+  </p:cSld>
+  <p:clrMapOvr>
+    <a:masterClrMapping/>
+  </p:clrMapOvr>
+</p:sld>
+</file>
+
+<file path=ppt/slides/slide11.xml><?xml version="1.0" encoding="utf-8"?>
+<p:sld xmlns:a="http://schemas.openxmlformats.org/drawingml/2006/main" xmlns:r="http://schemas.openxmlformats.org/officeDocument/2006/relationships" xmlns:p="http://schemas.openxmlformats.org/presentationml/2006/main">
+  <p:cSld>
+    <p:spTree>
+      <p:nvGrpSpPr>
+        <p:cNvPr id="1" name=""/>
+        <p:cNvGrpSpPr/>
+        <p:nvPr/>
+      </p:nvGrpSpPr>
+      <p:grpSpPr>
+        <a:xfrm>
+          <a:off x="0" y="0"/>
+          <a:ext cx="0" cy="0"/>
+          <a:chOff x="0" y="0"/>
+          <a:chExt cx="0" cy="0"/>
+        </a:xfrm>
+      </p:grpSpPr>
+      <p:sp>
+        <p:nvSpPr>
+          <p:cNvPr id="2" name="Title 1">
+            <a:extLst>
+              <a:ext uri="{FF2B5EF4-FFF2-40B4-BE49-F238E27FC236}">
+                <a16:creationId xmlns:a16="http://schemas.microsoft.com/office/drawing/2014/main" id="{2C22A208-6BC1-4D7F-825D-4B9C6AEF3B4E}"/>
+              </a:ext>
+            </a:extLst>
+          </p:cNvPr>
+          <p:cNvSpPr>
+            <a:spLocks noGrp="1"/>
+          </p:cNvSpPr>
+          <p:nvPr>
+            <p:ph type="title"/>
+          </p:nvPr>
+        </p:nvSpPr>
+        <p:spPr>
+          <a:xfrm>
             <a:off x="1337606" y="686710"/>
             <a:ext cx="9601196" cy="590843"/>
           </a:xfrm>
@@ -5970,10 +6099,10 @@
       </p:sp>
       <p:pic>
         <p:nvPicPr>
-          <p:cNvPr id="5132" name="Picture 12">
+          <p:cNvPr id="2050" name="Picture 2">
             <a:extLst>
               <a:ext uri="{FF2B5EF4-FFF2-40B4-BE49-F238E27FC236}">
-                <a16:creationId xmlns:a16="http://schemas.microsoft.com/office/drawing/2014/main" id="{8A1DDFCE-62BB-4EF3-9121-C24EFAB53BAE}"/>
+                <a16:creationId xmlns:a16="http://schemas.microsoft.com/office/drawing/2014/main" id="{3FDBE592-B679-4AF8-9FF8-7E59547A707E}"/>
               </a:ext>
             </a:extLst>
           </p:cNvPr>
@@ -5999,8 +6128,8 @@
         </p:blipFill>
         <p:spPr bwMode="auto">
           <a:xfrm>
-            <a:off x="3052979" y="1277553"/>
-            <a:ext cx="8433806" cy="4597785"/>
+            <a:off x="2759950" y="1579035"/>
+            <a:ext cx="8761490" cy="4259057"/>
           </a:xfrm>
           <a:prstGeom prst="rect">
             <a:avLst/>
@@ -6030,7 +6159,7 @@
 </p:sld>
 </file>
 
-<file path=ppt/slides/slide11.xml><?xml version="1.0" encoding="utf-8"?>
+<file path=ppt/slides/slide12.xml><?xml version="1.0" encoding="utf-8"?>
 <p:sld xmlns:a="http://schemas.openxmlformats.org/drawingml/2006/main" xmlns:r="http://schemas.openxmlformats.org/officeDocument/2006/relationships" xmlns:p="http://schemas.openxmlformats.org/presentationml/2006/main">
   <p:cSld>
     <p:spTree>
@@ -6097,7 +6226,7 @@
         <p:spPr>
           <a:xfrm>
             <a:off x="618979" y="1545424"/>
-            <a:ext cx="2152356" cy="3693319"/>
+            <a:ext cx="2152356" cy="3416320"/>
           </a:xfrm>
           <a:prstGeom prst="rect">
             <a:avLst/>
@@ -6127,17 +6256,17 @@
           <a:p>
             <a:r>
               <a:rPr lang="en-US" dirty="0"/>
-              <a:t>While least charged procedures  have less variations in Charge amounts</a:t>
+              <a:t>While least charged procedures  have less variations</a:t>
             </a:r>
           </a:p>
         </p:txBody>
       </p:sp>
       <p:pic>
         <p:nvPicPr>
-          <p:cNvPr id="13320" name="Picture 8">
+          <p:cNvPr id="3074" name="Picture 2">
             <a:extLst>
               <a:ext uri="{FF2B5EF4-FFF2-40B4-BE49-F238E27FC236}">
-                <a16:creationId xmlns:a16="http://schemas.microsoft.com/office/drawing/2014/main" id="{FBAFF85B-54EC-4D7F-8307-0AF3D81C6DCF}"/>
+                <a16:creationId xmlns:a16="http://schemas.microsoft.com/office/drawing/2014/main" id="{E668092F-7EFE-4D19-AC8F-03B99FB22B80}"/>
               </a:ext>
             </a:extLst>
           </p:cNvPr>
@@ -6163,8 +6292,8 @@
         </p:blipFill>
         <p:spPr bwMode="auto">
           <a:xfrm>
-            <a:off x="2736568" y="1406769"/>
-            <a:ext cx="8836453" cy="4454501"/>
+            <a:off x="2826470" y="1420838"/>
+            <a:ext cx="8746551" cy="4437946"/>
           </a:xfrm>
           <a:prstGeom prst="rect">
             <a:avLst/>
@@ -6194,7 +6323,7 @@
 </p:sld>
 </file>
 
-<file path=ppt/slides/slide12.xml><?xml version="1.0" encoding="utf-8"?>
+<file path=ppt/slides/slide13.xml><?xml version="1.0" encoding="utf-8"?>
 <p:sld xmlns:a="http://schemas.openxmlformats.org/drawingml/2006/main" xmlns:r="http://schemas.openxmlformats.org/officeDocument/2006/relationships" xmlns:p="http://schemas.openxmlformats.org/presentationml/2006/main">
   <p:cSld>
     <p:spTree>
@@ -6282,10 +6411,10 @@
       </p:sp>
       <p:pic>
         <p:nvPicPr>
-          <p:cNvPr id="7174" name="Picture 6">
+          <p:cNvPr id="4100" name="Picture 4">
             <a:extLst>
               <a:ext uri="{FF2B5EF4-FFF2-40B4-BE49-F238E27FC236}">
-                <a16:creationId xmlns:a16="http://schemas.microsoft.com/office/drawing/2014/main" id="{B9187F04-FC13-4EA7-9A35-FB5160CDE123}"/>
+                <a16:creationId xmlns:a16="http://schemas.microsoft.com/office/drawing/2014/main" id="{2CF77D1F-4233-490E-BE7E-8B3AFCDE5D8B}"/>
               </a:ext>
             </a:extLst>
           </p:cNvPr>
@@ -6311,8 +6440,8 @@
         </p:blipFill>
         <p:spPr bwMode="auto">
           <a:xfrm>
-            <a:off x="3544039" y="1288507"/>
-            <a:ext cx="7310356" cy="4752199"/>
+            <a:off x="3319976" y="1533377"/>
+            <a:ext cx="7526216" cy="4829707"/>
           </a:xfrm>
           <a:prstGeom prst="rect">
             <a:avLst/>
@@ -6342,7 +6471,7 @@
 </p:sld>
 </file>
 
-<file path=ppt/slides/slide13.xml><?xml version="1.0" encoding="utf-8"?>
+<file path=ppt/slides/slide14.xml><?xml version="1.0" encoding="utf-8"?>
 <p:sld xmlns:a="http://schemas.openxmlformats.org/drawingml/2006/main" xmlns:r="http://schemas.openxmlformats.org/officeDocument/2006/relationships" xmlns:p="http://schemas.openxmlformats.org/presentationml/2006/main">
   <p:cSld>
     <p:spTree>
@@ -6496,7 +6625,7 @@
 </p:sld>
 </file>
 
-<file path=ppt/slides/slide14.xml><?xml version="1.0" encoding="utf-8"?>
+<file path=ppt/slides/slide15.xml><?xml version="1.0" encoding="utf-8"?>
 <p:sld xmlns:a="http://schemas.openxmlformats.org/drawingml/2006/main" xmlns:r="http://schemas.openxmlformats.org/officeDocument/2006/relationships" xmlns:p="http://schemas.openxmlformats.org/presentationml/2006/main">
   <p:cSld>
     <p:spTree>
@@ -6584,10 +6713,10 @@
       </p:sp>
       <p:pic>
         <p:nvPicPr>
-          <p:cNvPr id="2054" name="Picture 6">
+          <p:cNvPr id="7174" name="Picture 6">
             <a:extLst>
               <a:ext uri="{FF2B5EF4-FFF2-40B4-BE49-F238E27FC236}">
-                <a16:creationId xmlns:a16="http://schemas.microsoft.com/office/drawing/2014/main" id="{17D50B48-1FFD-4198-990B-9C6C314DB18B}"/>
+                <a16:creationId xmlns:a16="http://schemas.microsoft.com/office/drawing/2014/main" id="{534F4239-808C-4B10-AAC7-582C33EB1F59}"/>
               </a:ext>
             </a:extLst>
           </p:cNvPr>
@@ -6611,8 +6740,8 @@
         </p:blipFill>
         <p:spPr bwMode="auto">
           <a:xfrm>
-            <a:off x="3376246" y="1354483"/>
-            <a:ext cx="7948026" cy="4521385"/>
+            <a:off x="3210061" y="1436083"/>
+            <a:ext cx="8380748" cy="4317604"/>
           </a:xfrm>
           <a:prstGeom prst="rect">
             <a:avLst/>
@@ -6642,8 +6771,8 @@
 </p:sld>
 </file>
 
-<file path=ppt/slides/slide15.xml><?xml version="1.0" encoding="utf-8"?>
-<p:sld xmlns:a="http://schemas.openxmlformats.org/drawingml/2006/main" xmlns:r="http://schemas.openxmlformats.org/officeDocument/2006/relationships" xmlns:p="http://schemas.openxmlformats.org/presentationml/2006/main" show="0">
+<file path=ppt/slides/slide16.xml><?xml version="1.0" encoding="utf-8"?>
+<p:sld xmlns:a="http://schemas.openxmlformats.org/drawingml/2006/main" xmlns:r="http://schemas.openxmlformats.org/officeDocument/2006/relationships" xmlns:p="http://schemas.openxmlformats.org/presentationml/2006/main">
   <p:cSld>
     <p:spTree>
       <p:nvGrpSpPr>
@@ -6677,26 +6806,19 @@
         </p:nvSpPr>
         <p:spPr>
           <a:xfrm>
-            <a:off x="1337605" y="686710"/>
-            <a:ext cx="10324512" cy="756439"/>
+            <a:off x="1323537" y="504205"/>
+            <a:ext cx="10141631" cy="478457"/>
           </a:xfrm>
         </p:spPr>
         <p:txBody>
           <a:bodyPr>
-            <a:noAutofit/>
+            <a:normAutofit fontScale="90000"/>
           </a:bodyPr>
           <a:lstStyle/>
           <a:p>
             <a:r>
-              <a:rPr lang="en-US" sz="2200" dirty="0"/>
-              <a:t>Is there Quality Difference by Ownership Type? </a:t>
-            </a:r>
-            <a:br>
-              <a:rPr lang="en-US" sz="2200" dirty="0"/>
-            </a:br>
-            <a:r>
-              <a:rPr lang="en-US" sz="2200" dirty="0"/>
-              <a:t>Quality of Care by Ownership Type</a:t>
+              <a:rPr lang="en-US" sz="2800" dirty="0"/>
+              <a:t>Median Charge by Level of Star</a:t>
             </a:r>
           </a:p>
         </p:txBody>
@@ -6715,8 +6837,8 @@
         </p:nvSpPr>
         <p:spPr>
           <a:xfrm>
-            <a:off x="844062" y="1533375"/>
-            <a:ext cx="1983543" cy="1477328"/>
+            <a:off x="844062" y="1533376"/>
+            <a:ext cx="2475913" cy="923330"/>
           </a:xfrm>
           <a:prstGeom prst="rect">
             <a:avLst/>
@@ -6730,17 +6852,17 @@
           <a:p>
             <a:r>
               <a:rPr lang="en-US" dirty="0"/>
-              <a:t>Proprietary Hospitals had highest percentage rated as Above National Average</a:t>
+              <a:t>Lower Star Hospitals Higher Median Charge, Except Star-3</a:t>
             </a:r>
           </a:p>
         </p:txBody>
       </p:sp>
       <p:pic>
         <p:nvPicPr>
-          <p:cNvPr id="9220" name="Picture 4">
+          <p:cNvPr id="8194" name="Picture 2">
             <a:extLst>
               <a:ext uri="{FF2B5EF4-FFF2-40B4-BE49-F238E27FC236}">
-                <a16:creationId xmlns:a16="http://schemas.microsoft.com/office/drawing/2014/main" id="{DDE1B682-847C-4984-9B47-EDD1E59BFD2D}"/>
+                <a16:creationId xmlns:a16="http://schemas.microsoft.com/office/drawing/2014/main" id="{EBBE6B3B-4465-4FFE-A9A4-ED9522603A69}"/>
               </a:ext>
             </a:extLst>
           </p:cNvPr>
@@ -6766,458 +6888,8 @@
         </p:blipFill>
         <p:spPr bwMode="auto">
           <a:xfrm>
-            <a:off x="2333338" y="2103461"/>
-            <a:ext cx="8555056" cy="3771878"/>
-          </a:xfrm>
-          <a:prstGeom prst="rect">
-            <a:avLst/>
-          </a:prstGeom>
-          <a:noFill/>
-          <a:extLst>
-            <a:ext uri="{909E8E84-426E-40DD-AFC4-6F175D3DCCD1}">
-              <a14:hiddenFill xmlns:a14="http://schemas.microsoft.com/office/drawing/2010/main">
-                <a:solidFill>
-                  <a:srgbClr val="FFFFFF"/>
-                </a:solidFill>
-              </a14:hiddenFill>
-            </a:ext>
-          </a:extLst>
-        </p:spPr>
-      </p:pic>
-    </p:spTree>
-    <p:extLst>
-      <p:ext uri="{BB962C8B-B14F-4D97-AF65-F5344CB8AC3E}">
-        <p14:creationId xmlns:p14="http://schemas.microsoft.com/office/powerpoint/2010/main" val="60165738"/>
-      </p:ext>
-    </p:extLst>
-  </p:cSld>
-  <p:clrMapOvr>
-    <a:masterClrMapping/>
-  </p:clrMapOvr>
-</p:sld>
-</file>
-
-<file path=ppt/slides/slide16.xml><?xml version="1.0" encoding="utf-8"?>
-<p:sld xmlns:a="http://schemas.openxmlformats.org/drawingml/2006/main" xmlns:r="http://schemas.openxmlformats.org/officeDocument/2006/relationships" xmlns:p="http://schemas.openxmlformats.org/presentationml/2006/main" show="0">
-  <p:cSld>
-    <p:spTree>
-      <p:nvGrpSpPr>
-        <p:cNvPr id="1" name=""/>
-        <p:cNvGrpSpPr/>
-        <p:nvPr/>
-      </p:nvGrpSpPr>
-      <p:grpSpPr>
-        <a:xfrm>
-          <a:off x="0" y="0"/>
-          <a:ext cx="0" cy="0"/>
-          <a:chOff x="0" y="0"/>
-          <a:chExt cx="0" cy="0"/>
-        </a:xfrm>
-      </p:grpSpPr>
-      <p:sp>
-        <p:nvSpPr>
-          <p:cNvPr id="2" name="Title 1">
-            <a:extLst>
-              <a:ext uri="{FF2B5EF4-FFF2-40B4-BE49-F238E27FC236}">
-                <a16:creationId xmlns:a16="http://schemas.microsoft.com/office/drawing/2014/main" id="{2C22A208-6BC1-4D7F-825D-4B9C6AEF3B4E}"/>
-              </a:ext>
-            </a:extLst>
-          </p:cNvPr>
-          <p:cNvSpPr>
-            <a:spLocks noGrp="1"/>
-          </p:cNvSpPr>
-          <p:nvPr>
-            <p:ph type="title"/>
-          </p:nvPr>
-        </p:nvSpPr>
-        <p:spPr>
-          <a:xfrm>
-            <a:off x="1337605" y="686710"/>
-            <a:ext cx="10141631" cy="615865"/>
-          </a:xfrm>
-        </p:spPr>
-        <p:txBody>
-          <a:bodyPr>
-            <a:normAutofit/>
-          </a:bodyPr>
-          <a:lstStyle/>
-          <a:p>
-            <a:r>
-              <a:rPr lang="en-US" sz="2800" dirty="0"/>
-              <a:t>Readmission Type by Ownership Type</a:t>
-            </a:r>
-          </a:p>
-        </p:txBody>
-      </p:sp>
-      <p:sp>
-        <p:nvSpPr>
-          <p:cNvPr id="3" name="Rectangle 2">
-            <a:extLst>
-              <a:ext uri="{FF2B5EF4-FFF2-40B4-BE49-F238E27FC236}">
-                <a16:creationId xmlns:a16="http://schemas.microsoft.com/office/drawing/2014/main" id="{C4BE70F4-B7C8-4B58-B8C3-28356F1C1AD6}"/>
-              </a:ext>
-            </a:extLst>
-          </p:cNvPr>
-          <p:cNvSpPr/>
-          <p:nvPr/>
-        </p:nvSpPr>
-        <p:spPr>
-          <a:xfrm>
-            <a:off x="844062" y="1533376"/>
-            <a:ext cx="8996340" cy="646331"/>
-          </a:xfrm>
-          <a:prstGeom prst="rect">
-            <a:avLst/>
-          </a:prstGeom>
-        </p:spPr>
-        <p:txBody>
-          <a:bodyPr wrap="square">
-            <a:spAutoFit/>
-          </a:bodyPr>
-          <a:lstStyle/>
-          <a:p>
-            <a:r>
-              <a:rPr lang="en-US" dirty="0"/>
-              <a:t>State Owned Hospitals had highest percentage rated as Below National Average,</a:t>
-            </a:r>
-          </a:p>
-          <a:p>
-            <a:r>
-              <a:rPr lang="en-US" dirty="0"/>
-              <a:t>Physician Owned Hospitals had the highest readmission rate in 2016</a:t>
-            </a:r>
-          </a:p>
-        </p:txBody>
-      </p:sp>
-      <p:pic>
-        <p:nvPicPr>
-          <p:cNvPr id="10246" name="Picture 6">
-            <a:extLst>
-              <a:ext uri="{FF2B5EF4-FFF2-40B4-BE49-F238E27FC236}">
-                <a16:creationId xmlns:a16="http://schemas.microsoft.com/office/drawing/2014/main" id="{DA8A866E-8490-426D-AF53-08BC1D2EEB4D}"/>
-              </a:ext>
-            </a:extLst>
-          </p:cNvPr>
-          <p:cNvPicPr>
-            <a:picLocks noGrp="1" noChangeAspect="1" noChangeArrowheads="1"/>
-          </p:cNvPicPr>
-          <p:nvPr>
-            <p:ph idx="1"/>
-          </p:nvPr>
-        </p:nvPicPr>
-        <p:blipFill>
-          <a:blip r:embed="rId2">
-            <a:extLst>
-              <a:ext uri="{28A0092B-C50C-407E-A947-70E740481C1C}">
-                <a14:useLocalDpi xmlns:a14="http://schemas.microsoft.com/office/drawing/2010/main" val="0"/>
-              </a:ext>
-            </a:extLst>
-          </a:blip>
-          <a:srcRect/>
-          <a:stretch>
-            <a:fillRect/>
-          </a:stretch>
-        </p:blipFill>
-        <p:spPr bwMode="auto">
-          <a:xfrm>
-            <a:off x="2458403" y="2179707"/>
-            <a:ext cx="8103510" cy="3695631"/>
-          </a:xfrm>
-          <a:prstGeom prst="rect">
-            <a:avLst/>
-          </a:prstGeom>
-          <a:noFill/>
-          <a:extLst>
-            <a:ext uri="{909E8E84-426E-40DD-AFC4-6F175D3DCCD1}">
-              <a14:hiddenFill xmlns:a14="http://schemas.microsoft.com/office/drawing/2010/main">
-                <a:solidFill>
-                  <a:srgbClr val="FFFFFF"/>
-                </a:solidFill>
-              </a14:hiddenFill>
-            </a:ext>
-          </a:extLst>
-        </p:spPr>
-      </p:pic>
-    </p:spTree>
-    <p:extLst>
-      <p:ext uri="{BB962C8B-B14F-4D97-AF65-F5344CB8AC3E}">
-        <p14:creationId xmlns:p14="http://schemas.microsoft.com/office/powerpoint/2010/main" val="2589140810"/>
-      </p:ext>
-    </p:extLst>
-  </p:cSld>
-  <p:clrMapOvr>
-    <a:masterClrMapping/>
-  </p:clrMapOvr>
-</p:sld>
-</file>
-
-<file path=ppt/slides/slide17.xml><?xml version="1.0" encoding="utf-8"?>
-<p:sld xmlns:a="http://schemas.openxmlformats.org/drawingml/2006/main" xmlns:r="http://schemas.openxmlformats.org/officeDocument/2006/relationships" xmlns:p="http://schemas.openxmlformats.org/presentationml/2006/main" show="0">
-  <p:cSld>
-    <p:spTree>
-      <p:nvGrpSpPr>
-        <p:cNvPr id="1" name=""/>
-        <p:cNvGrpSpPr/>
-        <p:nvPr/>
-      </p:nvGrpSpPr>
-      <p:grpSpPr>
-        <a:xfrm>
-          <a:off x="0" y="0"/>
-          <a:ext cx="0" cy="0"/>
-          <a:chOff x="0" y="0"/>
-          <a:chExt cx="0" cy="0"/>
-        </a:xfrm>
-      </p:grpSpPr>
-      <p:sp>
-        <p:nvSpPr>
-          <p:cNvPr id="2" name="Title 1">
-            <a:extLst>
-              <a:ext uri="{FF2B5EF4-FFF2-40B4-BE49-F238E27FC236}">
-                <a16:creationId xmlns:a16="http://schemas.microsoft.com/office/drawing/2014/main" id="{2C22A208-6BC1-4D7F-825D-4B9C6AEF3B4E}"/>
-              </a:ext>
-            </a:extLst>
-          </p:cNvPr>
-          <p:cNvSpPr>
-            <a:spLocks noGrp="1"/>
-          </p:cNvSpPr>
-          <p:nvPr>
-            <p:ph type="title"/>
-          </p:nvPr>
-        </p:nvSpPr>
-        <p:spPr>
-          <a:xfrm>
-            <a:off x="1337605" y="686710"/>
-            <a:ext cx="10141631" cy="615865"/>
-          </a:xfrm>
-        </p:spPr>
-        <p:txBody>
-          <a:bodyPr>
-            <a:normAutofit/>
-          </a:bodyPr>
-          <a:lstStyle/>
-          <a:p>
-            <a:r>
-              <a:rPr lang="en-US" sz="2800" dirty="0"/>
-              <a:t>Patient Satisfaction by Ownership Type</a:t>
-            </a:r>
-          </a:p>
-        </p:txBody>
-      </p:sp>
-      <p:sp>
-        <p:nvSpPr>
-          <p:cNvPr id="3" name="Rectangle 2">
-            <a:extLst>
-              <a:ext uri="{FF2B5EF4-FFF2-40B4-BE49-F238E27FC236}">
-                <a16:creationId xmlns:a16="http://schemas.microsoft.com/office/drawing/2014/main" id="{C4BE70F4-B7C8-4B58-B8C3-28356F1C1AD6}"/>
-              </a:ext>
-            </a:extLst>
-          </p:cNvPr>
-          <p:cNvSpPr/>
-          <p:nvPr/>
-        </p:nvSpPr>
-        <p:spPr>
-          <a:xfrm>
-            <a:off x="844062" y="1533375"/>
-            <a:ext cx="2110153" cy="1754326"/>
-          </a:xfrm>
-          <a:prstGeom prst="rect">
-            <a:avLst/>
-          </a:prstGeom>
-        </p:spPr>
-        <p:txBody>
-          <a:bodyPr wrap="square">
-            <a:spAutoFit/>
-          </a:bodyPr>
-          <a:lstStyle/>
-          <a:p>
-            <a:r>
-              <a:rPr lang="en-US" dirty="0"/>
-              <a:t>Physicians Owned Hospitals had highest percentage rated above national average in terms of patient  satisfaction  </a:t>
-            </a:r>
-          </a:p>
-        </p:txBody>
-      </p:sp>
-      <p:pic>
-        <p:nvPicPr>
-          <p:cNvPr id="11274" name="Picture 10">
-            <a:extLst>
-              <a:ext uri="{FF2B5EF4-FFF2-40B4-BE49-F238E27FC236}">
-                <a16:creationId xmlns:a16="http://schemas.microsoft.com/office/drawing/2014/main" id="{D03867F4-A4D3-4A5B-8029-6A0901B89E23}"/>
-              </a:ext>
-            </a:extLst>
-          </p:cNvPr>
-          <p:cNvPicPr>
-            <a:picLocks noGrp="1" noChangeAspect="1" noChangeArrowheads="1"/>
-          </p:cNvPicPr>
-          <p:nvPr>
-            <p:ph idx="1"/>
-          </p:nvPr>
-        </p:nvPicPr>
-        <p:blipFill>
-          <a:blip r:embed="rId2">
-            <a:extLst>
-              <a:ext uri="{28A0092B-C50C-407E-A947-70E740481C1C}">
-                <a14:useLocalDpi xmlns:a14="http://schemas.microsoft.com/office/drawing/2010/main" val="0"/>
-              </a:ext>
-            </a:extLst>
-          </a:blip>
-          <a:srcRect/>
-          <a:stretch>
-            <a:fillRect/>
-          </a:stretch>
-        </p:blipFill>
-        <p:spPr bwMode="auto">
-          <a:xfrm>
-            <a:off x="2355850" y="2166425"/>
-            <a:ext cx="8361912" cy="3708913"/>
-          </a:xfrm>
-          <a:prstGeom prst="rect">
-            <a:avLst/>
-          </a:prstGeom>
-          <a:noFill/>
-          <a:extLst>
-            <a:ext uri="{909E8E84-426E-40DD-AFC4-6F175D3DCCD1}">
-              <a14:hiddenFill xmlns:a14="http://schemas.microsoft.com/office/drawing/2010/main">
-                <a:solidFill>
-                  <a:srgbClr val="FFFFFF"/>
-                </a:solidFill>
-              </a14:hiddenFill>
-            </a:ext>
-          </a:extLst>
-        </p:spPr>
-      </p:pic>
-    </p:spTree>
-    <p:extLst>
-      <p:ext uri="{BB962C8B-B14F-4D97-AF65-F5344CB8AC3E}">
-        <p14:creationId xmlns:p14="http://schemas.microsoft.com/office/powerpoint/2010/main" val="4096270236"/>
-      </p:ext>
-    </p:extLst>
-  </p:cSld>
-  <p:clrMapOvr>
-    <a:masterClrMapping/>
-  </p:clrMapOvr>
-</p:sld>
-</file>
-
-<file path=ppt/slides/slide18.xml><?xml version="1.0" encoding="utf-8"?>
-<p:sld xmlns:a="http://schemas.openxmlformats.org/drawingml/2006/main" xmlns:r="http://schemas.openxmlformats.org/officeDocument/2006/relationships" xmlns:p="http://schemas.openxmlformats.org/presentationml/2006/main">
-  <p:cSld>
-    <p:spTree>
-      <p:nvGrpSpPr>
-        <p:cNvPr id="1" name=""/>
-        <p:cNvGrpSpPr/>
-        <p:nvPr/>
-      </p:nvGrpSpPr>
-      <p:grpSpPr>
-        <a:xfrm>
-          <a:off x="0" y="0"/>
-          <a:ext cx="0" cy="0"/>
-          <a:chOff x="0" y="0"/>
-          <a:chExt cx="0" cy="0"/>
-        </a:xfrm>
-      </p:grpSpPr>
-      <p:sp>
-        <p:nvSpPr>
-          <p:cNvPr id="2" name="Title 1">
-            <a:extLst>
-              <a:ext uri="{FF2B5EF4-FFF2-40B4-BE49-F238E27FC236}">
-                <a16:creationId xmlns:a16="http://schemas.microsoft.com/office/drawing/2014/main" id="{2C22A208-6BC1-4D7F-825D-4B9C6AEF3B4E}"/>
-              </a:ext>
-            </a:extLst>
-          </p:cNvPr>
-          <p:cNvSpPr>
-            <a:spLocks noGrp="1"/>
-          </p:cNvSpPr>
-          <p:nvPr>
-            <p:ph type="title"/>
-          </p:nvPr>
-        </p:nvSpPr>
-        <p:spPr>
-          <a:xfrm>
-            <a:off x="1323537" y="504205"/>
-            <a:ext cx="10141631" cy="478457"/>
-          </a:xfrm>
-        </p:spPr>
-        <p:txBody>
-          <a:bodyPr>
-            <a:normAutofit fontScale="90000"/>
-          </a:bodyPr>
-          <a:lstStyle/>
-          <a:p>
-            <a:r>
-              <a:rPr lang="en-US" sz="2800" dirty="0"/>
-              <a:t>Median Charge by Level of Star</a:t>
-            </a:r>
-          </a:p>
-        </p:txBody>
-      </p:sp>
-      <p:sp>
-        <p:nvSpPr>
-          <p:cNvPr id="3" name="Rectangle 2">
-            <a:extLst>
-              <a:ext uri="{FF2B5EF4-FFF2-40B4-BE49-F238E27FC236}">
-                <a16:creationId xmlns:a16="http://schemas.microsoft.com/office/drawing/2014/main" id="{C4BE70F4-B7C8-4B58-B8C3-28356F1C1AD6}"/>
-              </a:ext>
-            </a:extLst>
-          </p:cNvPr>
-          <p:cNvSpPr/>
-          <p:nvPr/>
-        </p:nvSpPr>
-        <p:spPr>
-          <a:xfrm>
-            <a:off x="844062" y="1533376"/>
-            <a:ext cx="2475913" cy="923330"/>
-          </a:xfrm>
-          <a:prstGeom prst="rect">
-            <a:avLst/>
-          </a:prstGeom>
-        </p:spPr>
-        <p:txBody>
-          <a:bodyPr wrap="square">
-            <a:spAutoFit/>
-          </a:bodyPr>
-          <a:lstStyle/>
-          <a:p>
-            <a:r>
-              <a:rPr lang="en-US" dirty="0"/>
-              <a:t>Lower Star Hospitals Higher Median Charge, Except Star-3</a:t>
-            </a:r>
-          </a:p>
-        </p:txBody>
-      </p:sp>
-      <p:pic>
-        <p:nvPicPr>
-          <p:cNvPr id="12296" name="Picture 8">
-            <a:extLst>
-              <a:ext uri="{FF2B5EF4-FFF2-40B4-BE49-F238E27FC236}">
-                <a16:creationId xmlns:a16="http://schemas.microsoft.com/office/drawing/2014/main" id="{D3CAD3DA-57EB-4811-B7DF-5B1F7B70FE15}"/>
-              </a:ext>
-            </a:extLst>
-          </p:cNvPr>
-          <p:cNvPicPr>
-            <a:picLocks noGrp="1" noChangeAspect="1" noChangeArrowheads="1"/>
-          </p:cNvPicPr>
-          <p:nvPr>
-            <p:ph idx="1"/>
-          </p:nvPr>
-        </p:nvPicPr>
-        <p:blipFill>
-          <a:blip r:embed="rId2">
-            <a:extLst>
-              <a:ext uri="{28A0092B-C50C-407E-A947-70E740481C1C}">
-                <a14:useLocalDpi xmlns:a14="http://schemas.microsoft.com/office/drawing/2010/main" val="0"/>
-              </a:ext>
-            </a:extLst>
-          </a:blip>
-          <a:srcRect/>
-          <a:stretch>
-            <a:fillRect/>
-          </a:stretch>
-        </p:blipFill>
-        <p:spPr bwMode="auto">
-          <a:xfrm>
-            <a:off x="3650693" y="2111947"/>
-            <a:ext cx="5549578" cy="3762181"/>
+            <a:off x="3836685" y="1172663"/>
+            <a:ext cx="6404595" cy="4702675"/>
           </a:xfrm>
           <a:prstGeom prst="rect">
             <a:avLst/>
@@ -7247,7 +6919,7 @@
 </p:sld>
 </file>
 
-<file path=ppt/slides/slide19.xml><?xml version="1.0" encoding="utf-8"?>
+<file path=ppt/slides/slide17.xml><?xml version="1.0" encoding="utf-8"?>
 <p:sld xmlns:a="http://schemas.openxmlformats.org/drawingml/2006/main" xmlns:r="http://schemas.openxmlformats.org/officeDocument/2006/relationships" xmlns:p="http://schemas.openxmlformats.org/presentationml/2006/main">
   <p:cSld>
     <p:spTree>
@@ -7288,6 +6960,138 @@
         </p:spPr>
         <p:txBody>
           <a:bodyPr>
+            <a:noAutofit/>
+          </a:bodyPr>
+          <a:lstStyle/>
+          <a:p>
+            <a:r>
+              <a:rPr lang="en-US" sz="2800" b="1" dirty="0"/>
+              <a:t>Test, Train data and Models </a:t>
+            </a:r>
+          </a:p>
+        </p:txBody>
+      </p:sp>
+      <p:sp>
+        <p:nvSpPr>
+          <p:cNvPr id="3" name="Content Placeholder 2">
+            <a:extLst>
+              <a:ext uri="{FF2B5EF4-FFF2-40B4-BE49-F238E27FC236}">
+                <a16:creationId xmlns:a16="http://schemas.microsoft.com/office/drawing/2014/main" id="{D53C412D-A6B7-4C32-A327-6CEC775C2CB3}"/>
+              </a:ext>
+            </a:extLst>
+          </p:cNvPr>
+          <p:cNvSpPr>
+            <a:spLocks noGrp="1"/>
+          </p:cNvSpPr>
+          <p:nvPr>
+            <p:ph idx="1"/>
+          </p:nvPr>
+        </p:nvSpPr>
+        <p:spPr>
+          <a:xfrm>
+            <a:off x="647114" y="2447778"/>
+            <a:ext cx="10944664" cy="3559126"/>
+          </a:xfrm>
+        </p:spPr>
+        <p:txBody>
+          <a:bodyPr>
+            <a:noAutofit/>
+          </a:bodyPr>
+          <a:lstStyle/>
+          <a:p>
+            <a:r>
+              <a:rPr lang="en-US" sz="2000" dirty="0"/>
+              <a:t>Data Grouped by County (1121 counties) </a:t>
+            </a:r>
+          </a:p>
+          <a:p>
+            <a:r>
+              <a:rPr lang="en-US" sz="2000" dirty="0"/>
+              <a:t>0.33 % Test Data</a:t>
+            </a:r>
+          </a:p>
+          <a:p>
+            <a:r>
+              <a:rPr lang="en-US" sz="2000" b="1" dirty="0"/>
+              <a:t>Target Variable</a:t>
+            </a:r>
+            <a:r>
+              <a:rPr lang="en-US" sz="2000" dirty="0"/>
+              <a:t>: Mean of Average Submitted Hospital Charges</a:t>
+            </a:r>
+          </a:p>
+          <a:p>
+            <a:r>
+              <a:rPr lang="en-US" sz="2000" b="1" dirty="0"/>
+              <a:t>Features</a:t>
+            </a:r>
+            <a:r>
+              <a:rPr lang="en-US" sz="2000" dirty="0"/>
+              <a:t>: % 65 and over, % African American, % Non-Hispanic White, Household Income, other to PCP Rate, %Uninsured Adults, % Uninsured children,  # MV Deaths, #Drug Over  Deaths, Drug Overdose Mortality Rate, % Limited Access to Healthy Foods, % Diabetic, % Rural.</a:t>
+            </a:r>
+          </a:p>
+          <a:p>
+            <a:r>
+              <a:rPr lang="en-US" sz="2000" dirty="0"/>
+              <a:t>Lasso Model, Linear Regression ,Random Forest</a:t>
+            </a:r>
+          </a:p>
+        </p:txBody>
+      </p:sp>
+    </p:spTree>
+    <p:extLst>
+      <p:ext uri="{BB962C8B-B14F-4D97-AF65-F5344CB8AC3E}">
+        <p14:creationId xmlns:p14="http://schemas.microsoft.com/office/powerpoint/2010/main" val="2267032545"/>
+      </p:ext>
+    </p:extLst>
+  </p:cSld>
+  <p:clrMapOvr>
+    <a:masterClrMapping/>
+  </p:clrMapOvr>
+</p:sld>
+</file>
+
+<file path=ppt/slides/slide18.xml><?xml version="1.0" encoding="utf-8"?>
+<p:sld xmlns:a="http://schemas.openxmlformats.org/drawingml/2006/main" xmlns:r="http://schemas.openxmlformats.org/officeDocument/2006/relationships" xmlns:p="http://schemas.openxmlformats.org/presentationml/2006/main">
+  <p:cSld>
+    <p:spTree>
+      <p:nvGrpSpPr>
+        <p:cNvPr id="1" name=""/>
+        <p:cNvGrpSpPr/>
+        <p:nvPr/>
+      </p:nvGrpSpPr>
+      <p:grpSpPr>
+        <a:xfrm>
+          <a:off x="0" y="0"/>
+          <a:ext cx="0" cy="0"/>
+          <a:chOff x="0" y="0"/>
+          <a:chExt cx="0" cy="0"/>
+        </a:xfrm>
+      </p:grpSpPr>
+      <p:sp>
+        <p:nvSpPr>
+          <p:cNvPr id="2" name="Title 1">
+            <a:extLst>
+              <a:ext uri="{FF2B5EF4-FFF2-40B4-BE49-F238E27FC236}">
+                <a16:creationId xmlns:a16="http://schemas.microsoft.com/office/drawing/2014/main" id="{2C22A208-6BC1-4D7F-825D-4B9C6AEF3B4E}"/>
+              </a:ext>
+            </a:extLst>
+          </p:cNvPr>
+          <p:cNvSpPr>
+            <a:spLocks noGrp="1"/>
+          </p:cNvSpPr>
+          <p:nvPr>
+            <p:ph type="title"/>
+          </p:nvPr>
+        </p:nvSpPr>
+        <p:spPr>
+          <a:xfrm>
+            <a:off x="1323537" y="504205"/>
+            <a:ext cx="10141631" cy="478457"/>
+          </a:xfrm>
+        </p:spPr>
+        <p:txBody>
+          <a:bodyPr>
             <a:normAutofit fontScale="90000"/>
           </a:bodyPr>
           <a:lstStyle/>
@@ -7301,19 +7105,17 @@
       </p:sp>
       <p:pic>
         <p:nvPicPr>
-          <p:cNvPr id="14338" name="Picture 2">
+          <p:cNvPr id="6146" name="Picture 2">
             <a:extLst>
               <a:ext uri="{FF2B5EF4-FFF2-40B4-BE49-F238E27FC236}">
-                <a16:creationId xmlns:a16="http://schemas.microsoft.com/office/drawing/2014/main" id="{3ED31245-BA8F-4EFC-BBB1-AC1D6668CBE7}"/>
+                <a16:creationId xmlns:a16="http://schemas.microsoft.com/office/drawing/2014/main" id="{2B9098CB-8B10-4421-9CBD-E51C4E57D51C}"/>
               </a:ext>
             </a:extLst>
           </p:cNvPr>
           <p:cNvPicPr>
-            <a:picLocks noGrp="1" noChangeAspect="1" noChangeArrowheads="1"/>
+            <a:picLocks noChangeAspect="1" noChangeArrowheads="1"/>
           </p:cNvPicPr>
-          <p:nvPr>
-            <p:ph idx="1"/>
-          </p:nvPr>
+          <p:nvPr/>
         </p:nvPicPr>
         <p:blipFill>
           <a:blip r:embed="rId2">
@@ -7330,8 +7132,8 @@
         </p:blipFill>
         <p:spPr bwMode="auto">
           <a:xfrm>
-            <a:off x="3756074" y="925474"/>
-            <a:ext cx="6203853" cy="5062405"/>
+            <a:off x="3590121" y="1049544"/>
+            <a:ext cx="6313533" cy="5304251"/>
           </a:xfrm>
           <a:prstGeom prst="rect">
             <a:avLst/>
@@ -7361,7 +7163,7 @@
 </p:sld>
 </file>
 
-<file path=ppt/slides/slide2.xml><?xml version="1.0" encoding="utf-8"?>
+<file path=ppt/slides/slide19.xml><?xml version="1.0" encoding="utf-8"?>
 <p:sld xmlns:a="http://schemas.openxmlformats.org/drawingml/2006/main" xmlns:r="http://schemas.openxmlformats.org/officeDocument/2006/relationships" xmlns:p="http://schemas.openxmlformats.org/presentationml/2006/main">
   <p:cSld>
     <p:spTree>
@@ -7396,8 +7198,8 @@
         </p:nvSpPr>
         <p:spPr>
           <a:xfrm>
-            <a:off x="717452" y="1104313"/>
-            <a:ext cx="10761783" cy="724487"/>
+            <a:off x="1323537" y="504205"/>
+            <a:ext cx="10141631" cy="478457"/>
           </a:xfrm>
         </p:spPr>
         <p:txBody>
@@ -7407,369 +7209,18 @@
           <a:lstStyle/>
           <a:p>
             <a:r>
-              <a:rPr lang="en-US" sz="3600" dirty="0"/>
-              <a:t>Why there are variations in Hospital charge for same Procedures? </a:t>
-            </a:r>
-          </a:p>
-        </p:txBody>
-      </p:sp>
-      <p:sp>
-        <p:nvSpPr>
-          <p:cNvPr id="3" name="Subtitle 2">
+              <a:rPr lang="en-US" sz="2800" dirty="0"/>
+              <a:t>Lasso Regression Result</a:t>
+            </a:r>
+          </a:p>
+        </p:txBody>
+      </p:sp>
+      <p:pic>
+        <p:nvPicPr>
+          <p:cNvPr id="5122" name="Picture 2">
             <a:extLst>
               <a:ext uri="{FF2B5EF4-FFF2-40B4-BE49-F238E27FC236}">
-                <a16:creationId xmlns:a16="http://schemas.microsoft.com/office/drawing/2014/main" id="{50287541-7128-4942-8D8A-3F37DC35086A}"/>
-              </a:ext>
-            </a:extLst>
-          </p:cNvPr>
-          <p:cNvSpPr>
-            <a:spLocks noGrp="1"/>
-          </p:cNvSpPr>
-          <p:nvPr>
-            <p:ph idx="1"/>
-          </p:nvPr>
-        </p:nvSpPr>
-        <p:spPr>
-          <a:xfrm>
-            <a:off x="1069145" y="2447778"/>
-            <a:ext cx="10199077" cy="3784209"/>
-          </a:xfrm>
-        </p:spPr>
-        <p:txBody>
-          <a:bodyPr>
-            <a:normAutofit fontScale="77500" lnSpcReduction="20000"/>
-          </a:bodyPr>
-          <a:lstStyle/>
-          <a:p>
-            <a:pPr marL="0" indent="0">
-              <a:buNone/>
-            </a:pPr>
-            <a:r>
-              <a:rPr lang="en-US" dirty="0"/>
-              <a:t> </a:t>
-            </a:r>
-            <a:r>
-              <a:rPr lang="en-US" b="1" dirty="0"/>
-              <a:t>Monopolistic Competition in Healthcare Sector</a:t>
-            </a:r>
-          </a:p>
-          <a:p>
-            <a:pPr lvl="1">
-              <a:buFont typeface="Wingdings" panose="05000000000000000000" pitchFamily="2" charset="2"/>
-              <a:buChar char="§"/>
-            </a:pPr>
-            <a:r>
-              <a:rPr lang="en-US" sz="2600" dirty="0"/>
-              <a:t>Monopolistic competition that allows providers to set their own prices for same procedures.</a:t>
-            </a:r>
-          </a:p>
-          <a:p>
-            <a:pPr lvl="1">
-              <a:buFont typeface="Wingdings" panose="05000000000000000000" pitchFamily="2" charset="2"/>
-              <a:buChar char="§"/>
-            </a:pPr>
-            <a:r>
-              <a:rPr lang="en-US" sz="2600" dirty="0"/>
-              <a:t> The monopolistic power to the providers comes from either real or perceived differences in quality of medical and related services. </a:t>
-            </a:r>
-          </a:p>
-          <a:p>
-            <a:pPr lvl="1">
-              <a:buFont typeface="Wingdings" panose="05000000000000000000" pitchFamily="2" charset="2"/>
-              <a:buChar char="§"/>
-            </a:pPr>
-            <a:r>
-              <a:rPr lang="en-US" sz="2600" dirty="0"/>
-              <a:t>In health sector new technologies can also be used to signal quality even when their clinical usefulness is not proven.</a:t>
-            </a:r>
-          </a:p>
-          <a:p>
-            <a:pPr marL="0" indent="0">
-              <a:buNone/>
-            </a:pPr>
-            <a:r>
-              <a:rPr lang="en-US" b="1" dirty="0"/>
-              <a:t>Cost Shifting : </a:t>
-            </a:r>
-            <a:r>
-              <a:rPr lang="en-US" dirty="0"/>
-              <a:t>charging the insured patients more to compensate less collections from uninsured people</a:t>
-            </a:r>
-            <a:r>
-              <a:rPr lang="en-US" b="1" dirty="0"/>
-              <a:t>.</a:t>
-            </a:r>
-          </a:p>
-          <a:p>
-            <a:pPr marL="0" indent="0">
-              <a:buNone/>
-            </a:pPr>
-            <a:r>
-              <a:rPr lang="en-US" b="1" dirty="0"/>
-              <a:t>Over Head Cost and Technology</a:t>
-            </a:r>
-            <a:r>
-              <a:rPr lang="en-US" dirty="0"/>
-              <a:t>: Facilities with more specialized headcounts or using latest technology may charge higher. </a:t>
-            </a:r>
-          </a:p>
-          <a:p>
-            <a:pPr marL="0" indent="0">
-              <a:buNone/>
-            </a:pPr>
-            <a:r>
-              <a:rPr lang="en-US" b="1" dirty="0"/>
-              <a:t>Location of Operation: </a:t>
-            </a:r>
-            <a:r>
-              <a:rPr lang="en-US" dirty="0"/>
-              <a:t>Hospitals in Urban areas may charge higher to compensate cost of operations and wage differences. </a:t>
-            </a:r>
-          </a:p>
-          <a:p>
-            <a:pPr marL="0" indent="0">
-              <a:buNone/>
-            </a:pPr>
-            <a:endParaRPr lang="en-US" b="1" dirty="0"/>
-          </a:p>
-          <a:p>
-            <a:pPr marL="457200" lvl="1" indent="0">
-              <a:buNone/>
-            </a:pPr>
-            <a:endParaRPr lang="en-US" dirty="0"/>
-          </a:p>
-        </p:txBody>
-      </p:sp>
-    </p:spTree>
-    <p:extLst>
-      <p:ext uri="{BB962C8B-B14F-4D97-AF65-F5344CB8AC3E}">
-        <p14:creationId xmlns:p14="http://schemas.microsoft.com/office/powerpoint/2010/main" val="464912914"/>
-      </p:ext>
-    </p:extLst>
-  </p:cSld>
-  <p:clrMapOvr>
-    <a:masterClrMapping/>
-  </p:clrMapOvr>
-</p:sld>
-</file>
-
-<file path=ppt/slides/slide20.xml><?xml version="1.0" encoding="utf-8"?>
-<p:sld xmlns:a="http://schemas.openxmlformats.org/drawingml/2006/main" xmlns:r="http://schemas.openxmlformats.org/officeDocument/2006/relationships" xmlns:p="http://schemas.openxmlformats.org/presentationml/2006/main">
-  <p:cSld>
-    <p:spTree>
-      <p:nvGrpSpPr>
-        <p:cNvPr id="1" name=""/>
-        <p:cNvGrpSpPr/>
-        <p:nvPr/>
-      </p:nvGrpSpPr>
-      <p:grpSpPr>
-        <a:xfrm>
-          <a:off x="0" y="0"/>
-          <a:ext cx="0" cy="0"/>
-          <a:chOff x="0" y="0"/>
-          <a:chExt cx="0" cy="0"/>
-        </a:xfrm>
-      </p:grpSpPr>
-      <p:sp>
-        <p:nvSpPr>
-          <p:cNvPr id="2" name="Title 1">
-            <a:extLst>
-              <a:ext uri="{FF2B5EF4-FFF2-40B4-BE49-F238E27FC236}">
-                <a16:creationId xmlns:a16="http://schemas.microsoft.com/office/drawing/2014/main" id="{2C22A208-6BC1-4D7F-825D-4B9C6AEF3B4E}"/>
-              </a:ext>
-            </a:extLst>
-          </p:cNvPr>
-          <p:cNvSpPr>
-            <a:spLocks noGrp="1"/>
-          </p:cNvSpPr>
-          <p:nvPr>
-            <p:ph type="title"/>
-          </p:nvPr>
-        </p:nvSpPr>
-        <p:spPr>
-          <a:xfrm>
-            <a:off x="1323537" y="504205"/>
-            <a:ext cx="10141631" cy="478457"/>
-          </a:xfrm>
-        </p:spPr>
-        <p:txBody>
-          <a:bodyPr>
-            <a:noAutofit/>
-          </a:bodyPr>
-          <a:lstStyle/>
-          <a:p>
-            <a:r>
-              <a:rPr lang="en-US" sz="2800" b="1" dirty="0"/>
-              <a:t>Test, Train data and Models </a:t>
-            </a:r>
-          </a:p>
-        </p:txBody>
-      </p:sp>
-      <p:sp>
-        <p:nvSpPr>
-          <p:cNvPr id="3" name="Content Placeholder 2">
-            <a:extLst>
-              <a:ext uri="{FF2B5EF4-FFF2-40B4-BE49-F238E27FC236}">
-                <a16:creationId xmlns:a16="http://schemas.microsoft.com/office/drawing/2014/main" id="{D53C412D-A6B7-4C32-A327-6CEC775C2CB3}"/>
-              </a:ext>
-            </a:extLst>
-          </p:cNvPr>
-          <p:cNvSpPr>
-            <a:spLocks noGrp="1"/>
-          </p:cNvSpPr>
-          <p:nvPr>
-            <p:ph idx="1"/>
-          </p:nvPr>
-        </p:nvSpPr>
-        <p:spPr>
-          <a:xfrm>
-            <a:off x="1295401" y="2423886"/>
-            <a:ext cx="9648370" cy="3451982"/>
-          </a:xfrm>
-        </p:spPr>
-        <p:txBody>
-          <a:bodyPr>
-            <a:normAutofit fontScale="85000" lnSpcReduction="10000"/>
-          </a:bodyPr>
-          <a:lstStyle/>
-          <a:p>
-            <a:r>
-              <a:rPr lang="en-US" sz="2000" dirty="0"/>
-              <a:t>Data Grouped by County (1121 counties) </a:t>
-            </a:r>
-          </a:p>
-          <a:p>
-            <a:r>
-              <a:rPr lang="en-US" sz="2000" dirty="0"/>
-              <a:t>0.33 % Test Data</a:t>
-            </a:r>
-          </a:p>
-          <a:p>
-            <a:r>
-              <a:rPr lang="en-US" sz="2000" b="1" dirty="0"/>
-              <a:t>Target Variable</a:t>
-            </a:r>
-            <a:r>
-              <a:rPr lang="en-US" sz="2000" dirty="0"/>
-              <a:t>: Mean of Average Submitted Hospital Charges</a:t>
-            </a:r>
-          </a:p>
-          <a:p>
-            <a:r>
-              <a:rPr lang="en-US" sz="2000" b="1" dirty="0"/>
-              <a:t>Features</a:t>
-            </a:r>
-            <a:r>
-              <a:rPr lang="en-US" sz="2000" dirty="0"/>
-              <a:t>: % 65 and over, % African American, % Non-Hispanic White, Household Income, other to PCP Rate, %Uninsured Adults, % Uninsured children,  # MV Deaths, #Drug Over  Deaths, Drug Overdose Mortality Rate, % Limited Access to Healthy Foods, % Diabetic, % Rural.</a:t>
-            </a:r>
-          </a:p>
-          <a:p>
-            <a:r>
-              <a:rPr lang="en-US" sz="2000" dirty="0"/>
-              <a:t>Lasso Model</a:t>
-            </a:r>
-          </a:p>
-          <a:p>
-            <a:r>
-              <a:rPr lang="en-US" sz="2000" dirty="0"/>
-              <a:t>Linear Regression in sklearn </a:t>
-            </a:r>
-          </a:p>
-          <a:p>
-            <a:r>
-              <a:rPr lang="en-US" sz="2000" dirty="0"/>
-              <a:t>OLS Model</a:t>
-            </a:r>
-          </a:p>
-          <a:p>
-            <a:r>
-              <a:rPr lang="en-US" sz="2000" dirty="0"/>
-              <a:t>Random Forest</a:t>
-            </a:r>
-          </a:p>
-          <a:p>
-            <a:endParaRPr lang="en-US" dirty="0"/>
-          </a:p>
-          <a:p>
-            <a:endParaRPr lang="en-US" dirty="0"/>
-          </a:p>
-          <a:p>
-            <a:endParaRPr lang="en-US" dirty="0"/>
-          </a:p>
-        </p:txBody>
-      </p:sp>
-    </p:spTree>
-    <p:extLst>
-      <p:ext uri="{BB962C8B-B14F-4D97-AF65-F5344CB8AC3E}">
-        <p14:creationId xmlns:p14="http://schemas.microsoft.com/office/powerpoint/2010/main" val="2267032545"/>
-      </p:ext>
-    </p:extLst>
-  </p:cSld>
-  <p:clrMapOvr>
-    <a:masterClrMapping/>
-  </p:clrMapOvr>
-</p:sld>
-</file>
-
-<file path=ppt/slides/slide21.xml><?xml version="1.0" encoding="utf-8"?>
-<p:sld xmlns:a="http://schemas.openxmlformats.org/drawingml/2006/main" xmlns:r="http://schemas.openxmlformats.org/officeDocument/2006/relationships" xmlns:p="http://schemas.openxmlformats.org/presentationml/2006/main">
-  <p:cSld>
-    <p:spTree>
-      <p:nvGrpSpPr>
-        <p:cNvPr id="1" name=""/>
-        <p:cNvGrpSpPr/>
-        <p:nvPr/>
-      </p:nvGrpSpPr>
-      <p:grpSpPr>
-        <a:xfrm>
-          <a:off x="0" y="0"/>
-          <a:ext cx="0" cy="0"/>
-          <a:chOff x="0" y="0"/>
-          <a:chExt cx="0" cy="0"/>
-        </a:xfrm>
-      </p:grpSpPr>
-      <p:sp>
-        <p:nvSpPr>
-          <p:cNvPr id="2" name="Title 1">
-            <a:extLst>
-              <a:ext uri="{FF2B5EF4-FFF2-40B4-BE49-F238E27FC236}">
-                <a16:creationId xmlns:a16="http://schemas.microsoft.com/office/drawing/2014/main" id="{2C22A208-6BC1-4D7F-825D-4B9C6AEF3B4E}"/>
-              </a:ext>
-            </a:extLst>
-          </p:cNvPr>
-          <p:cNvSpPr>
-            <a:spLocks noGrp="1"/>
-          </p:cNvSpPr>
-          <p:nvPr>
-            <p:ph type="title"/>
-          </p:nvPr>
-        </p:nvSpPr>
-        <p:spPr>
-          <a:xfrm>
-            <a:off x="1323537" y="504205"/>
-            <a:ext cx="10141631" cy="478457"/>
-          </a:xfrm>
-        </p:spPr>
-        <p:txBody>
-          <a:bodyPr>
-            <a:normAutofit fontScale="90000"/>
-          </a:bodyPr>
-          <a:lstStyle/>
-          <a:p>
-            <a:r>
-              <a:rPr lang="en-US" sz="2800" dirty="0"/>
-              <a:t>Lasso Regression Result</a:t>
-            </a:r>
-          </a:p>
-        </p:txBody>
-      </p:sp>
-      <p:pic>
-        <p:nvPicPr>
-          <p:cNvPr id="15364" name="Picture 4">
-            <a:extLst>
-              <a:ext uri="{FF2B5EF4-FFF2-40B4-BE49-F238E27FC236}">
-                <a16:creationId xmlns:a16="http://schemas.microsoft.com/office/drawing/2014/main" id="{3057218A-603F-4061-BACF-87B6DB6FAE1C}"/>
+                <a16:creationId xmlns:a16="http://schemas.microsoft.com/office/drawing/2014/main" id="{46A7E73E-66C8-41DB-94F6-7A1B063FD9CF}"/>
               </a:ext>
             </a:extLst>
           </p:cNvPr>
@@ -7795,8 +7246,8 @@
         </p:blipFill>
         <p:spPr bwMode="auto">
           <a:xfrm>
-            <a:off x="3671668" y="973752"/>
-            <a:ext cx="5725551" cy="5380044"/>
+            <a:off x="3319976" y="1139482"/>
+            <a:ext cx="5613010" cy="5144432"/>
           </a:xfrm>
           <a:prstGeom prst="rect">
             <a:avLst/>
@@ -7813,6 +7264,41 @@
           </a:extLst>
         </p:spPr>
       </p:pic>
+      <p:sp>
+        <p:nvSpPr>
+          <p:cNvPr id="4" name="TextBox 3">
+            <a:extLst>
+              <a:ext uri="{FF2B5EF4-FFF2-40B4-BE49-F238E27FC236}">
+                <a16:creationId xmlns:a16="http://schemas.microsoft.com/office/drawing/2014/main" id="{73FEFD2A-F3AC-400D-B9C6-93758502D165}"/>
+              </a:ext>
+            </a:extLst>
+          </p:cNvPr>
+          <p:cNvSpPr txBox="1"/>
+          <p:nvPr/>
+        </p:nvSpPr>
+        <p:spPr>
+          <a:xfrm>
+            <a:off x="703385" y="2715065"/>
+            <a:ext cx="2616591" cy="646331"/>
+          </a:xfrm>
+          <a:prstGeom prst="rect">
+            <a:avLst/>
+          </a:prstGeom>
+          <a:noFill/>
+        </p:spPr>
+        <p:txBody>
+          <a:bodyPr wrap="square" rtlCol="0">
+            <a:spAutoFit/>
+          </a:bodyPr>
+          <a:lstStyle/>
+          <a:p>
+            <a:r>
+              <a:rPr lang="en-US" dirty="0"/>
+              <a:t>Lasso Regression didn’t drop any variables.</a:t>
+            </a:r>
+          </a:p>
+        </p:txBody>
+      </p:sp>
     </p:spTree>
     <p:extLst>
       <p:ext uri="{BB962C8B-B14F-4D97-AF65-F5344CB8AC3E}">
@@ -7826,7 +7312,148 @@
 </p:sld>
 </file>
 
-<file path=ppt/slides/slide22.xml><?xml version="1.0" encoding="utf-8"?>
+<file path=ppt/slides/slide2.xml><?xml version="1.0" encoding="utf-8"?>
+<p:sld xmlns:a="http://schemas.openxmlformats.org/drawingml/2006/main" xmlns:r="http://schemas.openxmlformats.org/officeDocument/2006/relationships" xmlns:p="http://schemas.openxmlformats.org/presentationml/2006/main">
+  <p:cSld>
+    <p:spTree>
+      <p:nvGrpSpPr>
+        <p:cNvPr id="1" name=""/>
+        <p:cNvGrpSpPr/>
+        <p:nvPr/>
+      </p:nvGrpSpPr>
+      <p:grpSpPr>
+        <a:xfrm>
+          <a:off x="0" y="0"/>
+          <a:ext cx="0" cy="0"/>
+          <a:chOff x="0" y="0"/>
+          <a:chExt cx="0" cy="0"/>
+        </a:xfrm>
+      </p:grpSpPr>
+      <p:sp>
+        <p:nvSpPr>
+          <p:cNvPr id="2" name="Title 1">
+            <a:extLst>
+              <a:ext uri="{FF2B5EF4-FFF2-40B4-BE49-F238E27FC236}">
+                <a16:creationId xmlns:a16="http://schemas.microsoft.com/office/drawing/2014/main" id="{2C22A208-6BC1-4D7F-825D-4B9C6AEF3B4E}"/>
+              </a:ext>
+            </a:extLst>
+          </p:cNvPr>
+          <p:cNvSpPr>
+            <a:spLocks noGrp="1"/>
+          </p:cNvSpPr>
+          <p:nvPr>
+            <p:ph type="title"/>
+          </p:nvPr>
+        </p:nvSpPr>
+        <p:spPr>
+          <a:xfrm>
+            <a:off x="717452" y="1104313"/>
+            <a:ext cx="10761783" cy="724487"/>
+          </a:xfrm>
+        </p:spPr>
+        <p:txBody>
+          <a:bodyPr>
+            <a:normAutofit/>
+          </a:bodyPr>
+          <a:lstStyle/>
+          <a:p>
+            <a:r>
+              <a:rPr lang="en-US" sz="3600" b="1" dirty="0"/>
+              <a:t>Summary</a:t>
+            </a:r>
+            <a:endParaRPr lang="en-US" sz="3600" dirty="0"/>
+          </a:p>
+        </p:txBody>
+      </p:sp>
+      <p:sp>
+        <p:nvSpPr>
+          <p:cNvPr id="3" name="Subtitle 2">
+            <a:extLst>
+              <a:ext uri="{FF2B5EF4-FFF2-40B4-BE49-F238E27FC236}">
+                <a16:creationId xmlns:a16="http://schemas.microsoft.com/office/drawing/2014/main" id="{50287541-7128-4942-8D8A-3F37DC35086A}"/>
+              </a:ext>
+            </a:extLst>
+          </p:cNvPr>
+          <p:cNvSpPr>
+            <a:spLocks noGrp="1"/>
+          </p:cNvSpPr>
+          <p:nvPr>
+            <p:ph idx="1"/>
+          </p:nvPr>
+        </p:nvSpPr>
+        <p:spPr>
+          <a:xfrm>
+            <a:off x="1237957" y="2489982"/>
+            <a:ext cx="10241278" cy="3742005"/>
+          </a:xfrm>
+        </p:spPr>
+        <p:txBody>
+          <a:bodyPr>
+            <a:noAutofit/>
+          </a:bodyPr>
+          <a:lstStyle/>
+          <a:p>
+            <a:pPr marL="0" indent="0">
+              <a:buNone/>
+            </a:pPr>
+            <a:r>
+              <a:rPr lang="en-US" sz="1700" b="1" dirty="0"/>
+              <a:t>With an aim to explore what explains variations in hospital charge for similar or same procedure, Medicare outpatient data  is combined with hospital information data obtained from CMS web and visualized the charge data by state and by procedures and mapped by range of charge. Compared distribution of charge for different procedure types. The comparison shows inter state and intra state level variations in hospital charge. Complex and expensive procedures have more variations than simple or less expensive procedures. </a:t>
+            </a:r>
+            <a:endParaRPr lang="en-US" sz="1700" dirty="0"/>
+          </a:p>
+          <a:p>
+            <a:pPr marL="0" indent="0">
+              <a:buNone/>
+            </a:pPr>
+            <a:r>
+              <a:rPr lang="en-US" sz="1700" b="1" dirty="0"/>
+              <a:t>Estimated the model using different Statistical models mainly Lasso Regression using </a:t>
+            </a:r>
+            <a:r>
+              <a:rPr lang="en-US" sz="1700" b="1" dirty="0" err="1"/>
+              <a:t>sklearn</a:t>
+            </a:r>
+            <a:r>
+              <a:rPr lang="en-US" sz="1700" b="1" dirty="0"/>
+              <a:t> machine learning tool and OLS linear regression.</a:t>
+            </a:r>
+            <a:endParaRPr lang="en-US" sz="1700" dirty="0"/>
+          </a:p>
+          <a:p>
+            <a:pPr marL="0" indent="0">
+              <a:buNone/>
+            </a:pPr>
+            <a:r>
+              <a:rPr lang="en-US" sz="1700" b="1" dirty="0"/>
+              <a:t>The goal of the prediction model is to see if there are county level health, social and economic factors explaining variations in average charge in USA counties.  The result indicates that counties with more % of uninsured population , % of over 65   and % of African-American charged more. In contrary, counties with more % of rural communities charged less. However, the model explains only 1/3 of variations in the hospital charge. This may imply hospital charge is more about market power of hospitals and other factors.  Including Cost to Charge ratio  in the prediction  would be a good move to test effect of market power of hospitals.</a:t>
+            </a:r>
+            <a:endParaRPr lang="en-US" sz="1700" dirty="0"/>
+          </a:p>
+          <a:p>
+            <a:br>
+              <a:rPr lang="en-US" sz="1700" dirty="0"/>
+            </a:br>
+            <a:endParaRPr lang="en-US" sz="1700" dirty="0">
+              <a:cs typeface="Arial" panose="020B0604020202020204" pitchFamily="34" charset="0"/>
+            </a:endParaRPr>
+          </a:p>
+        </p:txBody>
+      </p:sp>
+    </p:spTree>
+    <p:extLst>
+      <p:ext uri="{BB962C8B-B14F-4D97-AF65-F5344CB8AC3E}">
+        <p14:creationId xmlns:p14="http://schemas.microsoft.com/office/powerpoint/2010/main" val="464912914"/>
+      </p:ext>
+    </p:extLst>
+  </p:cSld>
+  <p:clrMapOvr>
+    <a:masterClrMapping/>
+  </p:clrMapOvr>
+</p:sld>
+</file>
+
+<file path=ppt/slides/slide20.xml><?xml version="1.0" encoding="utf-8"?>
 <p:sld xmlns:a="http://schemas.openxmlformats.org/drawingml/2006/main" xmlns:r="http://schemas.openxmlformats.org/officeDocument/2006/relationships" xmlns:p="http://schemas.openxmlformats.org/presentationml/2006/main">
   <p:cSld>
     <p:spTree>
@@ -11578,7 +11205,7 @@
 </p:sld>
 </file>
 
-<file path=ppt/slides/slide23.xml><?xml version="1.0" encoding="utf-8"?>
+<file path=ppt/slides/slide21.xml><?xml version="1.0" encoding="utf-8"?>
 <p:sld xmlns:a="http://schemas.openxmlformats.org/drawingml/2006/main" xmlns:r="http://schemas.openxmlformats.org/officeDocument/2006/relationships" xmlns:p="http://schemas.openxmlformats.org/presentationml/2006/main">
   <p:cSld>
     <p:spTree>
@@ -11690,14 +11317,14 @@
           <a:p>
             <a:r>
               <a:rPr lang="en-US" sz="2600" dirty="0"/>
-              <a:t>Take one Procedure and Do the whole Analysis for specific Procedure.</a:t>
-            </a:r>
-          </a:p>
-          <a:p>
-            <a:r>
-              <a:rPr lang="en-US" sz="2600" dirty="0"/>
-              <a:t>Trying to find market power indicator and include in the model(CCR data).</a:t>
-            </a:r>
+              <a:t>I will try to find market power indicators and include in the model(CCR data) to improve the good of fit of the models.</a:t>
+            </a:r>
+          </a:p>
+          <a:p>
+            <a:pPr marL="0" indent="0">
+              <a:buNone/>
+            </a:pPr>
+            <a:endParaRPr lang="en-US" sz="2600" dirty="0"/>
           </a:p>
           <a:p>
             <a:endParaRPr lang="en-US" dirty="0"/>
@@ -11752,19 +11379,19 @@
         </p:nvSpPr>
         <p:spPr>
           <a:xfrm>
-            <a:off x="717453" y="1104313"/>
-            <a:ext cx="10550768" cy="865163"/>
+            <a:off x="717452" y="1104313"/>
+            <a:ext cx="10761783" cy="724487"/>
           </a:xfrm>
         </p:spPr>
         <p:txBody>
           <a:bodyPr>
-            <a:normAutofit/>
+            <a:normAutofit fontScale="90000"/>
           </a:bodyPr>
           <a:lstStyle/>
           <a:p>
             <a:r>
               <a:rPr lang="en-US" sz="3600" dirty="0"/>
-              <a:t>Objective of the Project</a:t>
+              <a:t>Why there are variations in Hospital charge for same Procedures? </a:t>
             </a:r>
           </a:p>
         </p:txBody>
@@ -11787,59 +11414,100 @@
         </p:nvSpPr>
         <p:spPr>
           <a:xfrm>
-            <a:off x="1295402" y="2567611"/>
-            <a:ext cx="9156894" cy="2778112"/>
+            <a:off x="1069145" y="2447778"/>
+            <a:ext cx="10199077" cy="3784209"/>
           </a:xfrm>
         </p:spPr>
         <p:txBody>
           <a:bodyPr>
-            <a:normAutofit/>
+            <a:normAutofit fontScale="77500" lnSpcReduction="20000"/>
           </a:bodyPr>
           <a:lstStyle/>
           <a:p>
-            <a:pPr>
+            <a:pPr marL="0" indent="0">
+              <a:buNone/>
+            </a:pPr>
+            <a:r>
+              <a:rPr lang="en-US" dirty="0"/>
+              <a:t> </a:t>
+            </a:r>
+            <a:r>
+              <a:rPr lang="en-US" b="1" dirty="0"/>
+              <a:t>Monopolistic Competition in Healthcare Sector</a:t>
+            </a:r>
+          </a:p>
+          <a:p>
+            <a:pPr lvl="1">
               <a:buFont typeface="Wingdings" panose="05000000000000000000" pitchFamily="2" charset="2"/>
               <a:buChar char="§"/>
             </a:pPr>
             <a:r>
-              <a:rPr lang="en-US" b="1" dirty="0"/>
-              <a:t>To explore the extent of variations in hospital charge geographically and by </a:t>
-            </a:r>
-            <a:r>
-              <a:rPr lang="en-US" b="1"/>
-              <a:t>Procedures types </a:t>
-            </a:r>
-            <a:endParaRPr lang="en-US" b="1" dirty="0"/>
-          </a:p>
-          <a:p>
-            <a:pPr marL="0" indent="0">
-              <a:buNone/>
-            </a:pPr>
-            <a:endParaRPr lang="en-US" b="1" dirty="0"/>
-          </a:p>
-          <a:p>
-            <a:pPr>
+              <a:rPr lang="en-US" sz="2600" dirty="0"/>
+              <a:t>Allows providers to set their own prices for same procedures.</a:t>
+            </a:r>
+          </a:p>
+          <a:p>
+            <a:pPr lvl="1">
               <a:buFont typeface="Wingdings" panose="05000000000000000000" pitchFamily="2" charset="2"/>
               <a:buChar char="§"/>
             </a:pPr>
             <a:r>
-              <a:rPr lang="en-US" b="1" dirty="0"/>
-              <a:t>To validate if hospital charge is merely administrative decision or there are market factors explaining hospital charge other than market power of hospitals to set their own prices</a:t>
-            </a:r>
-          </a:p>
-          <a:p>
-            <a:pPr>
+              <a:rPr lang="en-US" sz="2600" dirty="0"/>
+              <a:t> The monopolistic power to the providers comes from either real or perceived differences in quality of medical and related services. </a:t>
+            </a:r>
+          </a:p>
+          <a:p>
+            <a:pPr lvl="1">
               <a:buFont typeface="Wingdings" panose="05000000000000000000" pitchFamily="2" charset="2"/>
               <a:buChar char="§"/>
             </a:pPr>
-            <a:endParaRPr lang="en-US" b="1" dirty="0"/>
-          </a:p>
-          <a:p>
-            <a:pPr>
-              <a:buFont typeface="Wingdings" panose="05000000000000000000" pitchFamily="2" charset="2"/>
-              <a:buChar char="§"/>
+            <a:r>
+              <a:rPr lang="en-US" sz="2600" dirty="0"/>
+              <a:t> In health sector new technologies can also be used to signal quality even when their clinical usefulness is not proven.</a:t>
+            </a:r>
+          </a:p>
+          <a:p>
+            <a:pPr marL="0" indent="0">
+              <a:buNone/>
             </a:pPr>
-            <a:endParaRPr lang="en-US" b="1" dirty="0"/>
+            <a:r>
+              <a:rPr lang="en-US" b="1" dirty="0"/>
+              <a:t>Cost Shifting : </a:t>
+            </a:r>
+            <a:r>
+              <a:rPr lang="en-US" dirty="0"/>
+              <a:t>charging the insured patients more to compensate less collections from uninsured people</a:t>
+            </a:r>
+            <a:r>
+              <a:rPr lang="en-US" b="1" dirty="0"/>
+              <a:t>.</a:t>
+            </a:r>
+          </a:p>
+          <a:p>
+            <a:pPr marL="0" indent="0">
+              <a:buNone/>
+            </a:pPr>
+            <a:r>
+              <a:rPr lang="en-US" b="1" dirty="0"/>
+              <a:t>Over Head Count Cost and Technology</a:t>
+            </a:r>
+            <a:r>
+              <a:rPr lang="en-US" dirty="0"/>
+              <a:t>: Facilities with more specialized headcounts or using latest technology may charge higher. </a:t>
+            </a:r>
+          </a:p>
+          <a:p>
+            <a:pPr marL="0" indent="0">
+              <a:buNone/>
+            </a:pPr>
+            <a:r>
+              <a:rPr lang="en-US" b="1" dirty="0"/>
+              <a:t>Location of Operation: </a:t>
+            </a:r>
+            <a:r>
+              <a:rPr lang="en-US" dirty="0"/>
+              <a:t>Hospitals in Urban areas may charge higher to compensate cost of operations and wage differences. </a:t>
+            </a:r>
           </a:p>
           <a:p>
             <a:pPr marL="0" indent="0">
@@ -11858,7 +11526,7 @@
     </p:spTree>
     <p:extLst>
       <p:ext uri="{BB962C8B-B14F-4D97-AF65-F5344CB8AC3E}">
-        <p14:creationId xmlns:p14="http://schemas.microsoft.com/office/powerpoint/2010/main" val="3508854425"/>
+        <p14:creationId xmlns:p14="http://schemas.microsoft.com/office/powerpoint/2010/main" val="599468089"/>
       </p:ext>
     </p:extLst>
   </p:cSld>
@@ -11903,8 +11571,8 @@
         </p:nvSpPr>
         <p:spPr>
           <a:xfrm>
-            <a:off x="1295402" y="982133"/>
-            <a:ext cx="9601196" cy="931074"/>
+            <a:off x="717453" y="1104313"/>
+            <a:ext cx="10550768" cy="865163"/>
           </a:xfrm>
         </p:spPr>
         <p:txBody>
@@ -11915,7 +11583,7 @@
           <a:p>
             <a:r>
               <a:rPr lang="en-US" sz="3600" dirty="0"/>
-              <a:t>Data Source and Description </a:t>
+              <a:t>Objective of the Project</a:t>
             </a:r>
           </a:p>
         </p:txBody>
@@ -11939,66 +11607,65 @@
         <p:spPr>
           <a:xfrm>
             <a:off x="1295402" y="2567611"/>
-            <a:ext cx="9972820" cy="3186075"/>
+            <a:ext cx="9156894" cy="2778112"/>
           </a:xfrm>
         </p:spPr>
         <p:txBody>
           <a:bodyPr>
-            <a:normAutofit fontScale="77500" lnSpcReduction="20000"/>
+            <a:normAutofit/>
           </a:bodyPr>
           <a:lstStyle/>
           <a:p>
-            <a:r>
-              <a:rPr lang="en-US" dirty="0"/>
-              <a:t>Medicare outpatient Hospital Charge and Hospital Information data are taken from </a:t>
-            </a:r>
+            <a:pPr>
+              <a:buFont typeface="Wingdings" panose="05000000000000000000" pitchFamily="2" charset="2"/>
+              <a:buChar char="§"/>
+            </a:pPr>
             <a:r>
               <a:rPr lang="en-US" b="1" dirty="0"/>
-              <a:t>CMS website </a:t>
-            </a:r>
-          </a:p>
-          <a:p>
-            <a:r>
-              <a:rPr lang="en-US" dirty="0"/>
-              <a:t>County Health  data is taken from  </a:t>
-            </a:r>
+              <a:t>To explore the extent of variations in hospital charge geographically and by Procedures types </a:t>
+            </a:r>
+          </a:p>
+          <a:p>
+            <a:pPr>
+              <a:buFont typeface="Wingdings" panose="05000000000000000000" pitchFamily="2" charset="2"/>
+              <a:buChar char="§"/>
+            </a:pPr>
+            <a:endParaRPr lang="en-US" b="1" dirty="0"/>
+          </a:p>
+          <a:p>
+            <a:pPr>
+              <a:buFont typeface="Wingdings" panose="05000000000000000000" pitchFamily="2" charset="2"/>
+              <a:buChar char="§"/>
+            </a:pPr>
             <a:r>
               <a:rPr lang="en-US" b="1" dirty="0"/>
-              <a:t>Robert Johnson Foundation County Health Ranking</a:t>
-            </a:r>
-          </a:p>
-          <a:p>
-            <a:r>
-              <a:rPr lang="en-US" dirty="0"/>
-              <a:t>49 States and DC, excluding Maryland, over 1121 counties </a:t>
-            </a:r>
-          </a:p>
-          <a:p>
-            <a:r>
-              <a:rPr lang="en-US" dirty="0"/>
-              <a:t> 35 Procedures(Ambulatory Payment Classifications), over 3000 Providers </a:t>
-            </a:r>
-          </a:p>
-          <a:p>
-            <a:r>
-              <a:rPr lang="en-US" dirty="0"/>
-              <a:t>The data represents 15.9% (428 million) of Outpatient Prospective Payment System(OPPS) hospital services and 23.3% ($14.3 billion) of the total Medicare allowed amount charges in a year.</a:t>
-            </a:r>
-          </a:p>
-          <a:p>
-            <a:r>
-              <a:rPr lang="en-US" dirty="0"/>
-              <a:t> Only One year Data is used because of differences in data structure for previous years.</a:t>
-            </a:r>
-          </a:p>
-          <a:p>
-            <a:r>
-              <a:rPr lang="en-US" dirty="0"/>
-              <a:t>All inferences and conclusions are based on and for 2016 Only.</a:t>
-            </a:r>
-            <a:br>
-              <a:rPr lang="en-US" dirty="0"/>
-            </a:br>
+              <a:t>To validate if hospital charge is merely administrative decision or factors other than market power of hospitals explain it</a:t>
+            </a:r>
+          </a:p>
+          <a:p>
+            <a:pPr>
+              <a:buFont typeface="Wingdings" panose="05000000000000000000" pitchFamily="2" charset="2"/>
+              <a:buChar char="§"/>
+            </a:pPr>
+            <a:endParaRPr lang="en-US" b="1" dirty="0"/>
+          </a:p>
+          <a:p>
+            <a:pPr>
+              <a:buFont typeface="Wingdings" panose="05000000000000000000" pitchFamily="2" charset="2"/>
+              <a:buChar char="§"/>
+            </a:pPr>
+            <a:endParaRPr lang="en-US" b="1" dirty="0"/>
+          </a:p>
+          <a:p>
+            <a:pPr marL="0" indent="0">
+              <a:buNone/>
+            </a:pPr>
+            <a:endParaRPr lang="en-US" b="1" dirty="0"/>
+          </a:p>
+          <a:p>
+            <a:pPr marL="457200" lvl="1" indent="0">
+              <a:buNone/>
+            </a:pPr>
             <a:endParaRPr lang="en-US" dirty="0"/>
           </a:p>
         </p:txBody>
@@ -12006,7 +11673,7 @@
     </p:spTree>
     <p:extLst>
       <p:ext uri="{BB962C8B-B14F-4D97-AF65-F5344CB8AC3E}">
-        <p14:creationId xmlns:p14="http://schemas.microsoft.com/office/powerpoint/2010/main" val="767627942"/>
+        <p14:creationId xmlns:p14="http://schemas.microsoft.com/office/powerpoint/2010/main" val="3508854425"/>
       </p:ext>
     </p:extLst>
   </p:cSld>
@@ -12063,7 +11730,7 @@
           <a:p>
             <a:r>
               <a:rPr lang="en-US" sz="3600" dirty="0"/>
-              <a:t>Definition of Terms</a:t>
+              <a:t>Data Source and Description </a:t>
             </a:r>
           </a:p>
         </p:txBody>
@@ -12086,6 +11753,154 @@
         </p:nvSpPr>
         <p:spPr>
           <a:xfrm>
+            <a:off x="886265" y="2475913"/>
+            <a:ext cx="10621107" cy="3685735"/>
+          </a:xfrm>
+        </p:spPr>
+        <p:txBody>
+          <a:bodyPr>
+            <a:normAutofit/>
+          </a:bodyPr>
+          <a:lstStyle/>
+          <a:p>
+            <a:r>
+              <a:rPr lang="en-US" dirty="0"/>
+              <a:t>Hospital Charge and Hospital Information data are taken from </a:t>
+            </a:r>
+            <a:r>
+              <a:rPr lang="en-US" b="1" dirty="0"/>
+              <a:t>CMS website </a:t>
+            </a:r>
+          </a:p>
+          <a:p>
+            <a:r>
+              <a:rPr lang="en-US" dirty="0"/>
+              <a:t>County Health  data is taken from  </a:t>
+            </a:r>
+            <a:r>
+              <a:rPr lang="en-US" b="1" dirty="0"/>
+              <a:t>Robert Johnson Foundation County Health Ranking</a:t>
+            </a:r>
+          </a:p>
+          <a:p>
+            <a:r>
+              <a:rPr lang="en-US" b="1" dirty="0"/>
+              <a:t>35</a:t>
+            </a:r>
+            <a:r>
+              <a:rPr lang="en-US" dirty="0"/>
+              <a:t> Hospital Procedure and over 3000 Providers </a:t>
+            </a:r>
+          </a:p>
+          <a:p>
+            <a:r>
+              <a:rPr lang="en-US" dirty="0"/>
+              <a:t>The data represents </a:t>
+            </a:r>
+            <a:r>
+              <a:rPr lang="en-US" b="1" dirty="0"/>
+              <a:t>15.9</a:t>
+            </a:r>
+            <a:r>
+              <a:rPr lang="en-US" dirty="0"/>
+              <a:t>% (428 million) of Outpatient Prospective Payment System(OPPS) hospital services </a:t>
+            </a:r>
+          </a:p>
+          <a:p>
+            <a:r>
+              <a:rPr lang="en-US" dirty="0"/>
+              <a:t>Only 2016 data is used because of differences in data structure for previous years</a:t>
+            </a:r>
+            <a:br>
+              <a:rPr lang="en-US" dirty="0"/>
+            </a:br>
+            <a:endParaRPr lang="en-US" dirty="0"/>
+          </a:p>
+        </p:txBody>
+      </p:sp>
+    </p:spTree>
+    <p:extLst>
+      <p:ext uri="{BB962C8B-B14F-4D97-AF65-F5344CB8AC3E}">
+        <p14:creationId xmlns:p14="http://schemas.microsoft.com/office/powerpoint/2010/main" val="767627942"/>
+      </p:ext>
+    </p:extLst>
+  </p:cSld>
+  <p:clrMapOvr>
+    <a:masterClrMapping/>
+  </p:clrMapOvr>
+</p:sld>
+</file>
+
+<file path=ppt/slides/slide6.xml><?xml version="1.0" encoding="utf-8"?>
+<p:sld xmlns:a="http://schemas.openxmlformats.org/drawingml/2006/main" xmlns:r="http://schemas.openxmlformats.org/officeDocument/2006/relationships" xmlns:p="http://schemas.openxmlformats.org/presentationml/2006/main">
+  <p:cSld>
+    <p:spTree>
+      <p:nvGrpSpPr>
+        <p:cNvPr id="1" name=""/>
+        <p:cNvGrpSpPr/>
+        <p:nvPr/>
+      </p:nvGrpSpPr>
+      <p:grpSpPr>
+        <a:xfrm>
+          <a:off x="0" y="0"/>
+          <a:ext cx="0" cy="0"/>
+          <a:chOff x="0" y="0"/>
+          <a:chExt cx="0" cy="0"/>
+        </a:xfrm>
+      </p:grpSpPr>
+      <p:sp>
+        <p:nvSpPr>
+          <p:cNvPr id="2" name="Title 1">
+            <a:extLst>
+              <a:ext uri="{FF2B5EF4-FFF2-40B4-BE49-F238E27FC236}">
+                <a16:creationId xmlns:a16="http://schemas.microsoft.com/office/drawing/2014/main" id="{2C22A208-6BC1-4D7F-825D-4B9C6AEF3B4E}"/>
+              </a:ext>
+            </a:extLst>
+          </p:cNvPr>
+          <p:cNvSpPr>
+            <a:spLocks noGrp="1"/>
+          </p:cNvSpPr>
+          <p:nvPr>
+            <p:ph type="title"/>
+          </p:nvPr>
+        </p:nvSpPr>
+        <p:spPr>
+          <a:xfrm>
+            <a:off x="1295402" y="982133"/>
+            <a:ext cx="9601196" cy="931074"/>
+          </a:xfrm>
+        </p:spPr>
+        <p:txBody>
+          <a:bodyPr>
+            <a:normAutofit/>
+          </a:bodyPr>
+          <a:lstStyle/>
+          <a:p>
+            <a:r>
+              <a:rPr lang="en-US" sz="3600" dirty="0"/>
+              <a:t>Definition of Terms</a:t>
+            </a:r>
+          </a:p>
+        </p:txBody>
+      </p:sp>
+      <p:sp>
+        <p:nvSpPr>
+          <p:cNvPr id="3" name="Subtitle 2">
+            <a:extLst>
+              <a:ext uri="{FF2B5EF4-FFF2-40B4-BE49-F238E27FC236}">
+                <a16:creationId xmlns:a16="http://schemas.microsoft.com/office/drawing/2014/main" id="{50287541-7128-4942-8D8A-3F37DC35086A}"/>
+              </a:ext>
+            </a:extLst>
+          </p:cNvPr>
+          <p:cNvSpPr>
+            <a:spLocks noGrp="1"/>
+          </p:cNvSpPr>
+          <p:nvPr>
+            <p:ph idx="1"/>
+          </p:nvPr>
+        </p:nvSpPr>
+        <p:spPr>
+          <a:xfrm>
             <a:off x="1295402" y="2567611"/>
             <a:ext cx="9733670" cy="3678444"/>
           </a:xfrm>
@@ -12150,7 +11965,7 @@
 </p:sld>
 </file>
 
-<file path=ppt/slides/slide6.xml><?xml version="1.0" encoding="utf-8"?>
+<file path=ppt/slides/slide7.xml><?xml version="1.0" encoding="utf-8"?>
 <p:sld xmlns:a="http://schemas.openxmlformats.org/drawingml/2006/main" xmlns:r="http://schemas.openxmlformats.org/officeDocument/2006/relationships" xmlns:p="http://schemas.openxmlformats.org/presentationml/2006/main">
   <p:cSld>
     <p:spTree>
@@ -12298,7 +12113,7 @@
 </p:sld>
 </file>
 
-<file path=ppt/slides/slide7.xml><?xml version="1.0" encoding="utf-8"?>
+<file path=ppt/slides/slide8.xml><?xml version="1.0" encoding="utf-8"?>
 <p:sld xmlns:a="http://schemas.openxmlformats.org/drawingml/2006/main" xmlns:r="http://schemas.openxmlformats.org/officeDocument/2006/relationships" xmlns:p="http://schemas.openxmlformats.org/presentationml/2006/main">
   <p:cSld>
     <p:spTree>
@@ -13564,7 +13379,7 @@
 </p:sld>
 </file>
 
-<file path=ppt/slides/slide8.xml><?xml version="1.0" encoding="utf-8"?>
+<file path=ppt/slides/slide9.xml><?xml version="1.0" encoding="utf-8"?>
 <p:sld xmlns:a="http://schemas.openxmlformats.org/drawingml/2006/main" xmlns:r="http://schemas.openxmlformats.org/officeDocument/2006/relationships" xmlns:p="http://schemas.openxmlformats.org/presentationml/2006/main">
   <p:cSld>
     <p:spTree>
@@ -13652,10 +13467,10 @@
       </p:sp>
       <p:pic>
         <p:nvPicPr>
-          <p:cNvPr id="4102" name="Picture 6">
+          <p:cNvPr id="1032" name="Picture 8">
             <a:extLst>
               <a:ext uri="{FF2B5EF4-FFF2-40B4-BE49-F238E27FC236}">
-                <a16:creationId xmlns:a16="http://schemas.microsoft.com/office/drawing/2014/main" id="{A32048B0-A911-425C-989B-C70776F5BC61}"/>
+                <a16:creationId xmlns:a16="http://schemas.microsoft.com/office/drawing/2014/main" id="{0F35C946-59E4-4F2F-BC13-7D066B0D2BE9}"/>
               </a:ext>
             </a:extLst>
           </p:cNvPr>
@@ -13681,8 +13496,8 @@
         </p:blipFill>
         <p:spPr bwMode="auto">
           <a:xfrm>
-            <a:off x="901806" y="1451451"/>
-            <a:ext cx="7711114" cy="3955098"/>
+            <a:off x="792501" y="1601640"/>
+            <a:ext cx="7952447" cy="4266975"/>
           </a:xfrm>
           <a:prstGeom prst="rect">
             <a:avLst/>
@@ -13703,137 +13518,6 @@
     <p:extLst>
       <p:ext uri="{BB962C8B-B14F-4D97-AF65-F5344CB8AC3E}">
         <p14:creationId xmlns:p14="http://schemas.microsoft.com/office/powerpoint/2010/main" val="855462704"/>
-      </p:ext>
-    </p:extLst>
-  </p:cSld>
-  <p:clrMapOvr>
-    <a:masterClrMapping/>
-  </p:clrMapOvr>
-</p:sld>
-</file>
-
-<file path=ppt/slides/slide9.xml><?xml version="1.0" encoding="utf-8"?>
-<p:sld xmlns:a="http://schemas.openxmlformats.org/drawingml/2006/main" xmlns:r="http://schemas.openxmlformats.org/officeDocument/2006/relationships" xmlns:p="http://schemas.openxmlformats.org/presentationml/2006/main">
-  <p:cSld>
-    <p:spTree>
-      <p:nvGrpSpPr>
-        <p:cNvPr id="1" name=""/>
-        <p:cNvGrpSpPr/>
-        <p:nvPr/>
-      </p:nvGrpSpPr>
-      <p:grpSpPr>
-        <a:xfrm>
-          <a:off x="0" y="0"/>
-          <a:ext cx="0" cy="0"/>
-          <a:chOff x="0" y="0"/>
-          <a:chExt cx="0" cy="0"/>
-        </a:xfrm>
-      </p:grpSpPr>
-      <p:sp>
-        <p:nvSpPr>
-          <p:cNvPr id="2" name="Title 1">
-            <a:extLst>
-              <a:ext uri="{FF2B5EF4-FFF2-40B4-BE49-F238E27FC236}">
-                <a16:creationId xmlns:a16="http://schemas.microsoft.com/office/drawing/2014/main" id="{2C22A208-6BC1-4D7F-825D-4B9C6AEF3B4E}"/>
-              </a:ext>
-            </a:extLst>
-          </p:cNvPr>
-          <p:cNvSpPr>
-            <a:spLocks noGrp="1"/>
-          </p:cNvSpPr>
-          <p:nvPr>
-            <p:ph type="title"/>
-          </p:nvPr>
-        </p:nvSpPr>
-        <p:spPr>
-          <a:xfrm>
-            <a:off x="1548620" y="441320"/>
-            <a:ext cx="9601196" cy="931074"/>
-          </a:xfrm>
-        </p:spPr>
-        <p:txBody>
-          <a:bodyPr>
-            <a:normAutofit/>
-          </a:bodyPr>
-          <a:lstStyle/>
-          <a:p>
-            <a:r>
-              <a:rPr lang="en-US" sz="3600" dirty="0"/>
-              <a:t>Average Charge By State for Medicare Outpatient </a:t>
-            </a:r>
-          </a:p>
-        </p:txBody>
-      </p:sp>
-      <p:sp>
-        <p:nvSpPr>
-          <p:cNvPr id="3" name="Rectangle 2">
-            <a:extLst>
-              <a:ext uri="{FF2B5EF4-FFF2-40B4-BE49-F238E27FC236}">
-                <a16:creationId xmlns:a16="http://schemas.microsoft.com/office/drawing/2014/main" id="{C4BE70F4-B7C8-4B58-B8C3-28356F1C1AD6}"/>
-              </a:ext>
-            </a:extLst>
-          </p:cNvPr>
-          <p:cNvSpPr/>
-          <p:nvPr/>
-        </p:nvSpPr>
-        <p:spPr>
-          <a:xfrm>
-            <a:off x="2294208" y="1372394"/>
-            <a:ext cx="3048000" cy="931074"/>
-          </a:xfrm>
-          <a:prstGeom prst="rect">
-            <a:avLst/>
-          </a:prstGeom>
-        </p:spPr>
-        <p:txBody>
-          <a:bodyPr wrap="square">
-            <a:spAutoFit/>
-          </a:bodyPr>
-          <a:lstStyle/>
-          <a:p>
-            <a:r>
-              <a:rPr lang="en-US" dirty="0"/>
-              <a:t>States Like Nevada, California and Florida charged highest in Average in 2016.</a:t>
-            </a:r>
-          </a:p>
-        </p:txBody>
-      </p:sp>
-      <p:pic>
-        <p:nvPicPr>
-          <p:cNvPr id="5" name="Content Placeholder 4">
-            <a:extLst>
-              <a:ext uri="{FF2B5EF4-FFF2-40B4-BE49-F238E27FC236}">
-                <a16:creationId xmlns:a16="http://schemas.microsoft.com/office/drawing/2014/main" id="{BEFE9C81-53CD-4881-96C2-591CD88A3E51}"/>
-              </a:ext>
-            </a:extLst>
-          </p:cNvPr>
-          <p:cNvPicPr>
-            <a:picLocks noGrp="1" noChangeAspect="1"/>
-          </p:cNvPicPr>
-          <p:nvPr>
-            <p:ph idx="1"/>
-          </p:nvPr>
-        </p:nvPicPr>
-        <p:blipFill>
-          <a:blip r:embed="rId2"/>
-          <a:stretch>
-            <a:fillRect/>
-          </a:stretch>
-        </p:blipFill>
-        <p:spPr>
-          <a:xfrm>
-            <a:off x="3609974" y="2744788"/>
-            <a:ext cx="5702837" cy="3375817"/>
-          </a:xfrm>
-          <a:prstGeom prst="rect">
-            <a:avLst/>
-          </a:prstGeom>
-        </p:spPr>
-      </p:pic>
-    </p:spTree>
-    <p:extLst>
-      <p:ext uri="{BB962C8B-B14F-4D97-AF65-F5344CB8AC3E}">
-        <p14:creationId xmlns:p14="http://schemas.microsoft.com/office/powerpoint/2010/main" val="927452506"/>
       </p:ext>
     </p:extLst>
   </p:cSld>

</xml_diff>

<commit_message>
Final Capstone Slides and Code
</commit_message>
<xml_diff>
--- a/Capstone Presentation.pptx
+++ b/Capstone Presentation.pptx
@@ -4,6 +4,9 @@
   <p:sldMasterIdLst>
     <p:sldMasterId id="2147483881" r:id="rId1"/>
   </p:sldMasterIdLst>
+  <p:notesMasterIdLst>
+    <p:notesMasterId r:id="rId23"/>
+  </p:notesMasterIdLst>
   <p:sldIdLst>
     <p:sldId id="256" r:id="rId2"/>
     <p:sldId id="257" r:id="rId3"/>
@@ -132,6 +135,526 @@
 </p:presentation>
 </file>
 
+<file path=ppt/notesMasters/notesMaster1.xml><?xml version="1.0" encoding="utf-8"?>
+<p:notesMaster xmlns:a="http://schemas.openxmlformats.org/drawingml/2006/main" xmlns:r="http://schemas.openxmlformats.org/officeDocument/2006/relationships" xmlns:p="http://schemas.openxmlformats.org/presentationml/2006/main">
+  <p:cSld>
+    <p:bg>
+      <p:bgRef idx="1001">
+        <a:schemeClr val="bg1"/>
+      </p:bgRef>
+    </p:bg>
+    <p:spTree>
+      <p:nvGrpSpPr>
+        <p:cNvPr id="1" name=""/>
+        <p:cNvGrpSpPr/>
+        <p:nvPr/>
+      </p:nvGrpSpPr>
+      <p:grpSpPr>
+        <a:xfrm>
+          <a:off x="0" y="0"/>
+          <a:ext cx="0" cy="0"/>
+          <a:chOff x="0" y="0"/>
+          <a:chExt cx="0" cy="0"/>
+        </a:xfrm>
+      </p:grpSpPr>
+      <p:sp>
+        <p:nvSpPr>
+          <p:cNvPr id="2" name="Header Placeholder 1"/>
+          <p:cNvSpPr>
+            <a:spLocks noGrp="1"/>
+          </p:cNvSpPr>
+          <p:nvPr>
+            <p:ph type="hdr" sz="quarter"/>
+          </p:nvPr>
+        </p:nvSpPr>
+        <p:spPr>
+          <a:xfrm>
+            <a:off x="0" y="0"/>
+            <a:ext cx="2971800" cy="458788"/>
+          </a:xfrm>
+          <a:prstGeom prst="rect">
+            <a:avLst/>
+          </a:prstGeom>
+        </p:spPr>
+        <p:txBody>
+          <a:bodyPr vert="horz" lIns="91440" tIns="45720" rIns="91440" bIns="45720" rtlCol="0"/>
+          <a:lstStyle>
+            <a:lvl1pPr algn="l">
+              <a:defRPr sz="1200"/>
+            </a:lvl1pPr>
+          </a:lstStyle>
+          <a:p>
+            <a:endParaRPr lang="en-US"/>
+          </a:p>
+        </p:txBody>
+      </p:sp>
+      <p:sp>
+        <p:nvSpPr>
+          <p:cNvPr id="3" name="Date Placeholder 2"/>
+          <p:cNvSpPr>
+            <a:spLocks noGrp="1"/>
+          </p:cNvSpPr>
+          <p:nvPr>
+            <p:ph type="dt" idx="1"/>
+          </p:nvPr>
+        </p:nvSpPr>
+        <p:spPr>
+          <a:xfrm>
+            <a:off x="3884613" y="0"/>
+            <a:ext cx="2971800" cy="458788"/>
+          </a:xfrm>
+          <a:prstGeom prst="rect">
+            <a:avLst/>
+          </a:prstGeom>
+        </p:spPr>
+        <p:txBody>
+          <a:bodyPr vert="horz" lIns="91440" tIns="45720" rIns="91440" bIns="45720" rtlCol="0"/>
+          <a:lstStyle>
+            <a:lvl1pPr algn="r">
+              <a:defRPr sz="1200"/>
+            </a:lvl1pPr>
+          </a:lstStyle>
+          <a:p>
+            <a:fld id="{16E8013F-6934-4E98-866E-AF276756534F}" type="datetimeFigureOut">
+              <a:rPr lang="en-US" smtClean="0"/>
+              <a:t>5/15/2019</a:t>
+            </a:fld>
+            <a:endParaRPr lang="en-US"/>
+          </a:p>
+        </p:txBody>
+      </p:sp>
+      <p:sp>
+        <p:nvSpPr>
+          <p:cNvPr id="4" name="Slide Image Placeholder 3"/>
+          <p:cNvSpPr>
+            <a:spLocks noGrp="1" noRot="1" noChangeAspect="1"/>
+          </p:cNvSpPr>
+          <p:nvPr>
+            <p:ph type="sldImg" idx="2"/>
+          </p:nvPr>
+        </p:nvSpPr>
+        <p:spPr>
+          <a:xfrm>
+            <a:off x="685800" y="1143000"/>
+            <a:ext cx="5486400" cy="3086100"/>
+          </a:xfrm>
+          <a:prstGeom prst="rect">
+            <a:avLst/>
+          </a:prstGeom>
+          <a:noFill/>
+          <a:ln w="12700">
+            <a:solidFill>
+              <a:prstClr val="black"/>
+            </a:solidFill>
+          </a:ln>
+        </p:spPr>
+        <p:txBody>
+          <a:bodyPr vert="horz" lIns="91440" tIns="45720" rIns="91440" bIns="45720" rtlCol="0" anchor="ctr"/>
+          <a:lstStyle/>
+          <a:p>
+            <a:endParaRPr lang="en-US"/>
+          </a:p>
+        </p:txBody>
+      </p:sp>
+      <p:sp>
+        <p:nvSpPr>
+          <p:cNvPr id="5" name="Notes Placeholder 4"/>
+          <p:cNvSpPr>
+            <a:spLocks noGrp="1"/>
+          </p:cNvSpPr>
+          <p:nvPr>
+            <p:ph type="body" sz="quarter" idx="3"/>
+          </p:nvPr>
+        </p:nvSpPr>
+        <p:spPr>
+          <a:xfrm>
+            <a:off x="685800" y="4400550"/>
+            <a:ext cx="5486400" cy="3600450"/>
+          </a:xfrm>
+          <a:prstGeom prst="rect">
+            <a:avLst/>
+          </a:prstGeom>
+        </p:spPr>
+        <p:txBody>
+          <a:bodyPr vert="horz" lIns="91440" tIns="45720" rIns="91440" bIns="45720" rtlCol="0"/>
+          <a:lstStyle/>
+          <a:p>
+            <a:pPr lvl="0"/>
+            <a:r>
+              <a:rPr lang="en-US"/>
+              <a:t>Click to edit Master text styles</a:t>
+            </a:r>
+          </a:p>
+          <a:p>
+            <a:pPr lvl="1"/>
+            <a:r>
+              <a:rPr lang="en-US"/>
+              <a:t>Second level</a:t>
+            </a:r>
+          </a:p>
+          <a:p>
+            <a:pPr lvl="2"/>
+            <a:r>
+              <a:rPr lang="en-US"/>
+              <a:t>Third level</a:t>
+            </a:r>
+          </a:p>
+          <a:p>
+            <a:pPr lvl="3"/>
+            <a:r>
+              <a:rPr lang="en-US"/>
+              <a:t>Fourth level</a:t>
+            </a:r>
+          </a:p>
+          <a:p>
+            <a:pPr lvl="4"/>
+            <a:r>
+              <a:rPr lang="en-US"/>
+              <a:t>Fifth level</a:t>
+            </a:r>
+          </a:p>
+        </p:txBody>
+      </p:sp>
+      <p:sp>
+        <p:nvSpPr>
+          <p:cNvPr id="6" name="Footer Placeholder 5"/>
+          <p:cNvSpPr>
+            <a:spLocks noGrp="1"/>
+          </p:cNvSpPr>
+          <p:nvPr>
+            <p:ph type="ftr" sz="quarter" idx="4"/>
+          </p:nvPr>
+        </p:nvSpPr>
+        <p:spPr>
+          <a:xfrm>
+            <a:off x="0" y="8685213"/>
+            <a:ext cx="2971800" cy="458787"/>
+          </a:xfrm>
+          <a:prstGeom prst="rect">
+            <a:avLst/>
+          </a:prstGeom>
+        </p:spPr>
+        <p:txBody>
+          <a:bodyPr vert="horz" lIns="91440" tIns="45720" rIns="91440" bIns="45720" rtlCol="0" anchor="b"/>
+          <a:lstStyle>
+            <a:lvl1pPr algn="l">
+              <a:defRPr sz="1200"/>
+            </a:lvl1pPr>
+          </a:lstStyle>
+          <a:p>
+            <a:endParaRPr lang="en-US"/>
+          </a:p>
+        </p:txBody>
+      </p:sp>
+      <p:sp>
+        <p:nvSpPr>
+          <p:cNvPr id="7" name="Slide Number Placeholder 6"/>
+          <p:cNvSpPr>
+            <a:spLocks noGrp="1"/>
+          </p:cNvSpPr>
+          <p:nvPr>
+            <p:ph type="sldNum" sz="quarter" idx="5"/>
+          </p:nvPr>
+        </p:nvSpPr>
+        <p:spPr>
+          <a:xfrm>
+            <a:off x="3884613" y="8685213"/>
+            <a:ext cx="2971800" cy="458787"/>
+          </a:xfrm>
+          <a:prstGeom prst="rect">
+            <a:avLst/>
+          </a:prstGeom>
+        </p:spPr>
+        <p:txBody>
+          <a:bodyPr vert="horz" lIns="91440" tIns="45720" rIns="91440" bIns="45720" rtlCol="0" anchor="b"/>
+          <a:lstStyle>
+            <a:lvl1pPr algn="r">
+              <a:defRPr sz="1200"/>
+            </a:lvl1pPr>
+          </a:lstStyle>
+          <a:p>
+            <a:fld id="{776DB010-5797-403D-A847-99B5D66275AE}" type="slidenum">
+              <a:rPr lang="en-US" smtClean="0"/>
+              <a:t>‹#›</a:t>
+            </a:fld>
+            <a:endParaRPr lang="en-US"/>
+          </a:p>
+        </p:txBody>
+      </p:sp>
+    </p:spTree>
+    <p:extLst>
+      <p:ext uri="{BB962C8B-B14F-4D97-AF65-F5344CB8AC3E}">
+        <p14:creationId xmlns:p14="http://schemas.microsoft.com/office/powerpoint/2010/main" val="2269396005"/>
+      </p:ext>
+    </p:extLst>
+  </p:cSld>
+  <p:clrMap bg1="lt1" tx1="dk1" bg2="lt2" tx2="dk2" accent1="accent1" accent2="accent2" accent3="accent3" accent4="accent4" accent5="accent5" accent6="accent6" hlink="hlink" folHlink="folHlink"/>
+  <p:notesStyle>
+    <a:lvl1pPr marL="0" algn="l" defTabSz="914400" rtl="0" eaLnBrk="1" latinLnBrk="0" hangingPunct="1">
+      <a:defRPr sz="1200" kern="1200">
+        <a:solidFill>
+          <a:schemeClr val="tx1"/>
+        </a:solidFill>
+        <a:latin typeface="+mn-lt"/>
+        <a:ea typeface="+mn-ea"/>
+        <a:cs typeface="+mn-cs"/>
+      </a:defRPr>
+    </a:lvl1pPr>
+    <a:lvl2pPr marL="457200" algn="l" defTabSz="914400" rtl="0" eaLnBrk="1" latinLnBrk="0" hangingPunct="1">
+      <a:defRPr sz="1200" kern="1200">
+        <a:solidFill>
+          <a:schemeClr val="tx1"/>
+        </a:solidFill>
+        <a:latin typeface="+mn-lt"/>
+        <a:ea typeface="+mn-ea"/>
+        <a:cs typeface="+mn-cs"/>
+      </a:defRPr>
+    </a:lvl2pPr>
+    <a:lvl3pPr marL="914400" algn="l" defTabSz="914400" rtl="0" eaLnBrk="1" latinLnBrk="0" hangingPunct="1">
+      <a:defRPr sz="1200" kern="1200">
+        <a:solidFill>
+          <a:schemeClr val="tx1"/>
+        </a:solidFill>
+        <a:latin typeface="+mn-lt"/>
+        <a:ea typeface="+mn-ea"/>
+        <a:cs typeface="+mn-cs"/>
+      </a:defRPr>
+    </a:lvl3pPr>
+    <a:lvl4pPr marL="1371600" algn="l" defTabSz="914400" rtl="0" eaLnBrk="1" latinLnBrk="0" hangingPunct="1">
+      <a:defRPr sz="1200" kern="1200">
+        <a:solidFill>
+          <a:schemeClr val="tx1"/>
+        </a:solidFill>
+        <a:latin typeface="+mn-lt"/>
+        <a:ea typeface="+mn-ea"/>
+        <a:cs typeface="+mn-cs"/>
+      </a:defRPr>
+    </a:lvl4pPr>
+    <a:lvl5pPr marL="1828800" algn="l" defTabSz="914400" rtl="0" eaLnBrk="1" latinLnBrk="0" hangingPunct="1">
+      <a:defRPr sz="1200" kern="1200">
+        <a:solidFill>
+          <a:schemeClr val="tx1"/>
+        </a:solidFill>
+        <a:latin typeface="+mn-lt"/>
+        <a:ea typeface="+mn-ea"/>
+        <a:cs typeface="+mn-cs"/>
+      </a:defRPr>
+    </a:lvl5pPr>
+    <a:lvl6pPr marL="2286000" algn="l" defTabSz="914400" rtl="0" eaLnBrk="1" latinLnBrk="0" hangingPunct="1">
+      <a:defRPr sz="1200" kern="1200">
+        <a:solidFill>
+          <a:schemeClr val="tx1"/>
+        </a:solidFill>
+        <a:latin typeface="+mn-lt"/>
+        <a:ea typeface="+mn-ea"/>
+        <a:cs typeface="+mn-cs"/>
+      </a:defRPr>
+    </a:lvl6pPr>
+    <a:lvl7pPr marL="2743200" algn="l" defTabSz="914400" rtl="0" eaLnBrk="1" latinLnBrk="0" hangingPunct="1">
+      <a:defRPr sz="1200" kern="1200">
+        <a:solidFill>
+          <a:schemeClr val="tx1"/>
+        </a:solidFill>
+        <a:latin typeface="+mn-lt"/>
+        <a:ea typeface="+mn-ea"/>
+        <a:cs typeface="+mn-cs"/>
+      </a:defRPr>
+    </a:lvl7pPr>
+    <a:lvl8pPr marL="3200400" algn="l" defTabSz="914400" rtl="0" eaLnBrk="1" latinLnBrk="0" hangingPunct="1">
+      <a:defRPr sz="1200" kern="1200">
+        <a:solidFill>
+          <a:schemeClr val="tx1"/>
+        </a:solidFill>
+        <a:latin typeface="+mn-lt"/>
+        <a:ea typeface="+mn-ea"/>
+        <a:cs typeface="+mn-cs"/>
+      </a:defRPr>
+    </a:lvl8pPr>
+    <a:lvl9pPr marL="3657600" algn="l" defTabSz="914400" rtl="0" eaLnBrk="1" latinLnBrk="0" hangingPunct="1">
+      <a:defRPr sz="1200" kern="1200">
+        <a:solidFill>
+          <a:schemeClr val="tx1"/>
+        </a:solidFill>
+        <a:latin typeface="+mn-lt"/>
+        <a:ea typeface="+mn-ea"/>
+        <a:cs typeface="+mn-cs"/>
+      </a:defRPr>
+    </a:lvl9pPr>
+  </p:notesStyle>
+</p:notesMaster>
+</file>
+
+<file path=ppt/notesSlides/notesSlide1.xml><?xml version="1.0" encoding="utf-8"?>
+<p:notes xmlns:a="http://schemas.openxmlformats.org/drawingml/2006/main" xmlns:r="http://schemas.openxmlformats.org/officeDocument/2006/relationships" xmlns:p="http://schemas.openxmlformats.org/presentationml/2006/main">
+  <p:cSld>
+    <p:spTree>
+      <p:nvGrpSpPr>
+        <p:cNvPr id="1" name=""/>
+        <p:cNvGrpSpPr/>
+        <p:nvPr/>
+      </p:nvGrpSpPr>
+      <p:grpSpPr>
+        <a:xfrm>
+          <a:off x="0" y="0"/>
+          <a:ext cx="0" cy="0"/>
+          <a:chOff x="0" y="0"/>
+          <a:chExt cx="0" cy="0"/>
+        </a:xfrm>
+      </p:grpSpPr>
+      <p:sp>
+        <p:nvSpPr>
+          <p:cNvPr id="2" name="Slide Image Placeholder 1"/>
+          <p:cNvSpPr>
+            <a:spLocks noGrp="1" noRot="1" noChangeAspect="1"/>
+          </p:cNvSpPr>
+          <p:nvPr>
+            <p:ph type="sldImg"/>
+          </p:nvPr>
+        </p:nvSpPr>
+        <p:spPr/>
+      </p:sp>
+      <p:sp>
+        <p:nvSpPr>
+          <p:cNvPr id="3" name="Notes Placeholder 2"/>
+          <p:cNvSpPr>
+            <a:spLocks noGrp="1"/>
+          </p:cNvSpPr>
+          <p:nvPr>
+            <p:ph type="body" idx="1"/>
+          </p:nvPr>
+        </p:nvSpPr>
+        <p:spPr/>
+        <p:txBody>
+          <a:bodyPr/>
+          <a:lstStyle/>
+          <a:p>
+            <a:endParaRPr lang="en-US" dirty="0"/>
+          </a:p>
+        </p:txBody>
+      </p:sp>
+      <p:sp>
+        <p:nvSpPr>
+          <p:cNvPr id="4" name="Slide Number Placeholder 3"/>
+          <p:cNvSpPr>
+            <a:spLocks noGrp="1"/>
+          </p:cNvSpPr>
+          <p:nvPr>
+            <p:ph type="sldNum" sz="quarter" idx="5"/>
+          </p:nvPr>
+        </p:nvSpPr>
+        <p:spPr/>
+        <p:txBody>
+          <a:bodyPr/>
+          <a:lstStyle/>
+          <a:p>
+            <a:fld id="{776DB010-5797-403D-A847-99B5D66275AE}" type="slidenum">
+              <a:rPr lang="en-US" smtClean="0"/>
+              <a:t>19</a:t>
+            </a:fld>
+            <a:endParaRPr lang="en-US"/>
+          </a:p>
+        </p:txBody>
+      </p:sp>
+    </p:spTree>
+    <p:extLst>
+      <p:ext uri="{BB962C8B-B14F-4D97-AF65-F5344CB8AC3E}">
+        <p14:creationId xmlns:p14="http://schemas.microsoft.com/office/powerpoint/2010/main" val="2750941539"/>
+      </p:ext>
+    </p:extLst>
+  </p:cSld>
+  <p:clrMapOvr>
+    <a:masterClrMapping/>
+  </p:clrMapOvr>
+</p:notes>
+</file>
+
+<file path=ppt/notesSlides/notesSlide2.xml><?xml version="1.0" encoding="utf-8"?>
+<p:notes xmlns:a="http://schemas.openxmlformats.org/drawingml/2006/main" xmlns:r="http://schemas.openxmlformats.org/officeDocument/2006/relationships" xmlns:p="http://schemas.openxmlformats.org/presentationml/2006/main">
+  <p:cSld>
+    <p:spTree>
+      <p:nvGrpSpPr>
+        <p:cNvPr id="1" name=""/>
+        <p:cNvGrpSpPr/>
+        <p:nvPr/>
+      </p:nvGrpSpPr>
+      <p:grpSpPr>
+        <a:xfrm>
+          <a:off x="0" y="0"/>
+          <a:ext cx="0" cy="0"/>
+          <a:chOff x="0" y="0"/>
+          <a:chExt cx="0" cy="0"/>
+        </a:xfrm>
+      </p:grpSpPr>
+      <p:sp>
+        <p:nvSpPr>
+          <p:cNvPr id="2" name="Slide Image Placeholder 1"/>
+          <p:cNvSpPr>
+            <a:spLocks noGrp="1" noRot="1" noChangeAspect="1"/>
+          </p:cNvSpPr>
+          <p:nvPr>
+            <p:ph type="sldImg"/>
+          </p:nvPr>
+        </p:nvSpPr>
+        <p:spPr/>
+      </p:sp>
+      <p:sp>
+        <p:nvSpPr>
+          <p:cNvPr id="3" name="Notes Placeholder 2"/>
+          <p:cNvSpPr>
+            <a:spLocks noGrp="1"/>
+          </p:cNvSpPr>
+          <p:nvPr>
+            <p:ph type="body" idx="1"/>
+          </p:nvPr>
+        </p:nvSpPr>
+        <p:spPr/>
+        <p:txBody>
+          <a:bodyPr/>
+          <a:lstStyle/>
+          <a:p>
+            <a:r>
+              <a:rPr lang="en-US" dirty="0"/>
+              <a:t>CDC data</a:t>
+            </a:r>
+          </a:p>
+        </p:txBody>
+      </p:sp>
+      <p:sp>
+        <p:nvSpPr>
+          <p:cNvPr id="4" name="Slide Number Placeholder 3"/>
+          <p:cNvSpPr>
+            <a:spLocks noGrp="1"/>
+          </p:cNvSpPr>
+          <p:nvPr>
+            <p:ph type="sldNum" sz="quarter" idx="5"/>
+          </p:nvPr>
+        </p:nvSpPr>
+        <p:spPr/>
+        <p:txBody>
+          <a:bodyPr/>
+          <a:lstStyle/>
+          <a:p>
+            <a:fld id="{776DB010-5797-403D-A847-99B5D66275AE}" type="slidenum">
+              <a:rPr lang="en-US" smtClean="0"/>
+              <a:t>20</a:t>
+            </a:fld>
+            <a:endParaRPr lang="en-US"/>
+          </a:p>
+        </p:txBody>
+      </p:sp>
+    </p:spTree>
+    <p:extLst>
+      <p:ext uri="{BB962C8B-B14F-4D97-AF65-F5344CB8AC3E}">
+        <p14:creationId xmlns:p14="http://schemas.microsoft.com/office/powerpoint/2010/main" val="3895977579"/>
+      </p:ext>
+    </p:extLst>
+  </p:cSld>
+  <p:clrMapOvr>
+    <a:masterClrMapping/>
+  </p:clrMapOvr>
+</p:notes>
+</file>
+
 <file path=ppt/slideLayouts/slideLayout1.xml><?xml version="1.0" encoding="utf-8"?>
 <p:sldLayout xmlns:a="http://schemas.openxmlformats.org/drawingml/2006/main" xmlns:r="http://schemas.openxmlformats.org/officeDocument/2006/relationships" xmlns:p="http://schemas.openxmlformats.org/presentationml/2006/main" showMasterSp="0" type="title" preserve="1">
   <p:cSld name="Title Slide">
@@ -356,7 +879,7 @@
           <a:p>
             <a:fld id="{E3C8C412-EFD4-402B-B224-F9C350D4ACD1}" type="datetimeFigureOut">
               <a:rPr lang="en-US" smtClean="0"/>
-              <a:t>5/11/2019</a:t>
+              <a:t>5/13/2019</a:t>
             </a:fld>
             <a:endParaRPr lang="en-US"/>
           </a:p>
@@ -688,7 +1211,7 @@
           <a:p>
             <a:fld id="{E3C8C412-EFD4-402B-B224-F9C350D4ACD1}" type="datetimeFigureOut">
               <a:rPr lang="en-US" smtClean="0"/>
-              <a:t>5/11/2019</a:t>
+              <a:t>5/13/2019</a:t>
             </a:fld>
             <a:endParaRPr lang="en-US"/>
           </a:p>
@@ -936,7 +1459,7 @@
           <a:p>
             <a:fld id="{E3C8C412-EFD4-402B-B224-F9C350D4ACD1}" type="datetimeFigureOut">
               <a:rPr lang="en-US" smtClean="0"/>
-              <a:t>5/11/2019</a:t>
+              <a:t>5/13/2019</a:t>
             </a:fld>
             <a:endParaRPr lang="en-US"/>
           </a:p>
@@ -1282,7 +1805,7 @@
           <a:p>
             <a:fld id="{E3C8C412-EFD4-402B-B224-F9C350D4ACD1}" type="datetimeFigureOut">
               <a:rPr lang="en-US" smtClean="0"/>
-              <a:t>5/11/2019</a:t>
+              <a:t>5/13/2019</a:t>
             </a:fld>
             <a:endParaRPr lang="en-US"/>
           </a:p>
@@ -1636,7 +2159,7 @@
           <a:p>
             <a:fld id="{E3C8C412-EFD4-402B-B224-F9C350D4ACD1}" type="datetimeFigureOut">
               <a:rPr lang="en-US" smtClean="0"/>
-              <a:t>5/11/2019</a:t>
+              <a:t>5/13/2019</a:t>
             </a:fld>
             <a:endParaRPr lang="en-US"/>
           </a:p>
@@ -2010,7 +2533,7 @@
           <a:p>
             <a:fld id="{E3C8C412-EFD4-402B-B224-F9C350D4ACD1}" type="datetimeFigureOut">
               <a:rPr lang="en-US" smtClean="0"/>
-              <a:t>5/11/2019</a:t>
+              <a:t>5/13/2019</a:t>
             </a:fld>
             <a:endParaRPr lang="en-US"/>
           </a:p>
@@ -2487,7 +3010,7 @@
           <a:p>
             <a:fld id="{E3C8C412-EFD4-402B-B224-F9C350D4ACD1}" type="datetimeFigureOut">
               <a:rPr lang="en-US" smtClean="0"/>
-              <a:t>5/11/2019</a:t>
+              <a:t>5/13/2019</a:t>
             </a:fld>
             <a:endParaRPr lang="en-US"/>
           </a:p>
@@ -2699,7 +3222,7 @@
           <a:p>
             <a:fld id="{E3C8C412-EFD4-402B-B224-F9C350D4ACD1}" type="datetimeFigureOut">
               <a:rPr lang="en-US" smtClean="0"/>
-              <a:t>5/11/2019</a:t>
+              <a:t>5/13/2019</a:t>
             </a:fld>
             <a:endParaRPr lang="en-US"/>
           </a:p>
@@ -2917,7 +3440,7 @@
           <a:p>
             <a:fld id="{E3C8C412-EFD4-402B-B224-F9C350D4ACD1}" type="datetimeFigureOut">
               <a:rPr lang="en-US" smtClean="0"/>
-              <a:t>5/11/2019</a:t>
+              <a:t>5/13/2019</a:t>
             </a:fld>
             <a:endParaRPr lang="en-US"/>
           </a:p>
@@ -3163,7 +3686,7 @@
           <a:p>
             <a:fld id="{E3C8C412-EFD4-402B-B224-F9C350D4ACD1}" type="datetimeFigureOut">
               <a:rPr lang="en-US" smtClean="0"/>
-              <a:t>5/11/2019</a:t>
+              <a:t>5/13/2019</a:t>
             </a:fld>
             <a:endParaRPr lang="en-US"/>
           </a:p>
@@ -3411,7 +3934,7 @@
           <a:p>
             <a:fld id="{E3C8C412-EFD4-402B-B224-F9C350D4ACD1}" type="datetimeFigureOut">
               <a:rPr lang="en-US" smtClean="0"/>
-              <a:t>5/11/2019</a:t>
+              <a:t>5/13/2019</a:t>
             </a:fld>
             <a:endParaRPr lang="en-US"/>
           </a:p>
@@ -3723,7 +4246,7 @@
           <a:p>
             <a:fld id="{E3C8C412-EFD4-402B-B224-F9C350D4ACD1}" type="datetimeFigureOut">
               <a:rPr lang="en-US" smtClean="0"/>
-              <a:t>5/11/2019</a:t>
+              <a:t>5/13/2019</a:t>
             </a:fld>
             <a:endParaRPr lang="en-US"/>
           </a:p>
@@ -4105,7 +4628,7 @@
           <a:p>
             <a:fld id="{E3C8C412-EFD4-402B-B224-F9C350D4ACD1}" type="datetimeFigureOut">
               <a:rPr lang="en-US" smtClean="0"/>
-              <a:t>5/11/2019</a:t>
+              <a:t>5/13/2019</a:t>
             </a:fld>
             <a:endParaRPr lang="en-US"/>
           </a:p>
@@ -4261,7 +4784,7 @@
           <a:p>
             <a:fld id="{E3C8C412-EFD4-402B-B224-F9C350D4ACD1}" type="datetimeFigureOut">
               <a:rPr lang="en-US" smtClean="0"/>
-              <a:t>5/11/2019</a:t>
+              <a:t>5/13/2019</a:t>
             </a:fld>
             <a:endParaRPr lang="en-US"/>
           </a:p>
@@ -4394,7 +4917,7 @@
           <a:p>
             <a:fld id="{E3C8C412-EFD4-402B-B224-F9C350D4ACD1}" type="datetimeFigureOut">
               <a:rPr lang="en-US" smtClean="0"/>
-              <a:t>5/11/2019</a:t>
+              <a:t>5/13/2019</a:t>
             </a:fld>
             <a:endParaRPr lang="en-US"/>
           </a:p>
@@ -4649,7 +5172,7 @@
           <a:p>
             <a:fld id="{E3C8C412-EFD4-402B-B224-F9C350D4ACD1}" type="datetimeFigureOut">
               <a:rPr lang="en-US" smtClean="0"/>
-              <a:t>5/11/2019</a:t>
+              <a:t>5/13/2019</a:t>
             </a:fld>
             <a:endParaRPr lang="en-US"/>
           </a:p>
@@ -4971,7 +5494,7 @@
           <a:p>
             <a:fld id="{E3C8C412-EFD4-402B-B224-F9C350D4ACD1}" type="datetimeFigureOut">
               <a:rPr lang="en-US" smtClean="0"/>
-              <a:t>5/11/2019</a:t>
+              <a:t>5/13/2019</a:t>
             </a:fld>
             <a:endParaRPr lang="en-US"/>
           </a:p>
@@ -5215,7 +5738,7 @@
           <a:p>
             <a:fld id="{E3C8C412-EFD4-402B-B224-F9C350D4ACD1}" type="datetimeFigureOut">
               <a:rPr lang="en-US" smtClean="0"/>
-              <a:t>5/11/2019</a:t>
+              <a:t>5/13/2019</a:t>
             </a:fld>
             <a:endParaRPr lang="en-US"/>
           </a:p>
@@ -5860,6 +6383,18 @@
   <p:clrMapOvr>
     <a:masterClrMapping/>
   </p:clrMapOvr>
+  <mc:AlternateContent xmlns:mc="http://schemas.openxmlformats.org/markup-compatibility/2006">
+    <mc:Choice xmlns:p15="http://schemas.microsoft.com/office/powerpoint/2012/main" Requires="p15">
+      <p:transition xmlns:p14="http://schemas.microsoft.com/office/powerpoint/2010/main" spd="slow" p14:dur="1250">
+        <p15:prstTrans prst="peelOff"/>
+      </p:transition>
+    </mc:Choice>
+    <mc:Fallback>
+      <p:transition spd="slow">
+        <p:fade/>
+      </p:transition>
+    </mc:Fallback>
+  </mc:AlternateContent>
 </p:sld>
 </file>
 
@@ -5991,6 +6526,18 @@
   <p:clrMapOvr>
     <a:masterClrMapping/>
   </p:clrMapOvr>
+  <mc:AlternateContent xmlns:mc="http://schemas.openxmlformats.org/markup-compatibility/2006">
+    <mc:Choice xmlns:p15="http://schemas.microsoft.com/office/powerpoint/2012/main" Requires="p15">
+      <p:transition xmlns:p14="http://schemas.microsoft.com/office/powerpoint/2010/main" spd="slow" p14:dur="1250">
+        <p15:prstTrans prst="peelOff"/>
+      </p:transition>
+    </mc:Choice>
+    <mc:Fallback>
+      <p:transition spd="slow">
+        <p:fade/>
+      </p:transition>
+    </mc:Fallback>
+  </mc:AlternateContent>
 </p:sld>
 </file>
 
@@ -6061,7 +6608,7 @@
         <p:spPr>
           <a:xfrm>
             <a:off x="450167" y="1856936"/>
-            <a:ext cx="2377439" cy="3416320"/>
+            <a:ext cx="2377439" cy="3970318"/>
           </a:xfrm>
           <a:prstGeom prst="rect">
             <a:avLst/>
@@ -6089,7 +6636,7 @@
             </a:r>
             <a:r>
               <a:rPr lang="en-US" dirty="0"/>
-              <a:t>: Implantable Cardioverter Defibrillator Procedures</a:t>
+              <a:t>: Implantable Cardioverter Defibrillator Procedures and used to treat critical heart attack/failure.</a:t>
             </a:r>
           </a:p>
           <a:p>
@@ -6156,6 +6703,18 @@
   <p:clrMapOvr>
     <a:masterClrMapping/>
   </p:clrMapOvr>
+  <mc:AlternateContent xmlns:mc="http://schemas.openxmlformats.org/markup-compatibility/2006">
+    <mc:Choice xmlns:p15="http://schemas.microsoft.com/office/powerpoint/2012/main" Requires="p15">
+      <p:transition xmlns:p14="http://schemas.microsoft.com/office/powerpoint/2010/main" spd="slow" p14:dur="1250">
+        <p15:prstTrans prst="peelOff"/>
+      </p:transition>
+    </mc:Choice>
+    <mc:Fallback>
+      <p:transition spd="slow">
+        <p:fade/>
+      </p:transition>
+    </mc:Fallback>
+  </mc:AlternateContent>
 </p:sld>
 </file>
 
@@ -6320,6 +6879,18 @@
   <p:clrMapOvr>
     <a:masterClrMapping/>
   </p:clrMapOvr>
+  <mc:AlternateContent xmlns:mc="http://schemas.openxmlformats.org/markup-compatibility/2006">
+    <mc:Choice xmlns:p15="http://schemas.microsoft.com/office/powerpoint/2012/main" Requires="p15">
+      <p:transition xmlns:p14="http://schemas.microsoft.com/office/powerpoint/2010/main" spd="slow" p14:dur="1250">
+        <p15:prstTrans prst="peelOff"/>
+      </p:transition>
+    </mc:Choice>
+    <mc:Fallback>
+      <p:transition spd="slow">
+        <p:fade/>
+      </p:transition>
+    </mc:Fallback>
+  </mc:AlternateContent>
 </p:sld>
 </file>
 
@@ -6468,6 +7039,18 @@
   <p:clrMapOvr>
     <a:masterClrMapping/>
   </p:clrMapOvr>
+  <mc:AlternateContent xmlns:mc="http://schemas.openxmlformats.org/markup-compatibility/2006">
+    <mc:Choice xmlns:p15="http://schemas.microsoft.com/office/powerpoint/2012/main" Requires="p15">
+      <p:transition xmlns:p14="http://schemas.microsoft.com/office/powerpoint/2010/main" spd="slow" p14:dur="1250">
+        <p15:prstTrans prst="peelOff"/>
+      </p:transition>
+    </mc:Choice>
+    <mc:Fallback>
+      <p:transition spd="slow">
+        <p:fade/>
+      </p:transition>
+    </mc:Fallback>
+  </mc:AlternateContent>
 </p:sld>
 </file>
 
@@ -6622,6 +7205,18 @@
   <p:clrMapOvr>
     <a:masterClrMapping/>
   </p:clrMapOvr>
+  <mc:AlternateContent xmlns:mc="http://schemas.openxmlformats.org/markup-compatibility/2006">
+    <mc:Choice xmlns:p15="http://schemas.microsoft.com/office/powerpoint/2012/main" Requires="p15">
+      <p:transition xmlns:p14="http://schemas.microsoft.com/office/powerpoint/2010/main" spd="slow" p14:dur="1250">
+        <p15:prstTrans prst="peelOff"/>
+      </p:transition>
+    </mc:Choice>
+    <mc:Fallback>
+      <p:transition spd="slow">
+        <p:fade/>
+      </p:transition>
+    </mc:Fallback>
+  </mc:AlternateContent>
 </p:sld>
 </file>
 
@@ -6768,6 +7363,18 @@
   <p:clrMapOvr>
     <a:masterClrMapping/>
   </p:clrMapOvr>
+  <mc:AlternateContent xmlns:mc="http://schemas.openxmlformats.org/markup-compatibility/2006">
+    <mc:Choice xmlns:p15="http://schemas.microsoft.com/office/powerpoint/2012/main" Requires="p15">
+      <p:transition xmlns:p14="http://schemas.microsoft.com/office/powerpoint/2010/main" spd="slow" p14:dur="1250">
+        <p15:prstTrans prst="peelOff"/>
+      </p:transition>
+    </mc:Choice>
+    <mc:Fallback>
+      <p:transition spd="slow">
+        <p:fade/>
+      </p:transition>
+    </mc:Fallback>
+  </mc:AlternateContent>
 </p:sld>
 </file>
 
@@ -6916,6 +7523,18 @@
   <p:clrMapOvr>
     <a:masterClrMapping/>
   </p:clrMapOvr>
+  <mc:AlternateContent xmlns:mc="http://schemas.openxmlformats.org/markup-compatibility/2006">
+    <mc:Choice xmlns:p15="http://schemas.microsoft.com/office/powerpoint/2012/main" Requires="p15">
+      <p:transition xmlns:p14="http://schemas.microsoft.com/office/powerpoint/2010/main" spd="slow" p14:dur="1250">
+        <p15:prstTrans prst="peelOff"/>
+      </p:transition>
+    </mc:Choice>
+    <mc:Fallback>
+      <p:transition spd="slow">
+        <p:fade/>
+      </p:transition>
+    </mc:Fallback>
+  </mc:AlternateContent>
 </p:sld>
 </file>
 
@@ -6954,7 +7573,7 @@
         </p:nvSpPr>
         <p:spPr>
           <a:xfrm>
-            <a:off x="1323537" y="504205"/>
+            <a:off x="1267266" y="1024710"/>
             <a:ext cx="10141631" cy="478457"/>
           </a:xfrm>
         </p:spPr>
@@ -6965,7 +7584,7 @@
           <a:lstStyle/>
           <a:p>
             <a:r>
-              <a:rPr lang="en-US" sz="2800" b="1" dirty="0"/>
+              <a:rPr lang="en-US" sz="3000" b="1" dirty="0"/>
               <a:t>Test, Train data and Models </a:t>
             </a:r>
           </a:p>
@@ -7033,7 +7652,7 @@
           <a:p>
             <a:r>
               <a:rPr lang="en-US" sz="2000" dirty="0"/>
-              <a:t>Lasso Model, Linear Regression ,Random Forest</a:t>
+              <a:t>Lasso Regression Model, Linear Regression ,Random Forest</a:t>
             </a:r>
           </a:p>
         </p:txBody>
@@ -7048,6 +7667,18 @@
   <p:clrMapOvr>
     <a:masterClrMapping/>
   </p:clrMapOvr>
+  <mc:AlternateContent xmlns:mc="http://schemas.openxmlformats.org/markup-compatibility/2006">
+    <mc:Choice xmlns:p15="http://schemas.microsoft.com/office/powerpoint/2012/main" Requires="p15">
+      <p:transition xmlns:p14="http://schemas.microsoft.com/office/powerpoint/2010/main" spd="slow" p14:dur="1250">
+        <p15:prstTrans prst="peelOff"/>
+      </p:transition>
+    </mc:Choice>
+    <mc:Fallback>
+      <p:transition spd="slow">
+        <p:fade/>
+      </p:transition>
+    </mc:Fallback>
+  </mc:AlternateContent>
 </p:sld>
 </file>
 
@@ -7098,7 +7729,7 @@
           <a:p>
             <a:r>
               <a:rPr lang="en-US" sz="2800" dirty="0"/>
-              <a:t>Correlation between Hospitals Charge Data County Health Ranking Data</a:t>
+              <a:t>Correlation between Hospitals Charge and County Health Ranking Indicators</a:t>
             </a:r>
           </a:p>
         </p:txBody>
@@ -7160,6 +7791,18 @@
   <p:clrMapOvr>
     <a:masterClrMapping/>
   </p:clrMapOvr>
+  <mc:AlternateContent xmlns:mc="http://schemas.openxmlformats.org/markup-compatibility/2006">
+    <mc:Choice xmlns:p15="http://schemas.microsoft.com/office/powerpoint/2012/main" Requires="p15">
+      <p:transition xmlns:p14="http://schemas.microsoft.com/office/powerpoint/2010/main" spd="slow" p14:dur="1250">
+        <p15:prstTrans prst="peelOff"/>
+      </p:transition>
+    </mc:Choice>
+    <mc:Fallback>
+      <p:transition spd="slow">
+        <p:fade/>
+      </p:transition>
+    </mc:Fallback>
+  </mc:AlternateContent>
 </p:sld>
 </file>
 
@@ -7232,7 +7875,7 @@
           </p:nvPr>
         </p:nvPicPr>
         <p:blipFill>
-          <a:blip r:embed="rId2">
+          <a:blip r:embed="rId3">
             <a:extLst>
               <a:ext uri="{28A0092B-C50C-407E-A947-70E740481C1C}">
                 <a14:useLocalDpi xmlns:a14="http://schemas.microsoft.com/office/drawing/2010/main" val="0"/>
@@ -7309,6 +7952,18 @@
   <p:clrMapOvr>
     <a:masterClrMapping/>
   </p:clrMapOvr>
+  <mc:AlternateContent xmlns:mc="http://schemas.openxmlformats.org/markup-compatibility/2006">
+    <mc:Choice xmlns:p15="http://schemas.microsoft.com/office/powerpoint/2012/main" Requires="p15">
+      <p:transition xmlns:p14="http://schemas.microsoft.com/office/powerpoint/2010/main" spd="slow" p14:dur="1250">
+        <p15:prstTrans prst="peelOff"/>
+      </p:transition>
+    </mc:Choice>
+    <mc:Fallback>
+      <p:transition spd="slow">
+        <p:fade/>
+      </p:transition>
+    </mc:Fallback>
+  </mc:AlternateContent>
 </p:sld>
 </file>
 
@@ -7384,7 +8039,7 @@
         <p:spPr>
           <a:xfrm>
             <a:off x="1237957" y="2489982"/>
-            <a:ext cx="10241278" cy="3742005"/>
+            <a:ext cx="10241278" cy="3882683"/>
           </a:xfrm>
         </p:spPr>
         <p:txBody>
@@ -7397,44 +8052,41 @@
               <a:buNone/>
             </a:pPr>
             <a:r>
-              <a:rPr lang="en-US" sz="1700" b="1" dirty="0"/>
-              <a:t>With an aim to explore what explains variations in hospital charge for similar or same procedure, Medicare outpatient data  is combined with hospital information data obtained from CMS web and visualized the charge data by state and by procedures and mapped by range of charge. Compared distribution of charge for different procedure types. The comparison shows inter state and intra state level variations in hospital charge. Complex and expensive procedures have more variations than simple or less expensive procedures. </a:t>
-            </a:r>
-            <a:endParaRPr lang="en-US" sz="1700" dirty="0"/>
+              <a:rPr lang="en-US" sz="1650" b="1" dirty="0"/>
+              <a:t>With an aim to understand what explains variations in hospital charge for similar or same procedure, Medicare outpatient charge data  is combined with hospital information data obtained from CMS website and visualized the charge data by state and by procedures and mapped by range of charge. Compared distribution of charge for different procedure types. The comparison shows inter state and intra state level variations in hospital charge. Complex and expensive procedures have more variations than simple or less expensive procedures. </a:t>
+            </a:r>
+            <a:endParaRPr lang="en-US" sz="1650" dirty="0"/>
           </a:p>
           <a:p>
             <a:pPr marL="0" indent="0">
               <a:buNone/>
             </a:pPr>
             <a:r>
-              <a:rPr lang="en-US" sz="1700" b="1" dirty="0"/>
-              <a:t>Estimated the model using different Statistical models mainly Lasso Regression using </a:t>
-            </a:r>
-            <a:r>
-              <a:rPr lang="en-US" sz="1700" b="1" dirty="0" err="1"/>
+              <a:rPr lang="en-US" sz="1650" b="1" dirty="0"/>
+              <a:t>Estimated models using different statistical models mainly Lasso Regression using </a:t>
+            </a:r>
+            <a:r>
+              <a:rPr lang="en-US" sz="1650" b="1" dirty="0" err="1"/>
               <a:t>sklearn</a:t>
             </a:r>
             <a:r>
-              <a:rPr lang="en-US" sz="1700" b="1" dirty="0"/>
+              <a:rPr lang="en-US" sz="1650" b="1" dirty="0"/>
               <a:t> machine learning tool and OLS linear regression.</a:t>
             </a:r>
-            <a:endParaRPr lang="en-US" sz="1700" dirty="0"/>
+            <a:endParaRPr lang="en-US" sz="1650" dirty="0"/>
           </a:p>
           <a:p>
             <a:pPr marL="0" indent="0">
               <a:buNone/>
             </a:pPr>
             <a:r>
-              <a:rPr lang="en-US" sz="1700" b="1" dirty="0"/>
-              <a:t>The goal of the prediction model is to see if there are county level health, social and economic factors explaining variations in average charge in USA counties.  The result indicates that counties with more % of uninsured population , % of over 65   and % of African-American charged more. In contrary, counties with more % of rural communities charged less. However, the model explains only 1/3 of variations in the hospital charge. This may imply hospital charge is more about market power of hospitals and other factors.  Including Cost to Charge ratio  in the prediction  would be a good move to test effect of market power of hospitals.</a:t>
-            </a:r>
-            <a:endParaRPr lang="en-US" sz="1700" dirty="0"/>
-          </a:p>
-          <a:p>
+              <a:rPr lang="en-US" sz="1650" b="1" dirty="0"/>
+              <a:t>The goal of the prediction models is to see if there are county level health, social and economic factors explaining variations in average charge in USA counties.  The result indicates that counties with more % of uninsured population , % of over 65   and % of African-American charged more to Medicare insured patients.  Hospitals are probably shifting cost. In contrary, counties with more % of rural communities charged less. However, the model explains only 1/3 of variations in the hospital charge. This may imply hospital charge is more about market power of hospitals and other factors.  Including cost to charge ratio  in the prediction  would be a good move to test effect of hospitals market power on hospital charge.</a:t>
+            </a:r>
             <a:br>
-              <a:rPr lang="en-US" sz="1700" dirty="0"/>
+              <a:rPr lang="en-US" sz="1650" dirty="0"/>
             </a:br>
-            <a:endParaRPr lang="en-US" sz="1700" dirty="0">
+            <a:endParaRPr lang="en-US" sz="1650" dirty="0">
               <a:cs typeface="Arial" panose="020B0604020202020204" pitchFamily="34" charset="0"/>
             </a:endParaRPr>
           </a:p>
@@ -7450,6 +8102,18 @@
   <p:clrMapOvr>
     <a:masterClrMapping/>
   </p:clrMapOvr>
+  <mc:AlternateContent xmlns:mc="http://schemas.openxmlformats.org/markup-compatibility/2006">
+    <mc:Choice xmlns:p15="http://schemas.microsoft.com/office/powerpoint/2012/main" Requires="p15">
+      <p:transition xmlns:p14="http://schemas.microsoft.com/office/powerpoint/2010/main" spd="slow" p14:dur="1250">
+        <p15:prstTrans prst="peelOff"/>
+      </p:transition>
+    </mc:Choice>
+    <mc:Fallback>
+      <p:transition spd="slow">
+        <p:fade/>
+      </p:transition>
+    </mc:Fallback>
+  </mc:AlternateContent>
 </p:sld>
 </file>
 
@@ -11202,6 +11866,18 @@
   <p:clrMapOvr>
     <a:masterClrMapping/>
   </p:clrMapOvr>
+  <mc:AlternateContent xmlns:mc="http://schemas.openxmlformats.org/markup-compatibility/2006">
+    <mc:Choice xmlns:p15="http://schemas.microsoft.com/office/powerpoint/2012/main" Requires="p15">
+      <p:transition xmlns:p14="http://schemas.microsoft.com/office/powerpoint/2010/main" spd="slow" p14:dur="1250">
+        <p15:prstTrans prst="peelOff"/>
+      </p:transition>
+    </mc:Choice>
+    <mc:Fallback>
+      <p:transition spd="slow">
+        <p:fade/>
+      </p:transition>
+    </mc:Fallback>
+  </mc:AlternateContent>
 </p:sld>
 </file>
 
@@ -11317,7 +11993,7 @@
           <a:p>
             <a:r>
               <a:rPr lang="en-US" sz="2600" dirty="0"/>
-              <a:t>I will try to find market power indicators and include in the model(CCR data) to improve the good of fit of the models.</a:t>
+              <a:t>I will try to find market power indicators and include in the model(CCR data) to improve the goodness of fit for the models.</a:t>
             </a:r>
           </a:p>
           <a:p>
@@ -11347,6 +12023,11 @@
 <file path=ppt/slides/slide3.xml><?xml version="1.0" encoding="utf-8"?>
 <p:sld xmlns:a="http://schemas.openxmlformats.org/drawingml/2006/main" xmlns:r="http://schemas.openxmlformats.org/officeDocument/2006/relationships" xmlns:p="http://schemas.openxmlformats.org/presentationml/2006/main">
   <p:cSld>
+    <p:bg>
+      <p:bgRef idx="1003">
+        <a:schemeClr val="bg1"/>
+      </p:bgRef>
+    </p:bg>
     <p:spTree>
       <p:nvGrpSpPr>
         <p:cNvPr id="1" name=""/>
@@ -11531,14 +12212,31 @@
     </p:extLst>
   </p:cSld>
   <p:clrMapOvr>
-    <a:masterClrMapping/>
+    <a:overrideClrMapping bg1="lt1" tx1="dk1" bg2="lt2" tx2="dk2" accent1="accent1" accent2="accent2" accent3="accent3" accent4="accent4" accent5="accent5" accent6="accent6" hlink="hlink" folHlink="folHlink"/>
   </p:clrMapOvr>
+  <mc:AlternateContent xmlns:mc="http://schemas.openxmlformats.org/markup-compatibility/2006">
+    <mc:Choice xmlns:p15="http://schemas.microsoft.com/office/powerpoint/2012/main" Requires="p15">
+      <p:transition xmlns:p14="http://schemas.microsoft.com/office/powerpoint/2010/main" spd="slow" p14:dur="1250">
+        <p15:prstTrans prst="peelOff"/>
+      </p:transition>
+    </mc:Choice>
+    <mc:Fallback>
+      <p:transition spd="slow">
+        <p:fade/>
+      </p:transition>
+    </mc:Fallback>
+  </mc:AlternateContent>
 </p:sld>
 </file>
 
 <file path=ppt/slides/slide4.xml><?xml version="1.0" encoding="utf-8"?>
 <p:sld xmlns:a="http://schemas.openxmlformats.org/drawingml/2006/main" xmlns:r="http://schemas.openxmlformats.org/officeDocument/2006/relationships" xmlns:p="http://schemas.openxmlformats.org/presentationml/2006/main">
   <p:cSld>
+    <p:bg>
+      <p:bgRef idx="1003">
+        <a:schemeClr val="bg1"/>
+      </p:bgRef>
+    </p:bg>
     <p:spTree>
       <p:nvGrpSpPr>
         <p:cNvPr id="1" name=""/>
@@ -11678,14 +12376,31 @@
     </p:extLst>
   </p:cSld>
   <p:clrMapOvr>
-    <a:masterClrMapping/>
+    <a:overrideClrMapping bg1="lt1" tx1="dk1" bg2="lt2" tx2="dk2" accent1="accent1" accent2="accent2" accent3="accent3" accent4="accent4" accent5="accent5" accent6="accent6" hlink="hlink" folHlink="folHlink"/>
   </p:clrMapOvr>
+  <mc:AlternateContent xmlns:mc="http://schemas.openxmlformats.org/markup-compatibility/2006">
+    <mc:Choice xmlns:p15="http://schemas.microsoft.com/office/powerpoint/2012/main" Requires="p15">
+      <p:transition xmlns:p14="http://schemas.microsoft.com/office/powerpoint/2010/main" spd="slow" p14:dur="1250">
+        <p15:prstTrans prst="peelOff"/>
+      </p:transition>
+    </mc:Choice>
+    <mc:Fallback>
+      <p:transition spd="slow">
+        <p:fade/>
+      </p:transition>
+    </mc:Fallback>
+  </mc:AlternateContent>
 </p:sld>
 </file>
 
 <file path=ppt/slides/slide5.xml><?xml version="1.0" encoding="utf-8"?>
 <p:sld xmlns:a="http://schemas.openxmlformats.org/drawingml/2006/main" xmlns:r="http://schemas.openxmlformats.org/officeDocument/2006/relationships" xmlns:p="http://schemas.openxmlformats.org/presentationml/2006/main">
   <p:cSld>
+    <p:bg>
+      <p:bgRef idx="1003">
+        <a:schemeClr val="bg1"/>
+      </p:bgRef>
+    </p:bg>
     <p:spTree>
       <p:nvGrpSpPr>
         <p:cNvPr id="1" name=""/>
@@ -11826,8 +12541,20 @@
     </p:extLst>
   </p:cSld>
   <p:clrMapOvr>
-    <a:masterClrMapping/>
+    <a:overrideClrMapping bg1="lt1" tx1="dk1" bg2="lt2" tx2="dk2" accent1="accent1" accent2="accent2" accent3="accent3" accent4="accent4" accent5="accent5" accent6="accent6" hlink="hlink" folHlink="folHlink"/>
   </p:clrMapOvr>
+  <mc:AlternateContent xmlns:mc="http://schemas.openxmlformats.org/markup-compatibility/2006">
+    <mc:Choice xmlns:p15="http://schemas.microsoft.com/office/powerpoint/2012/main" Requires="p15">
+      <p:transition xmlns:p14="http://schemas.microsoft.com/office/powerpoint/2010/main" spd="slow" p14:dur="1250">
+        <p15:prstTrans prst="peelOff"/>
+      </p:transition>
+    </mc:Choice>
+    <mc:Fallback>
+      <p:transition spd="slow">
+        <p:fade/>
+      </p:transition>
+    </mc:Fallback>
+  </mc:AlternateContent>
 </p:sld>
 </file>
 
@@ -11962,6 +12689,18 @@
   <p:clrMapOvr>
     <a:masterClrMapping/>
   </p:clrMapOvr>
+  <mc:AlternateContent xmlns:mc="http://schemas.openxmlformats.org/markup-compatibility/2006">
+    <mc:Choice xmlns:p15="http://schemas.microsoft.com/office/powerpoint/2012/main" Requires="p15">
+      <p:transition xmlns:p14="http://schemas.microsoft.com/office/powerpoint/2010/main" spd="slow" p14:dur="1250">
+        <p15:prstTrans prst="peelOff"/>
+      </p:transition>
+    </mc:Choice>
+    <mc:Fallback>
+      <p:transition spd="slow">
+        <p:fade/>
+      </p:transition>
+    </mc:Fallback>
+  </mc:AlternateContent>
 </p:sld>
 </file>
 
@@ -12110,12 +12849,29 @@
   <p:clrMapOvr>
     <a:masterClrMapping/>
   </p:clrMapOvr>
+  <mc:AlternateContent xmlns:mc="http://schemas.openxmlformats.org/markup-compatibility/2006">
+    <mc:Choice xmlns:p15="http://schemas.microsoft.com/office/powerpoint/2012/main" Requires="p15">
+      <p:transition xmlns:p14="http://schemas.microsoft.com/office/powerpoint/2010/main" spd="slow" p14:dur="1250">
+        <p15:prstTrans prst="peelOff"/>
+      </p:transition>
+    </mc:Choice>
+    <mc:Fallback>
+      <p:transition spd="slow">
+        <p:fade/>
+      </p:transition>
+    </mc:Fallback>
+  </mc:AlternateContent>
 </p:sld>
 </file>
 
 <file path=ppt/slides/slide8.xml><?xml version="1.0" encoding="utf-8"?>
 <p:sld xmlns:a="http://schemas.openxmlformats.org/drawingml/2006/main" xmlns:r="http://schemas.openxmlformats.org/officeDocument/2006/relationships" xmlns:p="http://schemas.openxmlformats.org/presentationml/2006/main">
   <p:cSld>
+    <p:bg>
+      <p:bgRef idx="1003">
+        <a:schemeClr val="bg1"/>
+      </p:bgRef>
+    </p:bg>
     <p:spTree>
       <p:nvGrpSpPr>
         <p:cNvPr id="1" name=""/>
@@ -12154,13 +12910,13 @@
         </p:spPr>
         <p:txBody>
           <a:bodyPr>
-            <a:normAutofit/>
+            <a:normAutofit fontScale="90000"/>
           </a:bodyPr>
           <a:lstStyle/>
           <a:p>
             <a:r>
               <a:rPr lang="en-US" sz="3600" dirty="0"/>
-              <a:t>Exploration of Medicare Outpatient Charge Data</a:t>
+              <a:t>Exploration of Medicare Outpatient Charge Data 2016</a:t>
             </a:r>
           </a:p>
         </p:txBody>
@@ -12215,7 +12971,7 @@
           <p:nvPr>
             <p:extLst>
               <p:ext uri="{D42A27DB-BD31-4B8C-83A1-F6EECF244321}">
-                <p14:modId xmlns:p14="http://schemas.microsoft.com/office/powerpoint/2010/main" val="2339747896"/>
+                <p14:modId xmlns:p14="http://schemas.microsoft.com/office/powerpoint/2010/main" val="2961252668"/>
               </p:ext>
             </p:extLst>
           </p:nvPr>
@@ -12259,14 +13015,14 @@
                     </a:ext>
                   </a:extLst>
                 </a:gridCol>
-                <a:gridCol w="1451429">
+                <a:gridCol w="1515515">
                   <a:extLst>
                     <a:ext uri="{9D8B030D-6E8A-4147-A177-3AD203B41FA5}">
                       <a16:colId xmlns:a16="http://schemas.microsoft.com/office/drawing/2014/main" val="1800830213"/>
                     </a:ext>
                   </a:extLst>
                 </a:gridCol>
-                <a:gridCol w="1349829">
+                <a:gridCol w="1285743">
                   <a:extLst>
                     <a:ext uri="{9D8B030D-6E8A-4147-A177-3AD203B41FA5}">
                       <a16:colId xmlns:a16="http://schemas.microsoft.com/office/drawing/2014/main" val="3444008939"/>
@@ -12337,20 +13093,13 @@
                         <a:t>Average Estimated Total Submitted Charges</a:t>
                       </a:r>
                     </a:p>
-                  </a:txBody>
-                  <a:tcPr marL="69122" marR="69122" marT="34561" marB="34561" anchor="ctr"/>
-                </a:tc>
-                <a:tc>
-                  <a:txBody>
-                    <a:bodyPr/>
-                    <a:lstStyle/>
                     <a:p>
                       <a:pPr algn="r" fontAlgn="ctr"/>
                       <a:r>
                         <a:rPr lang="en-US" sz="1400" b="1" dirty="0">
                           <a:effectLst/>
                         </a:rPr>
-                        <a:t>Average Medicare Allowed Amount</a:t>
+                        <a:t>(In US $)</a:t>
                       </a:r>
                     </a:p>
                   </a:txBody>
@@ -12366,7 +13115,23 @@
                         <a:rPr lang="en-US" sz="1400" b="1" dirty="0">
                           <a:effectLst/>
                         </a:rPr>
-                        <a:t>Average Medicare Payment Amount</a:t>
+                        <a:t>Average Medicare Allowed Amount (In US $)</a:t>
+                      </a:r>
+                    </a:p>
+                  </a:txBody>
+                  <a:tcPr marL="69122" marR="69122" marT="34561" marB="34561" anchor="ctr"/>
+                </a:tc>
+                <a:tc>
+                  <a:txBody>
+                    <a:bodyPr/>
+                    <a:lstStyle/>
+                    <a:p>
+                      <a:pPr algn="r" fontAlgn="ctr"/>
+                      <a:r>
+                        <a:rPr lang="en-US" sz="1400" b="1" dirty="0">
+                          <a:effectLst/>
+                        </a:rPr>
+                        <a:t>Average Medicare Payment Amount (In US $)</a:t>
                       </a:r>
                     </a:p>
                   </a:txBody>
@@ -12398,7 +13163,7 @@
                         <a:rPr lang="en-US" sz="1400" b="1" dirty="0">
                           <a:effectLst/>
                         </a:rPr>
-                        <a:t>Average Medicare Outlier Amount</a:t>
+                        <a:t>Average Medicare Outlier Amount (In US $)</a:t>
                       </a:r>
                     </a:p>
                   </a:txBody>
@@ -13374,14 +14139,31 @@
     </p:extLst>
   </p:cSld>
   <p:clrMapOvr>
-    <a:masterClrMapping/>
+    <a:overrideClrMapping bg1="lt1" tx1="dk1" bg2="lt2" tx2="dk2" accent1="accent1" accent2="accent2" accent3="accent3" accent4="accent4" accent5="accent5" accent6="accent6" hlink="hlink" folHlink="folHlink"/>
   </p:clrMapOvr>
+  <mc:AlternateContent xmlns:mc="http://schemas.openxmlformats.org/markup-compatibility/2006">
+    <mc:Choice xmlns:p15="http://schemas.microsoft.com/office/powerpoint/2012/main" Requires="p15">
+      <p:transition xmlns:p14="http://schemas.microsoft.com/office/powerpoint/2010/main" spd="slow" p14:dur="1250">
+        <p15:prstTrans prst="peelOff"/>
+      </p:transition>
+    </mc:Choice>
+    <mc:Fallback>
+      <p:transition spd="slow">
+        <p:fade/>
+      </p:transition>
+    </mc:Fallback>
+  </mc:AlternateContent>
 </p:sld>
 </file>
 
 <file path=ppt/slides/slide9.xml><?xml version="1.0" encoding="utf-8"?>
 <p:sld xmlns:a="http://schemas.openxmlformats.org/drawingml/2006/main" xmlns:r="http://schemas.openxmlformats.org/officeDocument/2006/relationships" xmlns:p="http://schemas.openxmlformats.org/presentationml/2006/main">
   <p:cSld>
+    <p:bg>
+      <p:bgRef idx="1003">
+        <a:schemeClr val="bg1"/>
+      </p:bgRef>
+    </p:bg>
     <p:spTree>
       <p:nvGrpSpPr>
         <p:cNvPr id="1" name=""/>
@@ -13427,40 +14209,6 @@
             <a:r>
               <a:rPr lang="en-US" sz="3600" dirty="0"/>
               <a:t>Submitted Charge vs Medicare Allowed Charges</a:t>
-            </a:r>
-          </a:p>
-        </p:txBody>
-      </p:sp>
-      <p:sp>
-        <p:nvSpPr>
-          <p:cNvPr id="3" name="Rectangle 2">
-            <a:extLst>
-              <a:ext uri="{FF2B5EF4-FFF2-40B4-BE49-F238E27FC236}">
-                <a16:creationId xmlns:a16="http://schemas.microsoft.com/office/drawing/2014/main" id="{C4BE70F4-B7C8-4B58-B8C3-28356F1C1AD6}"/>
-              </a:ext>
-            </a:extLst>
-          </p:cNvPr>
-          <p:cNvSpPr/>
-          <p:nvPr/>
-        </p:nvSpPr>
-        <p:spPr>
-          <a:xfrm>
-            <a:off x="8744948" y="1601640"/>
-            <a:ext cx="3048000" cy="931074"/>
-          </a:xfrm>
-          <a:prstGeom prst="rect">
-            <a:avLst/>
-          </a:prstGeom>
-        </p:spPr>
-        <p:txBody>
-          <a:bodyPr wrap="square">
-            <a:spAutoFit/>
-          </a:bodyPr>
-          <a:lstStyle/>
-          <a:p>
-            <a:r>
-              <a:rPr lang="en-US" dirty="0"/>
-              <a:t>Large gap between Medicare Allowed charges and what the Providers charge</a:t>
             </a:r>
           </a:p>
         </p:txBody>
@@ -13482,7 +14230,7 @@
           </p:nvPr>
         </p:nvPicPr>
         <p:blipFill>
-          <a:blip r:embed="rId2">
+          <a:blip r:embed="rId3">
             <a:extLst>
               <a:ext uri="{28A0092B-C50C-407E-A947-70E740481C1C}">
                 <a14:useLocalDpi xmlns:a14="http://schemas.microsoft.com/office/drawing/2010/main" val="0"/>
@@ -13514,6 +14262,40 @@
           </a:extLst>
         </p:spPr>
       </p:pic>
+      <p:sp>
+        <p:nvSpPr>
+          <p:cNvPr id="3" name="Rectangle 2">
+            <a:extLst>
+              <a:ext uri="{FF2B5EF4-FFF2-40B4-BE49-F238E27FC236}">
+                <a16:creationId xmlns:a16="http://schemas.microsoft.com/office/drawing/2014/main" id="{C4BE70F4-B7C8-4B58-B8C3-28356F1C1AD6}"/>
+              </a:ext>
+            </a:extLst>
+          </p:cNvPr>
+          <p:cNvSpPr/>
+          <p:nvPr/>
+        </p:nvSpPr>
+        <p:spPr>
+          <a:xfrm>
+            <a:off x="8744948" y="1601640"/>
+            <a:ext cx="3048000" cy="931074"/>
+          </a:xfrm>
+          <a:prstGeom prst="rect">
+            <a:avLst/>
+          </a:prstGeom>
+        </p:spPr>
+        <p:txBody>
+          <a:bodyPr wrap="square">
+            <a:spAutoFit/>
+          </a:bodyPr>
+          <a:lstStyle/>
+          <a:p>
+            <a:r>
+              <a:rPr lang="en-US" dirty="0"/>
+              <a:t>Large gap between Medicare Allowed charges and what the Providers charge</a:t>
+            </a:r>
+          </a:p>
+        </p:txBody>
+      </p:sp>
     </p:spTree>
     <p:extLst>
       <p:ext uri="{BB962C8B-B14F-4D97-AF65-F5344CB8AC3E}">
@@ -13522,8 +14304,20 @@
     </p:extLst>
   </p:cSld>
   <p:clrMapOvr>
-    <a:masterClrMapping/>
+    <a:overrideClrMapping bg1="lt1" tx1="dk1" bg2="lt2" tx2="dk2" accent1="accent1" accent2="accent2" accent3="accent3" accent4="accent4" accent5="accent5" accent6="accent6" hlink="hlink" folHlink="folHlink"/>
   </p:clrMapOvr>
+  <mc:AlternateContent xmlns:mc="http://schemas.openxmlformats.org/markup-compatibility/2006">
+    <mc:Choice xmlns:p15="http://schemas.microsoft.com/office/powerpoint/2012/main" Requires="p15">
+      <p:transition xmlns:p14="http://schemas.microsoft.com/office/powerpoint/2010/main" spd="slow" p14:dur="1250">
+        <p15:prstTrans prst="peelOff"/>
+      </p:transition>
+    </mc:Choice>
+    <mc:Fallback>
+      <p:transition spd="slow">
+        <p:fade/>
+      </p:transition>
+    </mc:Fallback>
+  </mc:AlternateContent>
 </p:sld>
 </file>
 
@@ -13758,4 +14552,514 @@
     </a:ext>
   </a:extLst>
 </a:theme>
+</file>
+
+<file path=ppt/theme/theme2.xml><?xml version="1.0" encoding="utf-8"?>
+<a:theme xmlns:a="http://schemas.openxmlformats.org/drawingml/2006/main" name="Office Theme">
+  <a:themeElements>
+    <a:clrScheme name="Office">
+      <a:dk1>
+        <a:sysClr val="windowText" lastClr="000000"/>
+      </a:dk1>
+      <a:lt1>
+        <a:sysClr val="window" lastClr="FFFFFF"/>
+      </a:lt1>
+      <a:dk2>
+        <a:srgbClr val="44546A"/>
+      </a:dk2>
+      <a:lt2>
+        <a:srgbClr val="E7E6E6"/>
+      </a:lt2>
+      <a:accent1>
+        <a:srgbClr val="4472C4"/>
+      </a:accent1>
+      <a:accent2>
+        <a:srgbClr val="ED7D31"/>
+      </a:accent2>
+      <a:accent3>
+        <a:srgbClr val="A5A5A5"/>
+      </a:accent3>
+      <a:accent4>
+        <a:srgbClr val="FFC000"/>
+      </a:accent4>
+      <a:accent5>
+        <a:srgbClr val="5B9BD5"/>
+      </a:accent5>
+      <a:accent6>
+        <a:srgbClr val="70AD47"/>
+      </a:accent6>
+      <a:hlink>
+        <a:srgbClr val="0563C1"/>
+      </a:hlink>
+      <a:folHlink>
+        <a:srgbClr val="954F72"/>
+      </a:folHlink>
+    </a:clrScheme>
+    <a:fontScheme name="Office">
+      <a:majorFont>
+        <a:latin typeface="Calibri Light" panose="020F0302020204030204"/>
+        <a:ea typeface=""/>
+        <a:cs typeface=""/>
+        <a:font script="Jpan" typeface="游ゴシック Light"/>
+        <a:font script="Hang" typeface="맑은 고딕"/>
+        <a:font script="Hans" typeface="等线 Light"/>
+        <a:font script="Hant" typeface="新細明體"/>
+        <a:font script="Arab" typeface="Times New Roman"/>
+        <a:font script="Hebr" typeface="Times New Roman"/>
+        <a:font script="Thai" typeface="Angsana New"/>
+        <a:font script="Ethi" typeface="Nyala"/>
+        <a:font script="Beng" typeface="Vrinda"/>
+        <a:font script="Gujr" typeface="Shruti"/>
+        <a:font script="Khmr" typeface="MoolBoran"/>
+        <a:font script="Knda" typeface="Tunga"/>
+        <a:font script="Guru" typeface="Raavi"/>
+        <a:font script="Cans" typeface="Euphemia"/>
+        <a:font script="Cher" typeface="Plantagenet Cherokee"/>
+        <a:font script="Yiii" typeface="Microsoft Yi Baiti"/>
+        <a:font script="Tibt" typeface="Microsoft Himalaya"/>
+        <a:font script="Thaa" typeface="MV Boli"/>
+        <a:font script="Deva" typeface="Mangal"/>
+        <a:font script="Telu" typeface="Gautami"/>
+        <a:font script="Taml" typeface="Latha"/>
+        <a:font script="Syrc" typeface="Estrangelo Edessa"/>
+        <a:font script="Orya" typeface="Kalinga"/>
+        <a:font script="Mlym" typeface="Kartika"/>
+        <a:font script="Laoo" typeface="DokChampa"/>
+        <a:font script="Sinh" typeface="Iskoola Pota"/>
+        <a:font script="Mong" typeface="Mongolian Baiti"/>
+        <a:font script="Viet" typeface="Times New Roman"/>
+        <a:font script="Uigh" typeface="Microsoft Uighur"/>
+        <a:font script="Geor" typeface="Sylfaen"/>
+        <a:font script="Armn" typeface="Arial"/>
+        <a:font script="Bugi" typeface="Leelawadee UI"/>
+        <a:font script="Bopo" typeface="Microsoft JhengHei"/>
+        <a:font script="Java" typeface="Javanese Text"/>
+        <a:font script="Lisu" typeface="Segoe UI"/>
+        <a:font script="Mymr" typeface="Myanmar Text"/>
+        <a:font script="Nkoo" typeface="Ebrima"/>
+        <a:font script="Olck" typeface="Nirmala UI"/>
+        <a:font script="Osma" typeface="Ebrima"/>
+        <a:font script="Phag" typeface="Phagspa"/>
+        <a:font script="Syrn" typeface="Estrangelo Edessa"/>
+        <a:font script="Syrj" typeface="Estrangelo Edessa"/>
+        <a:font script="Syre" typeface="Estrangelo Edessa"/>
+        <a:font script="Sora" typeface="Nirmala UI"/>
+        <a:font script="Tale" typeface="Microsoft Tai Le"/>
+        <a:font script="Talu" typeface="Microsoft New Tai Lue"/>
+        <a:font script="Tfng" typeface="Ebrima"/>
+      </a:majorFont>
+      <a:minorFont>
+        <a:latin typeface="Calibri" panose="020F0502020204030204"/>
+        <a:ea typeface=""/>
+        <a:cs typeface=""/>
+        <a:font script="Jpan" typeface="游ゴシック"/>
+        <a:font script="Hang" typeface="맑은 고딕"/>
+        <a:font script="Hans" typeface="等线"/>
+        <a:font script="Hant" typeface="新細明體"/>
+        <a:font script="Arab" typeface="Arial"/>
+        <a:font script="Hebr" typeface="Arial"/>
+        <a:font script="Thai" typeface="Cordia New"/>
+        <a:font script="Ethi" typeface="Nyala"/>
+        <a:font script="Beng" typeface="Vrinda"/>
+        <a:font script="Gujr" typeface="Shruti"/>
+        <a:font script="Khmr" typeface="DaunPenh"/>
+        <a:font script="Knda" typeface="Tunga"/>
+        <a:font script="Guru" typeface="Raavi"/>
+        <a:font script="Cans" typeface="Euphemia"/>
+        <a:font script="Cher" typeface="Plantagenet Cherokee"/>
+        <a:font script="Yiii" typeface="Microsoft Yi Baiti"/>
+        <a:font script="Tibt" typeface="Microsoft Himalaya"/>
+        <a:font script="Thaa" typeface="MV Boli"/>
+        <a:font script="Deva" typeface="Mangal"/>
+        <a:font script="Telu" typeface="Gautami"/>
+        <a:font script="Taml" typeface="Latha"/>
+        <a:font script="Syrc" typeface="Estrangelo Edessa"/>
+        <a:font script="Orya" typeface="Kalinga"/>
+        <a:font script="Mlym" typeface="Kartika"/>
+        <a:font script="Laoo" typeface="DokChampa"/>
+        <a:font script="Sinh" typeface="Iskoola Pota"/>
+        <a:font script="Mong" typeface="Mongolian Baiti"/>
+        <a:font script="Viet" typeface="Arial"/>
+        <a:font script="Uigh" typeface="Microsoft Uighur"/>
+        <a:font script="Geor" typeface="Sylfaen"/>
+        <a:font script="Armn" typeface="Arial"/>
+        <a:font script="Bugi" typeface="Leelawadee UI"/>
+        <a:font script="Bopo" typeface="Microsoft JhengHei"/>
+        <a:font script="Java" typeface="Javanese Text"/>
+        <a:font script="Lisu" typeface="Segoe UI"/>
+        <a:font script="Mymr" typeface="Myanmar Text"/>
+        <a:font script="Nkoo" typeface="Ebrima"/>
+        <a:font script="Olck" typeface="Nirmala UI"/>
+        <a:font script="Osma" typeface="Ebrima"/>
+        <a:font script="Phag" typeface="Phagspa"/>
+        <a:font script="Syrn" typeface="Estrangelo Edessa"/>
+        <a:font script="Syrj" typeface="Estrangelo Edessa"/>
+        <a:font script="Syre" typeface="Estrangelo Edessa"/>
+        <a:font script="Sora" typeface="Nirmala UI"/>
+        <a:font script="Tale" typeface="Microsoft Tai Le"/>
+        <a:font script="Talu" typeface="Microsoft New Tai Lue"/>
+        <a:font script="Tfng" typeface="Ebrima"/>
+      </a:minorFont>
+    </a:fontScheme>
+    <a:fmtScheme name="Office">
+      <a:fillStyleLst>
+        <a:solidFill>
+          <a:schemeClr val="phClr"/>
+        </a:solidFill>
+        <a:gradFill rotWithShape="1">
+          <a:gsLst>
+            <a:gs pos="0">
+              <a:schemeClr val="phClr">
+                <a:lumMod val="110000"/>
+                <a:satMod val="105000"/>
+                <a:tint val="67000"/>
+              </a:schemeClr>
+            </a:gs>
+            <a:gs pos="50000">
+              <a:schemeClr val="phClr">
+                <a:lumMod val="105000"/>
+                <a:satMod val="103000"/>
+                <a:tint val="73000"/>
+              </a:schemeClr>
+            </a:gs>
+            <a:gs pos="100000">
+              <a:schemeClr val="phClr">
+                <a:lumMod val="105000"/>
+                <a:satMod val="109000"/>
+                <a:tint val="81000"/>
+              </a:schemeClr>
+            </a:gs>
+          </a:gsLst>
+          <a:lin ang="5400000" scaled="0"/>
+        </a:gradFill>
+        <a:gradFill rotWithShape="1">
+          <a:gsLst>
+            <a:gs pos="0">
+              <a:schemeClr val="phClr">
+                <a:satMod val="103000"/>
+                <a:lumMod val="102000"/>
+                <a:tint val="94000"/>
+              </a:schemeClr>
+            </a:gs>
+            <a:gs pos="50000">
+              <a:schemeClr val="phClr">
+                <a:satMod val="110000"/>
+                <a:lumMod val="100000"/>
+                <a:shade val="100000"/>
+              </a:schemeClr>
+            </a:gs>
+            <a:gs pos="100000">
+              <a:schemeClr val="phClr">
+                <a:lumMod val="99000"/>
+                <a:satMod val="120000"/>
+                <a:shade val="78000"/>
+              </a:schemeClr>
+            </a:gs>
+          </a:gsLst>
+          <a:lin ang="5400000" scaled="0"/>
+        </a:gradFill>
+      </a:fillStyleLst>
+      <a:lnStyleLst>
+        <a:ln w="6350" cap="flat" cmpd="sng" algn="ctr">
+          <a:solidFill>
+            <a:schemeClr val="phClr"/>
+          </a:solidFill>
+          <a:prstDash val="solid"/>
+          <a:miter lim="800000"/>
+        </a:ln>
+        <a:ln w="12700" cap="flat" cmpd="sng" algn="ctr">
+          <a:solidFill>
+            <a:schemeClr val="phClr"/>
+          </a:solidFill>
+          <a:prstDash val="solid"/>
+          <a:miter lim="800000"/>
+        </a:ln>
+        <a:ln w="19050" cap="flat" cmpd="sng" algn="ctr">
+          <a:solidFill>
+            <a:schemeClr val="phClr"/>
+          </a:solidFill>
+          <a:prstDash val="solid"/>
+          <a:miter lim="800000"/>
+        </a:ln>
+      </a:lnStyleLst>
+      <a:effectStyleLst>
+        <a:effectStyle>
+          <a:effectLst/>
+        </a:effectStyle>
+        <a:effectStyle>
+          <a:effectLst/>
+        </a:effectStyle>
+        <a:effectStyle>
+          <a:effectLst>
+            <a:outerShdw blurRad="57150" dist="19050" dir="5400000" algn="ctr" rotWithShape="0">
+              <a:srgbClr val="000000">
+                <a:alpha val="63000"/>
+              </a:srgbClr>
+            </a:outerShdw>
+          </a:effectLst>
+        </a:effectStyle>
+      </a:effectStyleLst>
+      <a:bgFillStyleLst>
+        <a:solidFill>
+          <a:schemeClr val="phClr"/>
+        </a:solidFill>
+        <a:solidFill>
+          <a:schemeClr val="phClr">
+            <a:tint val="95000"/>
+            <a:satMod val="170000"/>
+          </a:schemeClr>
+        </a:solidFill>
+        <a:gradFill rotWithShape="1">
+          <a:gsLst>
+            <a:gs pos="0">
+              <a:schemeClr val="phClr">
+                <a:tint val="93000"/>
+                <a:satMod val="150000"/>
+                <a:shade val="98000"/>
+                <a:lumMod val="102000"/>
+              </a:schemeClr>
+            </a:gs>
+            <a:gs pos="50000">
+              <a:schemeClr val="phClr">
+                <a:tint val="98000"/>
+                <a:satMod val="130000"/>
+                <a:shade val="90000"/>
+                <a:lumMod val="103000"/>
+              </a:schemeClr>
+            </a:gs>
+            <a:gs pos="100000">
+              <a:schemeClr val="phClr">
+                <a:shade val="63000"/>
+                <a:satMod val="120000"/>
+              </a:schemeClr>
+            </a:gs>
+          </a:gsLst>
+          <a:lin ang="5400000" scaled="0"/>
+        </a:gradFill>
+      </a:bgFillStyleLst>
+    </a:fmtScheme>
+  </a:themeElements>
+  <a:objectDefaults/>
+  <a:extraClrSchemeLst/>
+  <a:extLst>
+    <a:ext uri="{05A4C25C-085E-4340-85A3-A5531E510DB2}">
+      <thm15:themeFamily xmlns:thm15="http://schemas.microsoft.com/office/thememl/2012/main" name="Office Theme" id="{62F939B6-93AF-4DB8-9C6B-D6C7DFDC589F}" vid="{4A3C46E8-61CC-4603-A589-7422A47A8E4A}"/>
+    </a:ext>
+  </a:extLst>
+</a:theme>
+</file>
+
+<file path=ppt/theme/themeOverride1.xml><?xml version="1.0" encoding="utf-8"?>
+<a:themeOverride xmlns:a="http://schemas.openxmlformats.org/drawingml/2006/main">
+  <a:clrScheme name="Organic">
+    <a:dk1>
+      <a:sysClr val="windowText" lastClr="000000"/>
+    </a:dk1>
+    <a:lt1>
+      <a:sysClr val="window" lastClr="FFFFFF"/>
+    </a:lt1>
+    <a:dk2>
+      <a:srgbClr val="212121"/>
+    </a:dk2>
+    <a:lt2>
+      <a:srgbClr val="DADADA"/>
+    </a:lt2>
+    <a:accent1>
+      <a:srgbClr val="D9B247"/>
+    </a:accent1>
+    <a:accent2>
+      <a:srgbClr val="CC702D"/>
+    </a:accent2>
+    <a:accent3>
+      <a:srgbClr val="B53A31"/>
+    </a:accent3>
+    <a:accent4>
+      <a:srgbClr val="815F56"/>
+    </a:accent4>
+    <a:accent5>
+      <a:srgbClr val="AE9E7C"/>
+    </a:accent5>
+    <a:accent6>
+      <a:srgbClr val="7B8865"/>
+    </a:accent6>
+    <a:hlink>
+      <a:srgbClr val="BB7826"/>
+    </a:hlink>
+    <a:folHlink>
+      <a:srgbClr val="CF9C5F"/>
+    </a:folHlink>
+  </a:clrScheme>
+</a:themeOverride>
+</file>
+
+<file path=ppt/theme/themeOverride2.xml><?xml version="1.0" encoding="utf-8"?>
+<a:themeOverride xmlns:a="http://schemas.openxmlformats.org/drawingml/2006/main">
+  <a:clrScheme name="Organic">
+    <a:dk1>
+      <a:sysClr val="windowText" lastClr="000000"/>
+    </a:dk1>
+    <a:lt1>
+      <a:sysClr val="window" lastClr="FFFFFF"/>
+    </a:lt1>
+    <a:dk2>
+      <a:srgbClr val="212121"/>
+    </a:dk2>
+    <a:lt2>
+      <a:srgbClr val="DADADA"/>
+    </a:lt2>
+    <a:accent1>
+      <a:srgbClr val="D9B247"/>
+    </a:accent1>
+    <a:accent2>
+      <a:srgbClr val="CC702D"/>
+    </a:accent2>
+    <a:accent3>
+      <a:srgbClr val="B53A31"/>
+    </a:accent3>
+    <a:accent4>
+      <a:srgbClr val="815F56"/>
+    </a:accent4>
+    <a:accent5>
+      <a:srgbClr val="AE9E7C"/>
+    </a:accent5>
+    <a:accent6>
+      <a:srgbClr val="7B8865"/>
+    </a:accent6>
+    <a:hlink>
+      <a:srgbClr val="BB7826"/>
+    </a:hlink>
+    <a:folHlink>
+      <a:srgbClr val="CF9C5F"/>
+    </a:folHlink>
+  </a:clrScheme>
+</a:themeOverride>
+</file>
+
+<file path=ppt/theme/themeOverride3.xml><?xml version="1.0" encoding="utf-8"?>
+<a:themeOverride xmlns:a="http://schemas.openxmlformats.org/drawingml/2006/main">
+  <a:clrScheme name="Organic">
+    <a:dk1>
+      <a:sysClr val="windowText" lastClr="000000"/>
+    </a:dk1>
+    <a:lt1>
+      <a:sysClr val="window" lastClr="FFFFFF"/>
+    </a:lt1>
+    <a:dk2>
+      <a:srgbClr val="212121"/>
+    </a:dk2>
+    <a:lt2>
+      <a:srgbClr val="DADADA"/>
+    </a:lt2>
+    <a:accent1>
+      <a:srgbClr val="D9B247"/>
+    </a:accent1>
+    <a:accent2>
+      <a:srgbClr val="CC702D"/>
+    </a:accent2>
+    <a:accent3>
+      <a:srgbClr val="B53A31"/>
+    </a:accent3>
+    <a:accent4>
+      <a:srgbClr val="815F56"/>
+    </a:accent4>
+    <a:accent5>
+      <a:srgbClr val="AE9E7C"/>
+    </a:accent5>
+    <a:accent6>
+      <a:srgbClr val="7B8865"/>
+    </a:accent6>
+    <a:hlink>
+      <a:srgbClr val="BB7826"/>
+    </a:hlink>
+    <a:folHlink>
+      <a:srgbClr val="CF9C5F"/>
+    </a:folHlink>
+  </a:clrScheme>
+</a:themeOverride>
+</file>
+
+<file path=ppt/theme/themeOverride4.xml><?xml version="1.0" encoding="utf-8"?>
+<a:themeOverride xmlns:a="http://schemas.openxmlformats.org/drawingml/2006/main">
+  <a:clrScheme name="Organic">
+    <a:dk1>
+      <a:sysClr val="windowText" lastClr="000000"/>
+    </a:dk1>
+    <a:lt1>
+      <a:sysClr val="window" lastClr="FFFFFF"/>
+    </a:lt1>
+    <a:dk2>
+      <a:srgbClr val="212121"/>
+    </a:dk2>
+    <a:lt2>
+      <a:srgbClr val="DADADA"/>
+    </a:lt2>
+    <a:accent1>
+      <a:srgbClr val="D9B247"/>
+    </a:accent1>
+    <a:accent2>
+      <a:srgbClr val="CC702D"/>
+    </a:accent2>
+    <a:accent3>
+      <a:srgbClr val="B53A31"/>
+    </a:accent3>
+    <a:accent4>
+      <a:srgbClr val="815F56"/>
+    </a:accent4>
+    <a:accent5>
+      <a:srgbClr val="AE9E7C"/>
+    </a:accent5>
+    <a:accent6>
+      <a:srgbClr val="7B8865"/>
+    </a:accent6>
+    <a:hlink>
+      <a:srgbClr val="BB7826"/>
+    </a:hlink>
+    <a:folHlink>
+      <a:srgbClr val="CF9C5F"/>
+    </a:folHlink>
+  </a:clrScheme>
+</a:themeOverride>
+</file>
+
+<file path=ppt/theme/themeOverride5.xml><?xml version="1.0" encoding="utf-8"?>
+<a:themeOverride xmlns:a="http://schemas.openxmlformats.org/drawingml/2006/main">
+  <a:clrScheme name="Organic">
+    <a:dk1>
+      <a:sysClr val="windowText" lastClr="000000"/>
+    </a:dk1>
+    <a:lt1>
+      <a:sysClr val="window" lastClr="FFFFFF"/>
+    </a:lt1>
+    <a:dk2>
+      <a:srgbClr val="212121"/>
+    </a:dk2>
+    <a:lt2>
+      <a:srgbClr val="DADADA"/>
+    </a:lt2>
+    <a:accent1>
+      <a:srgbClr val="D9B247"/>
+    </a:accent1>
+    <a:accent2>
+      <a:srgbClr val="CC702D"/>
+    </a:accent2>
+    <a:accent3>
+      <a:srgbClr val="B53A31"/>
+    </a:accent3>
+    <a:accent4>
+      <a:srgbClr val="815F56"/>
+    </a:accent4>
+    <a:accent5>
+      <a:srgbClr val="AE9E7C"/>
+    </a:accent5>
+    <a:accent6>
+      <a:srgbClr val="7B8865"/>
+    </a:accent6>
+    <a:hlink>
+      <a:srgbClr val="BB7826"/>
+    </a:hlink>
+    <a:folHlink>
+      <a:srgbClr val="CF9C5F"/>
+    </a:folHlink>
+  </a:clrScheme>
+</a:themeOverride>
 </file>
</xml_diff>

<commit_message>
Modified Chart and Slide
</commit_message>
<xml_diff>
--- a/Capstone Presentation.pptx
+++ b/Capstone Presentation.pptx
@@ -217,7 +217,7 @@
           <a:p>
             <a:fld id="{16E8013F-6934-4E98-866E-AF276756534F}" type="datetimeFigureOut">
               <a:rPr lang="en-US" smtClean="0"/>
-              <a:t>5/15/2019</a:t>
+              <a:t>5/17/2019</a:t>
             </a:fld>
             <a:endParaRPr lang="en-US"/>
           </a:p>
@@ -879,7 +879,7 @@
           <a:p>
             <a:fld id="{E3C8C412-EFD4-402B-B224-F9C350D4ACD1}" type="datetimeFigureOut">
               <a:rPr lang="en-US" smtClean="0"/>
-              <a:t>5/13/2019</a:t>
+              <a:t>5/17/2019</a:t>
             </a:fld>
             <a:endParaRPr lang="en-US"/>
           </a:p>
@@ -1211,7 +1211,7 @@
           <a:p>
             <a:fld id="{E3C8C412-EFD4-402B-B224-F9C350D4ACD1}" type="datetimeFigureOut">
               <a:rPr lang="en-US" smtClean="0"/>
-              <a:t>5/13/2019</a:t>
+              <a:t>5/17/2019</a:t>
             </a:fld>
             <a:endParaRPr lang="en-US"/>
           </a:p>
@@ -1459,7 +1459,7 @@
           <a:p>
             <a:fld id="{E3C8C412-EFD4-402B-B224-F9C350D4ACD1}" type="datetimeFigureOut">
               <a:rPr lang="en-US" smtClean="0"/>
-              <a:t>5/13/2019</a:t>
+              <a:t>5/17/2019</a:t>
             </a:fld>
             <a:endParaRPr lang="en-US"/>
           </a:p>
@@ -1805,7 +1805,7 @@
           <a:p>
             <a:fld id="{E3C8C412-EFD4-402B-B224-F9C350D4ACD1}" type="datetimeFigureOut">
               <a:rPr lang="en-US" smtClean="0"/>
-              <a:t>5/13/2019</a:t>
+              <a:t>5/17/2019</a:t>
             </a:fld>
             <a:endParaRPr lang="en-US"/>
           </a:p>
@@ -2159,7 +2159,7 @@
           <a:p>
             <a:fld id="{E3C8C412-EFD4-402B-B224-F9C350D4ACD1}" type="datetimeFigureOut">
               <a:rPr lang="en-US" smtClean="0"/>
-              <a:t>5/13/2019</a:t>
+              <a:t>5/17/2019</a:t>
             </a:fld>
             <a:endParaRPr lang="en-US"/>
           </a:p>
@@ -2533,7 +2533,7 @@
           <a:p>
             <a:fld id="{E3C8C412-EFD4-402B-B224-F9C350D4ACD1}" type="datetimeFigureOut">
               <a:rPr lang="en-US" smtClean="0"/>
-              <a:t>5/13/2019</a:t>
+              <a:t>5/17/2019</a:t>
             </a:fld>
             <a:endParaRPr lang="en-US"/>
           </a:p>
@@ -3010,7 +3010,7 @@
           <a:p>
             <a:fld id="{E3C8C412-EFD4-402B-B224-F9C350D4ACD1}" type="datetimeFigureOut">
               <a:rPr lang="en-US" smtClean="0"/>
-              <a:t>5/13/2019</a:t>
+              <a:t>5/17/2019</a:t>
             </a:fld>
             <a:endParaRPr lang="en-US"/>
           </a:p>
@@ -3222,7 +3222,7 @@
           <a:p>
             <a:fld id="{E3C8C412-EFD4-402B-B224-F9C350D4ACD1}" type="datetimeFigureOut">
               <a:rPr lang="en-US" smtClean="0"/>
-              <a:t>5/13/2019</a:t>
+              <a:t>5/17/2019</a:t>
             </a:fld>
             <a:endParaRPr lang="en-US"/>
           </a:p>
@@ -3440,7 +3440,7 @@
           <a:p>
             <a:fld id="{E3C8C412-EFD4-402B-B224-F9C350D4ACD1}" type="datetimeFigureOut">
               <a:rPr lang="en-US" smtClean="0"/>
-              <a:t>5/13/2019</a:t>
+              <a:t>5/17/2019</a:t>
             </a:fld>
             <a:endParaRPr lang="en-US"/>
           </a:p>
@@ -3686,7 +3686,7 @@
           <a:p>
             <a:fld id="{E3C8C412-EFD4-402B-B224-F9C350D4ACD1}" type="datetimeFigureOut">
               <a:rPr lang="en-US" smtClean="0"/>
-              <a:t>5/13/2019</a:t>
+              <a:t>5/17/2019</a:t>
             </a:fld>
             <a:endParaRPr lang="en-US"/>
           </a:p>
@@ -3934,7 +3934,7 @@
           <a:p>
             <a:fld id="{E3C8C412-EFD4-402B-B224-F9C350D4ACD1}" type="datetimeFigureOut">
               <a:rPr lang="en-US" smtClean="0"/>
-              <a:t>5/13/2019</a:t>
+              <a:t>5/17/2019</a:t>
             </a:fld>
             <a:endParaRPr lang="en-US"/>
           </a:p>
@@ -4246,7 +4246,7 @@
           <a:p>
             <a:fld id="{E3C8C412-EFD4-402B-B224-F9C350D4ACD1}" type="datetimeFigureOut">
               <a:rPr lang="en-US" smtClean="0"/>
-              <a:t>5/13/2019</a:t>
+              <a:t>5/17/2019</a:t>
             </a:fld>
             <a:endParaRPr lang="en-US"/>
           </a:p>
@@ -4628,7 +4628,7 @@
           <a:p>
             <a:fld id="{E3C8C412-EFD4-402B-B224-F9C350D4ACD1}" type="datetimeFigureOut">
               <a:rPr lang="en-US" smtClean="0"/>
-              <a:t>5/13/2019</a:t>
+              <a:t>5/17/2019</a:t>
             </a:fld>
             <a:endParaRPr lang="en-US"/>
           </a:p>
@@ -4784,7 +4784,7 @@
           <a:p>
             <a:fld id="{E3C8C412-EFD4-402B-B224-F9C350D4ACD1}" type="datetimeFigureOut">
               <a:rPr lang="en-US" smtClean="0"/>
-              <a:t>5/13/2019</a:t>
+              <a:t>5/17/2019</a:t>
             </a:fld>
             <a:endParaRPr lang="en-US"/>
           </a:p>
@@ -4917,7 +4917,7 @@
           <a:p>
             <a:fld id="{E3C8C412-EFD4-402B-B224-F9C350D4ACD1}" type="datetimeFigureOut">
               <a:rPr lang="en-US" smtClean="0"/>
-              <a:t>5/13/2019</a:t>
+              <a:t>5/17/2019</a:t>
             </a:fld>
             <a:endParaRPr lang="en-US"/>
           </a:p>
@@ -5172,7 +5172,7 @@
           <a:p>
             <a:fld id="{E3C8C412-EFD4-402B-B224-F9C350D4ACD1}" type="datetimeFigureOut">
               <a:rPr lang="en-US" smtClean="0"/>
-              <a:t>5/13/2019</a:t>
+              <a:t>5/17/2019</a:t>
             </a:fld>
             <a:endParaRPr lang="en-US"/>
           </a:p>
@@ -5494,7 +5494,7 @@
           <a:p>
             <a:fld id="{E3C8C412-EFD4-402B-B224-F9C350D4ACD1}" type="datetimeFigureOut">
               <a:rPr lang="en-US" smtClean="0"/>
-              <a:t>5/13/2019</a:t>
+              <a:t>5/17/2019</a:t>
             </a:fld>
             <a:endParaRPr lang="en-US"/>
           </a:p>
@@ -5738,7 +5738,7 @@
           <a:p>
             <a:fld id="{E3C8C412-EFD4-402B-B224-F9C350D4ACD1}" type="datetimeFigureOut">
               <a:rPr lang="en-US" smtClean="0"/>
-              <a:t>5/13/2019</a:t>
+              <a:t>5/17/2019</a:t>
             </a:fld>
             <a:endParaRPr lang="en-US"/>
           </a:p>
@@ -6383,13 +6383,13 @@
   <p:clrMapOvr>
     <a:masterClrMapping/>
   </p:clrMapOvr>
-  <mc:AlternateContent xmlns:mc="http://schemas.openxmlformats.org/markup-compatibility/2006">
-    <mc:Choice xmlns:p15="http://schemas.microsoft.com/office/powerpoint/2012/main" Requires="p15">
+  <mc:AlternateContent xmlns:mc="http://schemas.openxmlformats.org/markup-compatibility/2006" xmlns:p15="http://schemas.microsoft.com/office/powerpoint/2012/main">
+    <mc:Choice Requires="p15">
       <p:transition xmlns:p14="http://schemas.microsoft.com/office/powerpoint/2010/main" spd="slow" p14:dur="1250">
         <p15:prstTrans prst="peelOff"/>
       </p:transition>
     </mc:Choice>
-    <mc:Fallback>
+    <mc:Fallback xmlns="">
       <p:transition spd="slow">
         <p:fade/>
       </p:transition>
@@ -6526,13 +6526,13 @@
   <p:clrMapOvr>
     <a:masterClrMapping/>
   </p:clrMapOvr>
-  <mc:AlternateContent xmlns:mc="http://schemas.openxmlformats.org/markup-compatibility/2006">
-    <mc:Choice xmlns:p15="http://schemas.microsoft.com/office/powerpoint/2012/main" Requires="p15">
+  <mc:AlternateContent xmlns:mc="http://schemas.openxmlformats.org/markup-compatibility/2006" xmlns:p15="http://schemas.microsoft.com/office/powerpoint/2012/main">
+    <mc:Choice Requires="p15">
       <p:transition xmlns:p14="http://schemas.microsoft.com/office/powerpoint/2010/main" spd="slow" p14:dur="1250">
         <p15:prstTrans prst="peelOff"/>
       </p:transition>
     </mc:Choice>
-    <mc:Fallback>
+    <mc:Fallback xmlns="">
       <p:transition spd="slow">
         <p:fade/>
       </p:transition>
@@ -6703,13 +6703,13 @@
   <p:clrMapOvr>
     <a:masterClrMapping/>
   </p:clrMapOvr>
-  <mc:AlternateContent xmlns:mc="http://schemas.openxmlformats.org/markup-compatibility/2006">
-    <mc:Choice xmlns:p15="http://schemas.microsoft.com/office/powerpoint/2012/main" Requires="p15">
+  <mc:AlternateContent xmlns:mc="http://schemas.openxmlformats.org/markup-compatibility/2006" xmlns:p15="http://schemas.microsoft.com/office/powerpoint/2012/main">
+    <mc:Choice Requires="p15">
       <p:transition xmlns:p14="http://schemas.microsoft.com/office/powerpoint/2010/main" spd="slow" p14:dur="1250">
         <p15:prstTrans prst="peelOff"/>
       </p:transition>
     </mc:Choice>
-    <mc:Fallback>
+    <mc:Fallback xmlns="">
       <p:transition spd="slow">
         <p:fade/>
       </p:transition>
@@ -6879,13 +6879,13 @@
   <p:clrMapOvr>
     <a:masterClrMapping/>
   </p:clrMapOvr>
-  <mc:AlternateContent xmlns:mc="http://schemas.openxmlformats.org/markup-compatibility/2006">
-    <mc:Choice xmlns:p15="http://schemas.microsoft.com/office/powerpoint/2012/main" Requires="p15">
+  <mc:AlternateContent xmlns:mc="http://schemas.openxmlformats.org/markup-compatibility/2006" xmlns:p15="http://schemas.microsoft.com/office/powerpoint/2012/main">
+    <mc:Choice Requires="p15">
       <p:transition xmlns:p14="http://schemas.microsoft.com/office/powerpoint/2010/main" spd="slow" p14:dur="1250">
         <p15:prstTrans prst="peelOff"/>
       </p:transition>
     </mc:Choice>
-    <mc:Fallback>
+    <mc:Fallback xmlns="">
       <p:transition spd="slow">
         <p:fade/>
       </p:transition>
@@ -7039,13 +7039,13 @@
   <p:clrMapOvr>
     <a:masterClrMapping/>
   </p:clrMapOvr>
-  <mc:AlternateContent xmlns:mc="http://schemas.openxmlformats.org/markup-compatibility/2006">
-    <mc:Choice xmlns:p15="http://schemas.microsoft.com/office/powerpoint/2012/main" Requires="p15">
+  <mc:AlternateContent xmlns:mc="http://schemas.openxmlformats.org/markup-compatibility/2006" xmlns:p15="http://schemas.microsoft.com/office/powerpoint/2012/main">
+    <mc:Choice Requires="p15">
       <p:transition xmlns:p14="http://schemas.microsoft.com/office/powerpoint/2010/main" spd="slow" p14:dur="1250">
         <p15:prstTrans prst="peelOff"/>
       </p:transition>
     </mc:Choice>
-    <mc:Fallback>
+    <mc:Fallback xmlns="">
       <p:transition spd="slow">
         <p:fade/>
       </p:transition>
@@ -7205,13 +7205,13 @@
   <p:clrMapOvr>
     <a:masterClrMapping/>
   </p:clrMapOvr>
-  <mc:AlternateContent xmlns:mc="http://schemas.openxmlformats.org/markup-compatibility/2006">
-    <mc:Choice xmlns:p15="http://schemas.microsoft.com/office/powerpoint/2012/main" Requires="p15">
+  <mc:AlternateContent xmlns:mc="http://schemas.openxmlformats.org/markup-compatibility/2006" xmlns:p15="http://schemas.microsoft.com/office/powerpoint/2012/main">
+    <mc:Choice Requires="p15">
       <p:transition xmlns:p14="http://schemas.microsoft.com/office/powerpoint/2010/main" spd="slow" p14:dur="1250">
         <p15:prstTrans prst="peelOff"/>
       </p:transition>
     </mc:Choice>
-    <mc:Fallback>
+    <mc:Fallback xmlns="">
       <p:transition spd="slow">
         <p:fade/>
       </p:transition>
@@ -7363,13 +7363,13 @@
   <p:clrMapOvr>
     <a:masterClrMapping/>
   </p:clrMapOvr>
-  <mc:AlternateContent xmlns:mc="http://schemas.openxmlformats.org/markup-compatibility/2006">
-    <mc:Choice xmlns:p15="http://schemas.microsoft.com/office/powerpoint/2012/main" Requires="p15">
+  <mc:AlternateContent xmlns:mc="http://schemas.openxmlformats.org/markup-compatibility/2006" xmlns:p15="http://schemas.microsoft.com/office/powerpoint/2012/main">
+    <mc:Choice Requires="p15">
       <p:transition xmlns:p14="http://schemas.microsoft.com/office/powerpoint/2010/main" spd="slow" p14:dur="1250">
         <p15:prstTrans prst="peelOff"/>
       </p:transition>
     </mc:Choice>
-    <mc:Fallback>
+    <mc:Fallback xmlns="">
       <p:transition spd="slow">
         <p:fade/>
       </p:transition>
@@ -7523,13 +7523,13 @@
   <p:clrMapOvr>
     <a:masterClrMapping/>
   </p:clrMapOvr>
-  <mc:AlternateContent xmlns:mc="http://schemas.openxmlformats.org/markup-compatibility/2006">
-    <mc:Choice xmlns:p15="http://schemas.microsoft.com/office/powerpoint/2012/main" Requires="p15">
+  <mc:AlternateContent xmlns:mc="http://schemas.openxmlformats.org/markup-compatibility/2006" xmlns:p15="http://schemas.microsoft.com/office/powerpoint/2012/main">
+    <mc:Choice Requires="p15">
       <p:transition xmlns:p14="http://schemas.microsoft.com/office/powerpoint/2010/main" spd="slow" p14:dur="1250">
         <p15:prstTrans prst="peelOff"/>
       </p:transition>
     </mc:Choice>
-    <mc:Fallback>
+    <mc:Fallback xmlns="">
       <p:transition spd="slow">
         <p:fade/>
       </p:transition>
@@ -7667,13 +7667,13 @@
   <p:clrMapOvr>
     <a:masterClrMapping/>
   </p:clrMapOvr>
-  <mc:AlternateContent xmlns:mc="http://schemas.openxmlformats.org/markup-compatibility/2006">
-    <mc:Choice xmlns:p15="http://schemas.microsoft.com/office/powerpoint/2012/main" Requires="p15">
+  <mc:AlternateContent xmlns:mc="http://schemas.openxmlformats.org/markup-compatibility/2006" xmlns:p15="http://schemas.microsoft.com/office/powerpoint/2012/main">
+    <mc:Choice Requires="p15">
       <p:transition xmlns:p14="http://schemas.microsoft.com/office/powerpoint/2010/main" spd="slow" p14:dur="1250">
         <p15:prstTrans prst="peelOff"/>
       </p:transition>
     </mc:Choice>
-    <mc:Fallback>
+    <mc:Fallback xmlns="">
       <p:transition spd="slow">
         <p:fade/>
       </p:transition>
@@ -7791,13 +7791,13 @@
   <p:clrMapOvr>
     <a:masterClrMapping/>
   </p:clrMapOvr>
-  <mc:AlternateContent xmlns:mc="http://schemas.openxmlformats.org/markup-compatibility/2006">
-    <mc:Choice xmlns:p15="http://schemas.microsoft.com/office/powerpoint/2012/main" Requires="p15">
+  <mc:AlternateContent xmlns:mc="http://schemas.openxmlformats.org/markup-compatibility/2006" xmlns:p15="http://schemas.microsoft.com/office/powerpoint/2012/main">
+    <mc:Choice Requires="p15">
       <p:transition xmlns:p14="http://schemas.microsoft.com/office/powerpoint/2010/main" spd="slow" p14:dur="1250">
         <p15:prstTrans prst="peelOff"/>
       </p:transition>
     </mc:Choice>
-    <mc:Fallback>
+    <mc:Fallback xmlns="">
       <p:transition spd="slow">
         <p:fade/>
       </p:transition>
@@ -7858,21 +7858,54 @@
           </a:p>
         </p:txBody>
       </p:sp>
+      <p:sp>
+        <p:nvSpPr>
+          <p:cNvPr id="4" name="TextBox 3">
+            <a:extLst>
+              <a:ext uri="{FF2B5EF4-FFF2-40B4-BE49-F238E27FC236}">
+                <a16:creationId xmlns:a16="http://schemas.microsoft.com/office/drawing/2014/main" id="{73FEFD2A-F3AC-400D-B9C6-93758502D165}"/>
+              </a:ext>
+            </a:extLst>
+          </p:cNvPr>
+          <p:cNvSpPr txBox="1"/>
+          <p:nvPr/>
+        </p:nvSpPr>
+        <p:spPr>
+          <a:xfrm>
+            <a:off x="703385" y="2715065"/>
+            <a:ext cx="2616591" cy="646331"/>
+          </a:xfrm>
+          <a:prstGeom prst="rect">
+            <a:avLst/>
+          </a:prstGeom>
+          <a:noFill/>
+        </p:spPr>
+        <p:txBody>
+          <a:bodyPr wrap="square" rtlCol="0">
+            <a:spAutoFit/>
+          </a:bodyPr>
+          <a:lstStyle/>
+          <a:p>
+            <a:r>
+              <a:rPr lang="en-US" dirty="0"/>
+              <a:t>Lasso Regression didn’t drop any variables.</a:t>
+            </a:r>
+          </a:p>
+        </p:txBody>
+      </p:sp>
       <p:pic>
         <p:nvPicPr>
-          <p:cNvPr id="5122" name="Picture 2">
+          <p:cNvPr id="1026" name="Picture 2">
             <a:extLst>
               <a:ext uri="{FF2B5EF4-FFF2-40B4-BE49-F238E27FC236}">
-                <a16:creationId xmlns:a16="http://schemas.microsoft.com/office/drawing/2014/main" id="{46A7E73E-66C8-41DB-94F6-7A1B063FD9CF}"/>
+                <a16:creationId xmlns:a16="http://schemas.microsoft.com/office/drawing/2014/main" id="{672E4259-9262-4C48-AE17-423BF60F02D0}"/>
               </a:ext>
             </a:extLst>
           </p:cNvPr>
           <p:cNvPicPr>
-            <a:picLocks noGrp="1" noChangeAspect="1" noChangeArrowheads="1"/>
+            <a:picLocks noChangeAspect="1" noChangeArrowheads="1"/>
           </p:cNvPicPr>
-          <p:nvPr>
-            <p:ph idx="1"/>
-          </p:nvPr>
+          <p:nvPr/>
         </p:nvPicPr>
         <p:blipFill>
           <a:blip r:embed="rId3">
@@ -7889,8 +7922,8 @@
         </p:blipFill>
         <p:spPr bwMode="auto">
           <a:xfrm>
-            <a:off x="3319976" y="1139482"/>
-            <a:ext cx="5613010" cy="5144432"/>
+            <a:off x="4909625" y="1123339"/>
+            <a:ext cx="4806463" cy="5213135"/>
           </a:xfrm>
           <a:prstGeom prst="rect">
             <a:avLst/>
@@ -7907,41 +7940,6 @@
           </a:extLst>
         </p:spPr>
       </p:pic>
-      <p:sp>
-        <p:nvSpPr>
-          <p:cNvPr id="4" name="TextBox 3">
-            <a:extLst>
-              <a:ext uri="{FF2B5EF4-FFF2-40B4-BE49-F238E27FC236}">
-                <a16:creationId xmlns:a16="http://schemas.microsoft.com/office/drawing/2014/main" id="{73FEFD2A-F3AC-400D-B9C6-93758502D165}"/>
-              </a:ext>
-            </a:extLst>
-          </p:cNvPr>
-          <p:cNvSpPr txBox="1"/>
-          <p:nvPr/>
-        </p:nvSpPr>
-        <p:spPr>
-          <a:xfrm>
-            <a:off x="703385" y="2715065"/>
-            <a:ext cx="2616591" cy="646331"/>
-          </a:xfrm>
-          <a:prstGeom prst="rect">
-            <a:avLst/>
-          </a:prstGeom>
-          <a:noFill/>
-        </p:spPr>
-        <p:txBody>
-          <a:bodyPr wrap="square" rtlCol="0">
-            <a:spAutoFit/>
-          </a:bodyPr>
-          <a:lstStyle/>
-          <a:p>
-            <a:r>
-              <a:rPr lang="en-US" dirty="0"/>
-              <a:t>Lasso Regression didn’t drop any variables.</a:t>
-            </a:r>
-          </a:p>
-        </p:txBody>
-      </p:sp>
     </p:spTree>
     <p:extLst>
       <p:ext uri="{BB962C8B-B14F-4D97-AF65-F5344CB8AC3E}">
@@ -7952,13 +7950,13 @@
   <p:clrMapOvr>
     <a:masterClrMapping/>
   </p:clrMapOvr>
-  <mc:AlternateContent xmlns:mc="http://schemas.openxmlformats.org/markup-compatibility/2006">
-    <mc:Choice xmlns:p15="http://schemas.microsoft.com/office/powerpoint/2012/main" Requires="p15">
+  <mc:AlternateContent xmlns:mc="http://schemas.openxmlformats.org/markup-compatibility/2006" xmlns:p15="http://schemas.microsoft.com/office/powerpoint/2012/main">
+    <mc:Choice Requires="p15">
       <p:transition xmlns:p14="http://schemas.microsoft.com/office/powerpoint/2010/main" spd="slow" p14:dur="1250">
         <p15:prstTrans prst="peelOff"/>
       </p:transition>
     </mc:Choice>
-    <mc:Fallback>
+    <mc:Fallback xmlns="">
       <p:transition spd="slow">
         <p:fade/>
       </p:transition>
@@ -8102,13 +8100,13 @@
   <p:clrMapOvr>
     <a:masterClrMapping/>
   </p:clrMapOvr>
-  <mc:AlternateContent xmlns:mc="http://schemas.openxmlformats.org/markup-compatibility/2006">
-    <mc:Choice xmlns:p15="http://schemas.microsoft.com/office/powerpoint/2012/main" Requires="p15">
+  <mc:AlternateContent xmlns:mc="http://schemas.openxmlformats.org/markup-compatibility/2006" xmlns:p15="http://schemas.microsoft.com/office/powerpoint/2012/main">
+    <mc:Choice Requires="p15">
       <p:transition xmlns:p14="http://schemas.microsoft.com/office/powerpoint/2010/main" spd="slow" p14:dur="1250">
         <p15:prstTrans prst="peelOff"/>
       </p:transition>
     </mc:Choice>
-    <mc:Fallback>
+    <mc:Fallback xmlns="">
       <p:transition spd="slow">
         <p:fade/>
       </p:transition>
@@ -11866,13 +11864,13 @@
   <p:clrMapOvr>
     <a:masterClrMapping/>
   </p:clrMapOvr>
-  <mc:AlternateContent xmlns:mc="http://schemas.openxmlformats.org/markup-compatibility/2006">
-    <mc:Choice xmlns:p15="http://schemas.microsoft.com/office/powerpoint/2012/main" Requires="p15">
+  <mc:AlternateContent xmlns:mc="http://schemas.openxmlformats.org/markup-compatibility/2006" xmlns:p15="http://schemas.microsoft.com/office/powerpoint/2012/main">
+    <mc:Choice Requires="p15">
       <p:transition xmlns:p14="http://schemas.microsoft.com/office/powerpoint/2010/main" spd="slow" p14:dur="1250">
         <p15:prstTrans prst="peelOff"/>
       </p:transition>
     </mc:Choice>
-    <mc:Fallback>
+    <mc:Fallback xmlns="">
       <p:transition spd="slow">
         <p:fade/>
       </p:transition>
@@ -12214,13 +12212,13 @@
   <p:clrMapOvr>
     <a:overrideClrMapping bg1="lt1" tx1="dk1" bg2="lt2" tx2="dk2" accent1="accent1" accent2="accent2" accent3="accent3" accent4="accent4" accent5="accent5" accent6="accent6" hlink="hlink" folHlink="folHlink"/>
   </p:clrMapOvr>
-  <mc:AlternateContent xmlns:mc="http://schemas.openxmlformats.org/markup-compatibility/2006">
-    <mc:Choice xmlns:p15="http://schemas.microsoft.com/office/powerpoint/2012/main" Requires="p15">
+  <mc:AlternateContent xmlns:mc="http://schemas.openxmlformats.org/markup-compatibility/2006" xmlns:p15="http://schemas.microsoft.com/office/powerpoint/2012/main">
+    <mc:Choice Requires="p15">
       <p:transition xmlns:p14="http://schemas.microsoft.com/office/powerpoint/2010/main" spd="slow" p14:dur="1250">
         <p15:prstTrans prst="peelOff"/>
       </p:transition>
     </mc:Choice>
-    <mc:Fallback>
+    <mc:Fallback xmlns="">
       <p:transition spd="slow">
         <p:fade/>
       </p:transition>
@@ -12378,13 +12376,13 @@
   <p:clrMapOvr>
     <a:overrideClrMapping bg1="lt1" tx1="dk1" bg2="lt2" tx2="dk2" accent1="accent1" accent2="accent2" accent3="accent3" accent4="accent4" accent5="accent5" accent6="accent6" hlink="hlink" folHlink="folHlink"/>
   </p:clrMapOvr>
-  <mc:AlternateContent xmlns:mc="http://schemas.openxmlformats.org/markup-compatibility/2006">
-    <mc:Choice xmlns:p15="http://schemas.microsoft.com/office/powerpoint/2012/main" Requires="p15">
+  <mc:AlternateContent xmlns:mc="http://schemas.openxmlformats.org/markup-compatibility/2006" xmlns:p15="http://schemas.microsoft.com/office/powerpoint/2012/main">
+    <mc:Choice Requires="p15">
       <p:transition xmlns:p14="http://schemas.microsoft.com/office/powerpoint/2010/main" spd="slow" p14:dur="1250">
         <p15:prstTrans prst="peelOff"/>
       </p:transition>
     </mc:Choice>
-    <mc:Fallback>
+    <mc:Fallback xmlns="">
       <p:transition spd="slow">
         <p:fade/>
       </p:transition>
@@ -12543,13 +12541,13 @@
   <p:clrMapOvr>
     <a:overrideClrMapping bg1="lt1" tx1="dk1" bg2="lt2" tx2="dk2" accent1="accent1" accent2="accent2" accent3="accent3" accent4="accent4" accent5="accent5" accent6="accent6" hlink="hlink" folHlink="folHlink"/>
   </p:clrMapOvr>
-  <mc:AlternateContent xmlns:mc="http://schemas.openxmlformats.org/markup-compatibility/2006">
-    <mc:Choice xmlns:p15="http://schemas.microsoft.com/office/powerpoint/2012/main" Requires="p15">
+  <mc:AlternateContent xmlns:mc="http://schemas.openxmlformats.org/markup-compatibility/2006" xmlns:p15="http://schemas.microsoft.com/office/powerpoint/2012/main">
+    <mc:Choice Requires="p15">
       <p:transition xmlns:p14="http://schemas.microsoft.com/office/powerpoint/2010/main" spd="slow" p14:dur="1250">
         <p15:prstTrans prst="peelOff"/>
       </p:transition>
     </mc:Choice>
-    <mc:Fallback>
+    <mc:Fallback xmlns="">
       <p:transition spd="slow">
         <p:fade/>
       </p:transition>
@@ -12689,13 +12687,13 @@
   <p:clrMapOvr>
     <a:masterClrMapping/>
   </p:clrMapOvr>
-  <mc:AlternateContent xmlns:mc="http://schemas.openxmlformats.org/markup-compatibility/2006">
-    <mc:Choice xmlns:p15="http://schemas.microsoft.com/office/powerpoint/2012/main" Requires="p15">
+  <mc:AlternateContent xmlns:mc="http://schemas.openxmlformats.org/markup-compatibility/2006" xmlns:p15="http://schemas.microsoft.com/office/powerpoint/2012/main">
+    <mc:Choice Requires="p15">
       <p:transition xmlns:p14="http://schemas.microsoft.com/office/powerpoint/2010/main" spd="slow" p14:dur="1250">
         <p15:prstTrans prst="peelOff"/>
       </p:transition>
     </mc:Choice>
-    <mc:Fallback>
+    <mc:Fallback xmlns="">
       <p:transition spd="slow">
         <p:fade/>
       </p:transition>
@@ -12849,13 +12847,13 @@
   <p:clrMapOvr>
     <a:masterClrMapping/>
   </p:clrMapOvr>
-  <mc:AlternateContent xmlns:mc="http://schemas.openxmlformats.org/markup-compatibility/2006">
-    <mc:Choice xmlns:p15="http://schemas.microsoft.com/office/powerpoint/2012/main" Requires="p15">
+  <mc:AlternateContent xmlns:mc="http://schemas.openxmlformats.org/markup-compatibility/2006" xmlns:p15="http://schemas.microsoft.com/office/powerpoint/2012/main">
+    <mc:Choice Requires="p15">
       <p:transition xmlns:p14="http://schemas.microsoft.com/office/powerpoint/2010/main" spd="slow" p14:dur="1250">
         <p15:prstTrans prst="peelOff"/>
       </p:transition>
     </mc:Choice>
-    <mc:Fallback>
+    <mc:Fallback xmlns="">
       <p:transition spd="slow">
         <p:fade/>
       </p:transition>
@@ -14141,13 +14139,13 @@
   <p:clrMapOvr>
     <a:overrideClrMapping bg1="lt1" tx1="dk1" bg2="lt2" tx2="dk2" accent1="accent1" accent2="accent2" accent3="accent3" accent4="accent4" accent5="accent5" accent6="accent6" hlink="hlink" folHlink="folHlink"/>
   </p:clrMapOvr>
-  <mc:AlternateContent xmlns:mc="http://schemas.openxmlformats.org/markup-compatibility/2006">
-    <mc:Choice xmlns:p15="http://schemas.microsoft.com/office/powerpoint/2012/main" Requires="p15">
+  <mc:AlternateContent xmlns:mc="http://schemas.openxmlformats.org/markup-compatibility/2006" xmlns:p15="http://schemas.microsoft.com/office/powerpoint/2012/main">
+    <mc:Choice Requires="p15">
       <p:transition xmlns:p14="http://schemas.microsoft.com/office/powerpoint/2010/main" spd="slow" p14:dur="1250">
         <p15:prstTrans prst="peelOff"/>
       </p:transition>
     </mc:Choice>
-    <mc:Fallback>
+    <mc:Fallback xmlns="">
       <p:transition spd="slow">
         <p:fade/>
       </p:transition>
@@ -14306,13 +14304,13 @@
   <p:clrMapOvr>
     <a:overrideClrMapping bg1="lt1" tx1="dk1" bg2="lt2" tx2="dk2" accent1="accent1" accent2="accent2" accent3="accent3" accent4="accent4" accent5="accent5" accent6="accent6" hlink="hlink" folHlink="folHlink"/>
   </p:clrMapOvr>
-  <mc:AlternateContent xmlns:mc="http://schemas.openxmlformats.org/markup-compatibility/2006">
-    <mc:Choice xmlns:p15="http://schemas.microsoft.com/office/powerpoint/2012/main" Requires="p15">
+  <mc:AlternateContent xmlns:mc="http://schemas.openxmlformats.org/markup-compatibility/2006" xmlns:p15="http://schemas.microsoft.com/office/powerpoint/2012/main">
+    <mc:Choice Requires="p15">
       <p:transition xmlns:p14="http://schemas.microsoft.com/office/powerpoint/2010/main" spd="slow" p14:dur="1250">
         <p15:prstTrans prst="peelOff"/>
       </p:transition>
     </mc:Choice>
-    <mc:Fallback>
+    <mc:Fallback xmlns="">
       <p:transition spd="slow">
         <p:fade/>
       </p:transition>

</xml_diff>